<commit_message>
updates to bar slides to include labels in ppt file
</commit_message>
<xml_diff>
--- a/Clay/Novel_Corona_Virus_2019_v2.pptx
+++ b/Clay/Novel_Corona_Virus_2019_v2.pptx
@@ -225,7 +225,7 @@
           <a:p>
             <a:fld id="{49E4E37A-8C9F-4B25-B068-6A7177E6E2F6}" type="datetimeFigureOut">
               <a:rPr lang="en-US" smtClean="0"/>
-              <a:t>6/6/2021</a:t>
+              <a:t>6/7/2021</a:t>
             </a:fld>
             <a:endParaRPr lang="en-US"/>
           </a:p>
@@ -403,7 +403,7 @@
           <a:p>
             <a:fld id="{9023BEA9-FA89-4F42-A6AE-03E83D737B38}" type="datetimeFigureOut">
               <a:rPr lang="en-US" smtClean="0"/>
-              <a:t>6/6/2021</a:t>
+              <a:t>6/7/2021</a:t>
             </a:fld>
             <a:endParaRPr lang="en-US"/>
           </a:p>
@@ -4334,7 +4334,7 @@
         </p:nvSpPr>
         <p:spPr>
           <a:xfrm>
-            <a:off x="838199" y="40720"/>
+            <a:off x="838200" y="148111"/>
             <a:ext cx="10515600" cy="1111250"/>
           </a:xfrm>
         </p:spPr>
@@ -4347,8 +4347,9 @@
             <a:pPr algn="ctr"/>
             <a:r>
               <a:rPr lang="en-US" sz="4000" dirty="0"/>
-              <a:t>Countries first to report - Covid-19 </a:t>
-            </a:r>
+              <a:t>Countries first to report - Covid-19</a:t>
+            </a:r>
+            <a:endParaRPr lang="en-US" sz="2200" dirty="0"/>
           </a:p>
         </p:txBody>
       </p:sp>
@@ -4376,49 +4377,6 @@
             <a:r>
               <a:rPr lang="en-US"/>
               <a:t>https://github.com/makbarish/Grp5_Project1_Covid19</a:t>
-            </a:r>
-          </a:p>
-        </p:txBody>
-      </p:sp>
-      <p:sp>
-        <p:nvSpPr>
-          <p:cNvPr id="6" name="TextBox 5">
-            <a:extLst>
-              <a:ext uri="{FF2B5EF4-FFF2-40B4-BE49-F238E27FC236}">
-                <a16:creationId xmlns:a16="http://schemas.microsoft.com/office/drawing/2014/main" id="{A03FECEA-47C1-4757-8518-90C44BCC97A4}"/>
-              </a:ext>
-            </a:extLst>
-          </p:cNvPr>
-          <p:cNvSpPr txBox="1"/>
-          <p:nvPr/>
-        </p:nvSpPr>
-        <p:spPr>
-          <a:xfrm>
-            <a:off x="838199" y="872887"/>
-            <a:ext cx="10191750" cy="646331"/>
-          </a:xfrm>
-          <a:prstGeom prst="rect">
-            <a:avLst/>
-          </a:prstGeom>
-          <a:noFill/>
-        </p:spPr>
-        <p:txBody>
-          <a:bodyPr wrap="square" rtlCol="0">
-            <a:spAutoFit/>
-          </a:bodyPr>
-          <a:lstStyle/>
-          <a:p>
-            <a:pPr algn="ctr"/>
-            <a:r>
-              <a:rPr lang="en-US" dirty="0"/>
-              <a:t>On 01/22/2020, China reported 548 (17 deaths and 28 recoveries) , Thailand 4, </a:t>
-            </a:r>
-          </a:p>
-          <a:p>
-            <a:pPr algn="ctr"/>
-            <a:r>
-              <a:rPr lang="en-US" dirty="0"/>
-              <a:t>Japan 2, South Korea 1, Taiwan 1, US 1</a:t>
             </a:r>
           </a:p>
         </p:txBody>
@@ -4772,10 +4730,10 @@
       </p:sp>
       <p:pic>
         <p:nvPicPr>
-          <p:cNvPr id="8" name="Picture 7">
-            <a:extLst>
-              <a:ext uri="{FF2B5EF4-FFF2-40B4-BE49-F238E27FC236}">
-                <a16:creationId xmlns:a16="http://schemas.microsoft.com/office/drawing/2014/main" id="{DAAE3A90-79E4-4F51-8330-6A208628EE5D}"/>
+          <p:cNvPr id="10" name="Picture 9">
+            <a:extLst>
+              <a:ext uri="{FF2B5EF4-FFF2-40B4-BE49-F238E27FC236}">
+                <a16:creationId xmlns:a16="http://schemas.microsoft.com/office/drawing/2014/main" id="{3A5EE11E-A09A-42FD-B66D-EEB5101C8D4C}"/>
               </a:ext>
             </a:extLst>
           </p:cNvPr>
@@ -4798,8 +4756,8 @@
         </p:blipFill>
         <p:spPr>
           <a:xfrm>
-            <a:off x="2093985" y="1606264"/>
-            <a:ext cx="7680178" cy="3992375"/>
+            <a:off x="1619247" y="1259361"/>
+            <a:ext cx="8736608" cy="4414326"/>
           </a:xfrm>
           <a:prstGeom prst="rect">
             <a:avLst/>
@@ -8022,12 +7980,69 @@
           </a:p>
         </p:txBody>
       </p:sp>
+      <p:sp>
+        <p:nvSpPr>
+          <p:cNvPr id="2" name="Date Placeholder 1">
+            <a:extLst>
+              <a:ext uri="{FF2B5EF4-FFF2-40B4-BE49-F238E27FC236}">
+                <a16:creationId xmlns:a16="http://schemas.microsoft.com/office/drawing/2014/main" id="{CE111FD5-1624-4334-A846-9C24666282CB}"/>
+              </a:ext>
+            </a:extLst>
+          </p:cNvPr>
+          <p:cNvSpPr>
+            <a:spLocks noGrp="1"/>
+          </p:cNvSpPr>
+          <p:nvPr>
+            <p:ph type="dt" sz="half" idx="10"/>
+          </p:nvPr>
+        </p:nvSpPr>
+        <p:spPr/>
+        <p:txBody>
+          <a:bodyPr/>
+          <a:lstStyle/>
+          <a:p>
+            <a:r>
+              <a:rPr lang="en-US"/>
+              <a:t>6/9/2021</a:t>
+            </a:r>
+          </a:p>
+        </p:txBody>
+      </p:sp>
+      <p:sp>
+        <p:nvSpPr>
+          <p:cNvPr id="3" name="Slide Number Placeholder 2">
+            <a:extLst>
+              <a:ext uri="{FF2B5EF4-FFF2-40B4-BE49-F238E27FC236}">
+                <a16:creationId xmlns:a16="http://schemas.microsoft.com/office/drawing/2014/main" id="{910F95B8-A89A-4B13-B11E-F560AFA251E7}"/>
+              </a:ext>
+            </a:extLst>
+          </p:cNvPr>
+          <p:cNvSpPr>
+            <a:spLocks noGrp="1"/>
+          </p:cNvSpPr>
+          <p:nvPr>
+            <p:ph type="sldNum" sz="quarter" idx="12"/>
+          </p:nvPr>
+        </p:nvSpPr>
+        <p:spPr/>
+        <p:txBody>
+          <a:bodyPr/>
+          <a:lstStyle/>
+          <a:p>
+            <a:fld id="{3AA9003C-6A8E-4863-AB7A-EC3E1B799067}" type="slidenum">
+              <a:rPr lang="en-US" smtClean="0"/>
+              <a:t>8</a:t>
+            </a:fld>
+            <a:endParaRPr lang="en-US"/>
+          </a:p>
+        </p:txBody>
+      </p:sp>
       <p:pic>
         <p:nvPicPr>
-          <p:cNvPr id="10" name="Picture 9">
-            <a:extLst>
-              <a:ext uri="{FF2B5EF4-FFF2-40B4-BE49-F238E27FC236}">
-                <a16:creationId xmlns:a16="http://schemas.microsoft.com/office/drawing/2014/main" id="{54CE7C67-3A44-4946-949D-6AA36CB0AF7C}"/>
+          <p:cNvPr id="6" name="Picture 5">
+            <a:extLst>
+              <a:ext uri="{FF2B5EF4-FFF2-40B4-BE49-F238E27FC236}">
+                <a16:creationId xmlns:a16="http://schemas.microsoft.com/office/drawing/2014/main" id="{80DEFA4C-69DF-44AF-8046-A27929B80CA7}"/>
               </a:ext>
             </a:extLst>
           </p:cNvPr>
@@ -8050,71 +8065,14 @@
         </p:blipFill>
         <p:spPr>
           <a:xfrm>
-            <a:off x="838200" y="1323976"/>
-            <a:ext cx="10382250" cy="4924424"/>
+            <a:off x="374573" y="1177091"/>
+            <a:ext cx="11402457" cy="5238009"/>
           </a:xfrm>
           <a:prstGeom prst="rect">
             <a:avLst/>
           </a:prstGeom>
         </p:spPr>
       </p:pic>
-      <p:sp>
-        <p:nvSpPr>
-          <p:cNvPr id="2" name="Date Placeholder 1">
-            <a:extLst>
-              <a:ext uri="{FF2B5EF4-FFF2-40B4-BE49-F238E27FC236}">
-                <a16:creationId xmlns:a16="http://schemas.microsoft.com/office/drawing/2014/main" id="{CE111FD5-1624-4334-A846-9C24666282CB}"/>
-              </a:ext>
-            </a:extLst>
-          </p:cNvPr>
-          <p:cNvSpPr>
-            <a:spLocks noGrp="1"/>
-          </p:cNvSpPr>
-          <p:nvPr>
-            <p:ph type="dt" sz="half" idx="10"/>
-          </p:nvPr>
-        </p:nvSpPr>
-        <p:spPr/>
-        <p:txBody>
-          <a:bodyPr/>
-          <a:lstStyle/>
-          <a:p>
-            <a:r>
-              <a:rPr lang="en-US"/>
-              <a:t>6/9/2021</a:t>
-            </a:r>
-          </a:p>
-        </p:txBody>
-      </p:sp>
-      <p:sp>
-        <p:nvSpPr>
-          <p:cNvPr id="3" name="Slide Number Placeholder 2">
-            <a:extLst>
-              <a:ext uri="{FF2B5EF4-FFF2-40B4-BE49-F238E27FC236}">
-                <a16:creationId xmlns:a16="http://schemas.microsoft.com/office/drawing/2014/main" id="{910F95B8-A89A-4B13-B11E-F560AFA251E7}"/>
-              </a:ext>
-            </a:extLst>
-          </p:cNvPr>
-          <p:cNvSpPr>
-            <a:spLocks noGrp="1"/>
-          </p:cNvSpPr>
-          <p:nvPr>
-            <p:ph type="sldNum" sz="quarter" idx="12"/>
-          </p:nvPr>
-        </p:nvSpPr>
-        <p:spPr/>
-        <p:txBody>
-          <a:bodyPr/>
-          <a:lstStyle/>
-          <a:p>
-            <a:fld id="{3AA9003C-6A8E-4863-AB7A-EC3E1B799067}" type="slidenum">
-              <a:rPr lang="en-US" smtClean="0"/>
-              <a:t>8</a:t>
-            </a:fld>
-            <a:endParaRPr lang="en-US"/>
-          </a:p>
-        </p:txBody>
-      </p:sp>
     </p:spTree>
     <p:extLst>
       <p:ext uri="{BB962C8B-B14F-4D97-AF65-F5344CB8AC3E}">
@@ -8213,42 +8171,6 @@
           </a:p>
         </p:txBody>
       </p:sp>
-      <p:pic>
-        <p:nvPicPr>
-          <p:cNvPr id="3" name="Picture 2">
-            <a:extLst>
-              <a:ext uri="{FF2B5EF4-FFF2-40B4-BE49-F238E27FC236}">
-                <a16:creationId xmlns:a16="http://schemas.microsoft.com/office/drawing/2014/main" id="{7D9BA2C6-8D22-40EE-8EC7-EB759B4FC54F}"/>
-              </a:ext>
-            </a:extLst>
-          </p:cNvPr>
-          <p:cNvPicPr>
-            <a:picLocks noChangeAspect="1"/>
-          </p:cNvPicPr>
-          <p:nvPr/>
-        </p:nvPicPr>
-        <p:blipFill>
-          <a:blip r:embed="rId2">
-            <a:extLst>
-              <a:ext uri="{28A0092B-C50C-407E-A947-70E740481C1C}">
-                <a14:useLocalDpi xmlns:a14="http://schemas.microsoft.com/office/drawing/2010/main" val="0"/>
-              </a:ext>
-            </a:extLst>
-          </a:blip>
-          <a:stretch>
-            <a:fillRect/>
-          </a:stretch>
-        </p:blipFill>
-        <p:spPr>
-          <a:xfrm>
-            <a:off x="1414462" y="1052039"/>
-            <a:ext cx="9363075" cy="4891561"/>
-          </a:xfrm>
-          <a:prstGeom prst="rect">
-            <a:avLst/>
-          </a:prstGeom>
-        </p:spPr>
-      </p:pic>
       <p:sp>
         <p:nvSpPr>
           <p:cNvPr id="5" name="TextBox 4">
@@ -8348,6 +8270,42 @@
           </a:p>
         </p:txBody>
       </p:sp>
+      <p:pic>
+        <p:nvPicPr>
+          <p:cNvPr id="9" name="Picture 8">
+            <a:extLst>
+              <a:ext uri="{FF2B5EF4-FFF2-40B4-BE49-F238E27FC236}">
+                <a16:creationId xmlns:a16="http://schemas.microsoft.com/office/drawing/2014/main" id="{86507AEA-CC32-4D5B-A305-D22317929975}"/>
+              </a:ext>
+            </a:extLst>
+          </p:cNvPr>
+          <p:cNvPicPr>
+            <a:picLocks noChangeAspect="1"/>
+          </p:cNvPicPr>
+          <p:nvPr/>
+        </p:nvPicPr>
+        <p:blipFill>
+          <a:blip r:embed="rId2">
+            <a:extLst>
+              <a:ext uri="{28A0092B-C50C-407E-A947-70E740481C1C}">
+                <a14:useLocalDpi xmlns:a14="http://schemas.microsoft.com/office/drawing/2010/main" val="0"/>
+              </a:ext>
+            </a:extLst>
+          </a:blip>
+          <a:stretch>
+            <a:fillRect/>
+          </a:stretch>
+        </p:blipFill>
+        <p:spPr>
+          <a:xfrm>
+            <a:off x="962024" y="1256518"/>
+            <a:ext cx="10267952" cy="4492930"/>
+          </a:xfrm>
+          <a:prstGeom prst="rect">
+            <a:avLst/>
+          </a:prstGeom>
+        </p:spPr>
+      </p:pic>
     </p:spTree>
     <p:extLst>
       <p:ext uri="{BB962C8B-B14F-4D97-AF65-F5344CB8AC3E}">

</xml_diff>

<commit_message>
additional png files to review with the team have been added
</commit_message>
<xml_diff>
--- a/Clay/Novel_Corona_Virus_2019_v2.pptx
+++ b/Clay/Novel_Corona_Virus_2019_v2.pptx
@@ -816,6 +816,66 @@
           <a:bodyPr/>
           <a:lstStyle/>
           <a:p>
+            <a:pPr marL="0" marR="0" lvl="0" indent="0" algn="l" defTabSz="914400" rtl="0" eaLnBrk="1" fontAlgn="auto" latinLnBrk="0" hangingPunct="1">
+              <a:lnSpc>
+                <a:spcPct val="100000"/>
+              </a:lnSpc>
+              <a:spcBef>
+                <a:spcPts val="0"/>
+              </a:spcBef>
+              <a:spcAft>
+                <a:spcPts val="0"/>
+              </a:spcAft>
+              <a:buClrTx/>
+              <a:buSzTx/>
+              <a:buFontTx/>
+              <a:buNone/>
+              <a:tabLst/>
+              <a:defRPr/>
+            </a:pPr>
+            <a:r>
+              <a:rPr lang="en-US" b="0" i="0" dirty="0">
+                <a:solidFill>
+                  <a:srgbClr val="505050"/>
+                </a:solidFill>
+                <a:effectLst/>
+                <a:latin typeface="Source Sans Pro" panose="020B0604020202020204" pitchFamily="34" charset="0"/>
+              </a:rPr>
+              <a:t>Despite being the first place to be hit by COVID-19, China was well-placed to tackle the disease. It has a centralized epidemic response system.  </a:t>
+            </a:r>
+            <a:r>
+              <a:rPr lang="en-US" b="0" i="0" dirty="0">
+                <a:solidFill>
+                  <a:srgbClr val="505050"/>
+                </a:solidFill>
+                <a:effectLst/>
+                <a:latin typeface="Source Sans Pro" panose="020B0503030403020204" pitchFamily="34" charset="0"/>
+              </a:rPr>
+              <a:t>Most Chinese adults remember SARS-</a:t>
+            </a:r>
+            <a:r>
+              <a:rPr lang="en-US" b="0" i="0" dirty="0" err="1">
+                <a:solidFill>
+                  <a:srgbClr val="505050"/>
+                </a:solidFill>
+                <a:effectLst/>
+                <a:latin typeface="Source Sans Pro" panose="020B0503030403020204" pitchFamily="34" charset="0"/>
+              </a:rPr>
+              <a:t>CoV</a:t>
+            </a:r>
+            <a:r>
+              <a:rPr lang="en-US" b="0" i="0" dirty="0">
+                <a:solidFill>
+                  <a:srgbClr val="505050"/>
+                </a:solidFill>
+                <a:effectLst/>
+                <a:latin typeface="Source Sans Pro" panose="020B0503030403020204" pitchFamily="34" charset="0"/>
+              </a:rPr>
+              <a:t> and the high mortality rate that was associated with it.  Only 3% of China's elderly population live in care homes, whereas in several western countries, such facilities have been major sources of infection.</a:t>
+            </a:r>
+            <a:endParaRPr lang="en-US" dirty="0"/>
+          </a:p>
+          <a:p>
             <a:endParaRPr lang="en-US" dirty="0"/>
           </a:p>
         </p:txBody>
@@ -824,6 +884,67 @@
     <p:extLst>
       <p:ext uri="{BB962C8B-B14F-4D97-AF65-F5344CB8AC3E}">
         <p14:creationId xmlns:p14="http://schemas.microsoft.com/office/powerpoint/2010/main" val="1343611298"/>
+      </p:ext>
+    </p:extLst>
+  </p:cSld>
+  <p:clrMapOvr>
+    <a:masterClrMapping/>
+  </p:clrMapOvr>
+</p:notes>
+</file>
+
+<file path=ppt/notesSlides/notesSlide3.xml><?xml version="1.0" encoding="utf-8"?>
+<p:notes xmlns:a="http://schemas.openxmlformats.org/drawingml/2006/main" xmlns:r="http://schemas.openxmlformats.org/officeDocument/2006/relationships" xmlns:p="http://schemas.openxmlformats.org/presentationml/2006/main">
+  <p:cSld>
+    <p:spTree>
+      <p:nvGrpSpPr>
+        <p:cNvPr id="1" name=""/>
+        <p:cNvGrpSpPr/>
+        <p:nvPr/>
+      </p:nvGrpSpPr>
+      <p:grpSpPr>
+        <a:xfrm>
+          <a:off x="0" y="0"/>
+          <a:ext cx="0" cy="0"/>
+          <a:chOff x="0" y="0"/>
+          <a:chExt cx="0" cy="0"/>
+        </a:xfrm>
+      </p:grpSpPr>
+      <p:sp>
+        <p:nvSpPr>
+          <p:cNvPr id="2" name="Slide Image Placeholder 1"/>
+          <p:cNvSpPr>
+            <a:spLocks noGrp="1" noRot="1" noChangeAspect="1"/>
+          </p:cNvSpPr>
+          <p:nvPr>
+            <p:ph type="sldImg"/>
+          </p:nvPr>
+        </p:nvSpPr>
+        <p:spPr/>
+      </p:sp>
+      <p:sp>
+        <p:nvSpPr>
+          <p:cNvPr id="3" name="Notes Placeholder 2"/>
+          <p:cNvSpPr>
+            <a:spLocks noGrp="1"/>
+          </p:cNvSpPr>
+          <p:nvPr>
+            <p:ph type="body" idx="1"/>
+          </p:nvPr>
+        </p:nvSpPr>
+        <p:spPr/>
+        <p:txBody>
+          <a:bodyPr/>
+          <a:lstStyle/>
+          <a:p>
+            <a:endParaRPr lang="en-US" dirty="0"/>
+          </a:p>
+        </p:txBody>
+      </p:sp>
+    </p:spTree>
+    <p:extLst>
+      <p:ext uri="{BB962C8B-B14F-4D97-AF65-F5344CB8AC3E}">
+        <p14:creationId xmlns:p14="http://schemas.microsoft.com/office/powerpoint/2010/main" val="2545437872"/>
       </p:ext>
     </p:extLst>
   </p:cSld>
@@ -4397,8 +4518,8 @@
         </p:nvSpPr>
         <p:spPr bwMode="auto">
           <a:xfrm>
-            <a:off x="1619247" y="5792433"/>
-            <a:ext cx="9410702" cy="666785"/>
+            <a:off x="1619247" y="5719853"/>
+            <a:ext cx="9410702" cy="389786"/>
           </a:xfrm>
           <a:prstGeom prst="rect">
             <a:avLst/>
@@ -4585,27 +4706,7 @@
               <a:tabLst/>
             </a:pPr>
             <a:r>
-              <a:rPr lang="en-US" altLang="en-US" sz="1000" dirty="0">
-                <a:latin typeface="Inter"/>
-              </a:rPr>
-              <a:t>Comment from the </a:t>
-            </a:r>
-            <a:r>
-              <a:rPr kumimoji="0" lang="en-US" altLang="en-US" sz="1000" b="0" i="0" u="none" strike="noStrike" cap="none" normalizeH="0" baseline="0" dirty="0">
-                <a:ln>
-                  <a:noFill/>
-                </a:ln>
-                <a:solidFill>
-                  <a:srgbClr val="008ABC"/>
-                </a:solidFill>
-                <a:effectLst/>
-                <a:latin typeface="Inter"/>
-                <a:hlinkClick r:id="rId3"/>
-              </a:rPr>
-              <a:t>World Health Organization</a:t>
-            </a:r>
-            <a:r>
-              <a:rPr kumimoji="0" lang="en-US" altLang="en-US" sz="1000" b="0" i="0" u="none" strike="noStrike" cap="none" normalizeH="0" baseline="0" dirty="0">
+              <a:rPr kumimoji="0" lang="en-US" altLang="en-US" sz="1200" b="0" i="1" u="none" strike="noStrike" cap="none" normalizeH="0" baseline="0" dirty="0">
                 <a:ln>
                   <a:noFill/>
                 </a:ln>
@@ -4613,61 +4714,10 @@
                   <a:schemeClr val="tx1"/>
                 </a:solidFill>
                 <a:effectLst/>
-                <a:latin typeface="Inter"/>
+                <a:latin typeface="Arial" panose="020B0604020202020204" pitchFamily="34" charset="0"/>
               </a:rPr>
-              <a:t> : On 31 December 2019, WHO was alerted to several cases of pneumonia in Wuhan City, Hubei Province of China.</a:t>
-            </a:r>
-          </a:p>
-          <a:p>
-            <a:r>
-              <a:rPr lang="en-US" sz="1000" b="0" i="0" dirty="0">
-                <a:effectLst/>
-                <a:latin typeface="Inter"/>
-              </a:rPr>
-              <a:t>Note: 2019 Novel Coronavirus (2019-nCoV) is a virus (more specifically, a coronavirus) identified as the cause of an outbreak of respiratory illness first detected in Wuhan, China. </a:t>
-            </a:r>
-            <a:endParaRPr lang="en-US" sz="1000" dirty="0"/>
-          </a:p>
-          <a:p>
-            <a:pPr marL="0" marR="0" lvl="0" indent="0" algn="l" defTabSz="914400" rtl="0" eaLnBrk="0" fontAlgn="base" latinLnBrk="0" hangingPunct="0">
-              <a:lnSpc>
-                <a:spcPct val="100000"/>
-              </a:lnSpc>
-              <a:spcBef>
-                <a:spcPct val="0"/>
-              </a:spcBef>
-              <a:spcAft>
-                <a:spcPct val="0"/>
-              </a:spcAft>
-              <a:buClrTx/>
-              <a:buSzTx/>
-              <a:buFontTx/>
-              <a:buNone/>
-              <a:tabLst/>
-            </a:pPr>
-            <a:r>
-              <a:rPr kumimoji="0" lang="en-US" altLang="en-US" sz="1000" b="0" i="0" u="none" strike="noStrike" cap="none" normalizeH="0" baseline="0" dirty="0">
-                <a:ln>
-                  <a:noFill/>
-                </a:ln>
-                <a:solidFill>
-                  <a:schemeClr val="tx1"/>
-                </a:solidFill>
-                <a:effectLst/>
-                <a:latin typeface="Inter"/>
-              </a:rPr>
-              <a:t> </a:t>
-            </a:r>
-            <a:endParaRPr kumimoji="0" lang="en-US" altLang="en-US" sz="1800" b="0" i="0" u="none" strike="noStrike" cap="none" normalizeH="0" baseline="0" dirty="0">
-              <a:ln>
-                <a:noFill/>
-              </a:ln>
-              <a:solidFill>
-                <a:schemeClr val="tx1"/>
-              </a:solidFill>
-              <a:effectLst/>
-              <a:latin typeface="Arial" panose="020B0604020202020204" pitchFamily="34" charset="0"/>
-            </a:endParaRPr>
+              <a:t>Note: China reported 17 deaths on January 22, 2020.  </a:t>
+            </a:r>
           </a:p>
         </p:txBody>
       </p:sp>
@@ -4743,7 +4793,7 @@
           <p:nvPr/>
         </p:nvPicPr>
         <p:blipFill>
-          <a:blip r:embed="rId4">
+          <a:blip r:embed="rId3">
             <a:extLst>
               <a:ext uri="{28A0092B-C50C-407E-A947-70E740481C1C}">
                 <a14:useLocalDpi xmlns:a14="http://schemas.microsoft.com/office/drawing/2010/main" val="0"/>
@@ -5578,7 +5628,7 @@
           <p:nvPr/>
         </p:nvPicPr>
         <p:blipFill>
-          <a:blip r:embed="rId2">
+          <a:blip r:embed="rId3">
             <a:extLst>
               <a:ext uri="{28A0092B-C50C-407E-A947-70E740481C1C}">
                 <a14:useLocalDpi xmlns:a14="http://schemas.microsoft.com/office/drawing/2010/main" val="0"/>

</xml_diff>

<commit_message>
added Revathi's slides to the power point file
</commit_message>
<xml_diff>
--- a/Clay/Novel_Corona_Virus_2019_v2.pptx
+++ b/Clay/Novel_Corona_Virus_2019_v2.pptx
@@ -5,10 +5,10 @@
     <p:sldMasterId id="2147483648" r:id="rId1"/>
   </p:sldMasterIdLst>
   <p:notesMasterIdLst>
-    <p:notesMasterId r:id="rId16"/>
+    <p:notesMasterId r:id="rId19"/>
   </p:notesMasterIdLst>
   <p:handoutMasterIdLst>
-    <p:handoutMasterId r:id="rId17"/>
+    <p:handoutMasterId r:id="rId20"/>
   </p:handoutMasterIdLst>
   <p:sldIdLst>
     <p:sldId id="256" r:id="rId2"/>
@@ -24,7 +24,10 @@
     <p:sldId id="270" r:id="rId12"/>
     <p:sldId id="271" r:id="rId13"/>
     <p:sldId id="268" r:id="rId14"/>
-    <p:sldId id="265" r:id="rId15"/>
+    <p:sldId id="272" r:id="rId15"/>
+    <p:sldId id="273" r:id="rId16"/>
+    <p:sldId id="274" r:id="rId17"/>
+    <p:sldId id="265" r:id="rId18"/>
   </p:sldIdLst>
   <p:sldSz cx="12192000" cy="6858000"/>
   <p:notesSz cx="6858000" cy="9144000"/>
@@ -125,7 +128,18 @@
   </p:defaultTextStyle>
   <p:extLst>
     <p:ext uri="{EFAFB233-063F-42B5-8137-9DF3F51BA10A}">
-      <p15:sldGuideLst xmlns:p15="http://schemas.microsoft.com/office/powerpoint/2012/main"/>
+      <p15:sldGuideLst xmlns:p15="http://schemas.microsoft.com/office/powerpoint/2012/main">
+        <p15:guide id="1" orient="horz" pos="1224" userDrawn="1">
+          <p15:clr>
+            <a:srgbClr val="A4A3A4"/>
+          </p15:clr>
+        </p15:guide>
+        <p15:guide id="2" pos="3840" userDrawn="1">
+          <p15:clr>
+            <a:srgbClr val="A4A3A4"/>
+          </p15:clr>
+        </p15:guide>
+      </p15:sldGuideLst>
     </p:ext>
   </p:extLst>
 </p:presentation>
@@ -1065,6 +1079,189 @@
     <p:extLst>
       <p:ext uri="{BB962C8B-B14F-4D97-AF65-F5344CB8AC3E}">
         <p14:creationId xmlns:p14="http://schemas.microsoft.com/office/powerpoint/2010/main" val="2545437872"/>
+      </p:ext>
+    </p:extLst>
+  </p:cSld>
+  <p:clrMapOvr>
+    <a:masterClrMapping/>
+  </p:clrMapOvr>
+</p:notes>
+</file>
+
+<file path=ppt/notesSlides/notesSlide5.xml><?xml version="1.0" encoding="utf-8"?>
+<p:notes xmlns:a="http://schemas.openxmlformats.org/drawingml/2006/main" xmlns:r="http://schemas.openxmlformats.org/officeDocument/2006/relationships" xmlns:p="http://schemas.openxmlformats.org/presentationml/2006/main">
+  <p:cSld>
+    <p:spTree>
+      <p:nvGrpSpPr>
+        <p:cNvPr id="1" name=""/>
+        <p:cNvGrpSpPr/>
+        <p:nvPr/>
+      </p:nvGrpSpPr>
+      <p:grpSpPr>
+        <a:xfrm>
+          <a:off x="0" y="0"/>
+          <a:ext cx="0" cy="0"/>
+          <a:chOff x="0" y="0"/>
+          <a:chExt cx="0" cy="0"/>
+        </a:xfrm>
+      </p:grpSpPr>
+      <p:sp>
+        <p:nvSpPr>
+          <p:cNvPr id="2" name="Slide Image Placeholder 1"/>
+          <p:cNvSpPr>
+            <a:spLocks noGrp="1" noRot="1" noChangeAspect="1"/>
+          </p:cNvSpPr>
+          <p:nvPr>
+            <p:ph type="sldImg"/>
+          </p:nvPr>
+        </p:nvSpPr>
+        <p:spPr/>
+      </p:sp>
+      <p:sp>
+        <p:nvSpPr>
+          <p:cNvPr id="3" name="Notes Placeholder 2"/>
+          <p:cNvSpPr>
+            <a:spLocks noGrp="1"/>
+          </p:cNvSpPr>
+          <p:nvPr>
+            <p:ph type="body" idx="1"/>
+          </p:nvPr>
+        </p:nvSpPr>
+        <p:spPr/>
+        <p:txBody>
+          <a:bodyPr/>
+          <a:lstStyle/>
+          <a:p>
+            <a:endParaRPr lang="en-US" dirty="0"/>
+          </a:p>
+        </p:txBody>
+      </p:sp>
+    </p:spTree>
+    <p:extLst>
+      <p:ext uri="{BB962C8B-B14F-4D97-AF65-F5344CB8AC3E}">
+        <p14:creationId xmlns:p14="http://schemas.microsoft.com/office/powerpoint/2010/main" val="1718413972"/>
+      </p:ext>
+    </p:extLst>
+  </p:cSld>
+  <p:clrMapOvr>
+    <a:masterClrMapping/>
+  </p:clrMapOvr>
+</p:notes>
+</file>
+
+<file path=ppt/notesSlides/notesSlide6.xml><?xml version="1.0" encoding="utf-8"?>
+<p:notes xmlns:a="http://schemas.openxmlformats.org/drawingml/2006/main" xmlns:r="http://schemas.openxmlformats.org/officeDocument/2006/relationships" xmlns:p="http://schemas.openxmlformats.org/presentationml/2006/main">
+  <p:cSld>
+    <p:spTree>
+      <p:nvGrpSpPr>
+        <p:cNvPr id="1" name=""/>
+        <p:cNvGrpSpPr/>
+        <p:nvPr/>
+      </p:nvGrpSpPr>
+      <p:grpSpPr>
+        <a:xfrm>
+          <a:off x="0" y="0"/>
+          <a:ext cx="0" cy="0"/>
+          <a:chOff x="0" y="0"/>
+          <a:chExt cx="0" cy="0"/>
+        </a:xfrm>
+      </p:grpSpPr>
+      <p:sp>
+        <p:nvSpPr>
+          <p:cNvPr id="2" name="Slide Image Placeholder 1"/>
+          <p:cNvSpPr>
+            <a:spLocks noGrp="1" noRot="1" noChangeAspect="1"/>
+          </p:cNvSpPr>
+          <p:nvPr>
+            <p:ph type="sldImg"/>
+          </p:nvPr>
+        </p:nvSpPr>
+        <p:spPr/>
+      </p:sp>
+      <p:sp>
+        <p:nvSpPr>
+          <p:cNvPr id="3" name="Notes Placeholder 2"/>
+          <p:cNvSpPr>
+            <a:spLocks noGrp="1"/>
+          </p:cNvSpPr>
+          <p:nvPr>
+            <p:ph type="body" idx="1"/>
+          </p:nvPr>
+        </p:nvSpPr>
+        <p:spPr/>
+        <p:txBody>
+          <a:bodyPr/>
+          <a:lstStyle/>
+          <a:p>
+            <a:endParaRPr lang="en-US" dirty="0"/>
+          </a:p>
+        </p:txBody>
+      </p:sp>
+    </p:spTree>
+    <p:extLst>
+      <p:ext uri="{BB962C8B-B14F-4D97-AF65-F5344CB8AC3E}">
+        <p14:creationId xmlns:p14="http://schemas.microsoft.com/office/powerpoint/2010/main" val="1115554497"/>
+      </p:ext>
+    </p:extLst>
+  </p:cSld>
+  <p:clrMapOvr>
+    <a:masterClrMapping/>
+  </p:clrMapOvr>
+</p:notes>
+</file>
+
+<file path=ppt/notesSlides/notesSlide7.xml><?xml version="1.0" encoding="utf-8"?>
+<p:notes xmlns:a="http://schemas.openxmlformats.org/drawingml/2006/main" xmlns:r="http://schemas.openxmlformats.org/officeDocument/2006/relationships" xmlns:p="http://schemas.openxmlformats.org/presentationml/2006/main">
+  <p:cSld>
+    <p:spTree>
+      <p:nvGrpSpPr>
+        <p:cNvPr id="1" name=""/>
+        <p:cNvGrpSpPr/>
+        <p:nvPr/>
+      </p:nvGrpSpPr>
+      <p:grpSpPr>
+        <a:xfrm>
+          <a:off x="0" y="0"/>
+          <a:ext cx="0" cy="0"/>
+          <a:chOff x="0" y="0"/>
+          <a:chExt cx="0" cy="0"/>
+        </a:xfrm>
+      </p:grpSpPr>
+      <p:sp>
+        <p:nvSpPr>
+          <p:cNvPr id="2" name="Slide Image Placeholder 1"/>
+          <p:cNvSpPr>
+            <a:spLocks noGrp="1" noRot="1" noChangeAspect="1"/>
+          </p:cNvSpPr>
+          <p:nvPr>
+            <p:ph type="sldImg"/>
+          </p:nvPr>
+        </p:nvSpPr>
+        <p:spPr/>
+      </p:sp>
+      <p:sp>
+        <p:nvSpPr>
+          <p:cNvPr id="3" name="Notes Placeholder 2"/>
+          <p:cNvSpPr>
+            <a:spLocks noGrp="1"/>
+          </p:cNvSpPr>
+          <p:nvPr>
+            <p:ph type="body" idx="1"/>
+          </p:nvPr>
+        </p:nvSpPr>
+        <p:spPr/>
+        <p:txBody>
+          <a:bodyPr/>
+          <a:lstStyle/>
+          <a:p>
+            <a:endParaRPr lang="en-US" dirty="0"/>
+          </a:p>
+        </p:txBody>
+      </p:sp>
+    </p:spTree>
+    <p:extLst>
+      <p:ext uri="{BB962C8B-B14F-4D97-AF65-F5344CB8AC3E}">
+        <p14:creationId xmlns:p14="http://schemas.microsoft.com/office/powerpoint/2010/main" val="51945713"/>
       </p:ext>
     </p:extLst>
   </p:cSld>
@@ -5458,7 +5655,7 @@
         </p:blipFill>
         <p:spPr>
           <a:xfrm>
-            <a:off x="838200" y="1829735"/>
+            <a:off x="871251" y="1796684"/>
             <a:ext cx="4838603" cy="3198529"/>
           </a:xfrm>
           <a:prstGeom prst="rect">
@@ -5494,7 +5691,7 @@
         </p:blipFill>
         <p:spPr>
           <a:xfrm>
-            <a:off x="6029325" y="1880925"/>
+            <a:off x="6038563" y="1884820"/>
             <a:ext cx="5210175" cy="3346428"/>
           </a:xfrm>
           <a:prstGeom prst="rect">
@@ -5550,7 +5747,7 @@
         </p:nvSpPr>
         <p:spPr>
           <a:xfrm>
-            <a:off x="838200" y="212726"/>
+            <a:off x="838200" y="349662"/>
             <a:ext cx="10515600" cy="1111250"/>
           </a:xfrm>
         </p:spPr>
@@ -5563,11 +5760,11 @@
             <a:pPr algn="ctr"/>
             <a:r>
               <a:rPr lang="en-US" sz="4400" dirty="0"/>
-              <a:t>Covid-19 Cumulative Global </a:t>
+              <a:t>Covid-19 V</a:t>
             </a:r>
             <a:r>
               <a:rPr lang="en-US" dirty="0"/>
-              <a:t>Cases</a:t>
+              <a:t>accine Percentages</a:t>
             </a:r>
           </a:p>
         </p:txBody>
@@ -5765,6 +5962,1255 @@
                 <a:defRPr/>
               </a:pPr>
               <a:t>14</a:t>
+            </a:fld>
+            <a:endParaRPr kumimoji="0" lang="en-US" sz="1200" b="0" i="0" u="none" strike="noStrike" kern="1200" cap="none" spc="0" normalizeH="0" baseline="0" noProof="0">
+              <a:ln>
+                <a:noFill/>
+              </a:ln>
+              <a:solidFill>
+                <a:prstClr val="black">
+                  <a:tint val="75000"/>
+                </a:prstClr>
+              </a:solidFill>
+              <a:effectLst/>
+              <a:uLnTx/>
+              <a:uFillTx/>
+              <a:latin typeface="Calibri" panose="020F0502020204030204"/>
+              <a:ea typeface="+mn-ea"/>
+              <a:cs typeface="+mn-cs"/>
+            </a:endParaRPr>
+          </a:p>
+        </p:txBody>
+      </p:sp>
+      <p:pic>
+        <p:nvPicPr>
+          <p:cNvPr id="6" name="Picture 5">
+            <a:extLst>
+              <a:ext uri="{FF2B5EF4-FFF2-40B4-BE49-F238E27FC236}">
+                <a16:creationId xmlns:a16="http://schemas.microsoft.com/office/drawing/2014/main" id="{80982774-A597-4DF6-BCA4-AEA54AA35967}"/>
+              </a:ext>
+            </a:extLst>
+          </p:cNvPr>
+          <p:cNvPicPr>
+            <a:picLocks noChangeAspect="1"/>
+          </p:cNvPicPr>
+          <p:nvPr/>
+        </p:nvPicPr>
+        <p:blipFill>
+          <a:blip r:embed="rId3">
+            <a:extLst>
+              <a:ext uri="{28A0092B-C50C-407E-A947-70E740481C1C}">
+                <a14:useLocalDpi xmlns:a14="http://schemas.microsoft.com/office/drawing/2010/main" val="0"/>
+              </a:ext>
+            </a:extLst>
+          </a:blip>
+          <a:stretch>
+            <a:fillRect/>
+          </a:stretch>
+        </p:blipFill>
+        <p:spPr>
+          <a:xfrm>
+            <a:off x="480930" y="1946446"/>
+            <a:ext cx="5104762" cy="3339682"/>
+          </a:xfrm>
+          <a:prstGeom prst="rect">
+            <a:avLst/>
+          </a:prstGeom>
+        </p:spPr>
+      </p:pic>
+      <p:pic>
+        <p:nvPicPr>
+          <p:cNvPr id="11" name="Picture 10">
+            <a:extLst>
+              <a:ext uri="{FF2B5EF4-FFF2-40B4-BE49-F238E27FC236}">
+                <a16:creationId xmlns:a16="http://schemas.microsoft.com/office/drawing/2014/main" id="{0F44DAAD-D48C-42AB-9831-47EEE39672B7}"/>
+              </a:ext>
+            </a:extLst>
+          </p:cNvPr>
+          <p:cNvPicPr>
+            <a:picLocks noChangeAspect="1"/>
+          </p:cNvPicPr>
+          <p:nvPr/>
+        </p:nvPicPr>
+        <p:blipFill>
+          <a:blip r:embed="rId4">
+            <a:extLst>
+              <a:ext uri="{28A0092B-C50C-407E-A947-70E740481C1C}">
+                <a14:useLocalDpi xmlns:a14="http://schemas.microsoft.com/office/drawing/2010/main" val="0"/>
+              </a:ext>
+            </a:extLst>
+          </a:blip>
+          <a:stretch>
+            <a:fillRect/>
+          </a:stretch>
+        </p:blipFill>
+        <p:spPr>
+          <a:xfrm>
+            <a:off x="5867801" y="1946446"/>
+            <a:ext cx="5193651" cy="3339682"/>
+          </a:xfrm>
+          <a:prstGeom prst="rect">
+            <a:avLst/>
+          </a:prstGeom>
+        </p:spPr>
+      </p:pic>
+      <p:sp>
+        <p:nvSpPr>
+          <p:cNvPr id="12" name="Title 3">
+            <a:extLst>
+              <a:ext uri="{FF2B5EF4-FFF2-40B4-BE49-F238E27FC236}">
+                <a16:creationId xmlns:a16="http://schemas.microsoft.com/office/drawing/2014/main" id="{1414C255-562E-4271-8249-5606B21DB05D}"/>
+              </a:ext>
+            </a:extLst>
+          </p:cNvPr>
+          <p:cNvSpPr txBox="1">
+            <a:spLocks/>
+          </p:cNvSpPr>
+          <p:nvPr/>
+        </p:nvSpPr>
+        <p:spPr>
+          <a:xfrm>
+            <a:off x="2209801" y="1538820"/>
+            <a:ext cx="2180421" cy="485573"/>
+          </a:xfrm>
+          <a:prstGeom prst="rect">
+            <a:avLst/>
+          </a:prstGeom>
+        </p:spPr>
+        <p:txBody>
+          <a:bodyPr vert="horz" lIns="91440" tIns="45720" rIns="91440" bIns="45720" rtlCol="0" anchor="ctr">
+            <a:normAutofit fontScale="97500"/>
+          </a:bodyPr>
+          <a:lstStyle>
+            <a:lvl1pPr algn="l" defTabSz="914400" rtl="0" eaLnBrk="1" latinLnBrk="0" hangingPunct="1">
+              <a:lnSpc>
+                <a:spcPct val="90000"/>
+              </a:lnSpc>
+              <a:spcBef>
+                <a:spcPct val="0"/>
+              </a:spcBef>
+              <a:buNone/>
+              <a:defRPr sz="4400" kern="1200">
+                <a:solidFill>
+                  <a:schemeClr val="tx1"/>
+                </a:solidFill>
+                <a:latin typeface="+mj-lt"/>
+                <a:ea typeface="+mj-ea"/>
+                <a:cs typeface="+mj-cs"/>
+              </a:defRPr>
+            </a:lvl1pPr>
+          </a:lstStyle>
+          <a:p>
+            <a:pPr algn="ctr"/>
+            <a:r>
+              <a:rPr lang="en-US" sz="2000" dirty="0"/>
+              <a:t>Full Vaccinations</a:t>
+            </a:r>
+          </a:p>
+        </p:txBody>
+      </p:sp>
+      <p:sp>
+        <p:nvSpPr>
+          <p:cNvPr id="16" name="Title 3">
+            <a:extLst>
+              <a:ext uri="{FF2B5EF4-FFF2-40B4-BE49-F238E27FC236}">
+                <a16:creationId xmlns:a16="http://schemas.microsoft.com/office/drawing/2014/main" id="{0596959A-F775-4ABD-B5C9-78FC3817EBAD}"/>
+              </a:ext>
+            </a:extLst>
+          </p:cNvPr>
+          <p:cNvSpPr txBox="1">
+            <a:spLocks/>
+          </p:cNvSpPr>
+          <p:nvPr/>
+        </p:nvSpPr>
+        <p:spPr>
+          <a:xfrm>
+            <a:off x="7096699" y="1553381"/>
+            <a:ext cx="3447362" cy="485573"/>
+          </a:xfrm>
+          <a:prstGeom prst="rect">
+            <a:avLst/>
+          </a:prstGeom>
+        </p:spPr>
+        <p:txBody>
+          <a:bodyPr vert="horz" lIns="91440" tIns="45720" rIns="91440" bIns="45720" rtlCol="0" anchor="ctr">
+            <a:normAutofit fontScale="90000"/>
+          </a:bodyPr>
+          <a:lstStyle>
+            <a:lvl1pPr algn="l" defTabSz="914400" rtl="0" eaLnBrk="1" latinLnBrk="0" hangingPunct="1">
+              <a:lnSpc>
+                <a:spcPct val="90000"/>
+              </a:lnSpc>
+              <a:spcBef>
+                <a:spcPct val="0"/>
+              </a:spcBef>
+              <a:buNone/>
+              <a:defRPr sz="4400" kern="1200">
+                <a:solidFill>
+                  <a:schemeClr val="tx1"/>
+                </a:solidFill>
+                <a:latin typeface="+mj-lt"/>
+                <a:ea typeface="+mj-ea"/>
+                <a:cs typeface="+mj-cs"/>
+              </a:defRPr>
+            </a:lvl1pPr>
+          </a:lstStyle>
+          <a:p>
+            <a:pPr algn="ctr"/>
+            <a:r>
+              <a:rPr lang="en-US" sz="2000" dirty="0"/>
+              <a:t>Partial (Single Dose) Vaccinations</a:t>
+            </a:r>
+          </a:p>
+        </p:txBody>
+      </p:sp>
+    </p:spTree>
+    <p:extLst>
+      <p:ext uri="{BB962C8B-B14F-4D97-AF65-F5344CB8AC3E}">
+        <p14:creationId xmlns:p14="http://schemas.microsoft.com/office/powerpoint/2010/main" val="3946359479"/>
+      </p:ext>
+    </p:extLst>
+  </p:cSld>
+  <p:clrMapOvr>
+    <a:masterClrMapping/>
+  </p:clrMapOvr>
+</p:sld>
+</file>
+
+<file path=ppt/slides/slide15.xml><?xml version="1.0" encoding="utf-8"?>
+<p:sld xmlns:a="http://schemas.openxmlformats.org/drawingml/2006/main" xmlns:r="http://schemas.openxmlformats.org/officeDocument/2006/relationships" xmlns:p="http://schemas.openxmlformats.org/presentationml/2006/main">
+  <p:cSld>
+    <p:spTree>
+      <p:nvGrpSpPr>
+        <p:cNvPr id="1" name=""/>
+        <p:cNvGrpSpPr/>
+        <p:nvPr/>
+      </p:nvGrpSpPr>
+      <p:grpSpPr>
+        <a:xfrm>
+          <a:off x="0" y="0"/>
+          <a:ext cx="0" cy="0"/>
+          <a:chOff x="0" y="0"/>
+          <a:chExt cx="0" cy="0"/>
+        </a:xfrm>
+      </p:grpSpPr>
+      <p:sp>
+        <p:nvSpPr>
+          <p:cNvPr id="4" name="Title 3">
+            <a:extLst>
+              <a:ext uri="{FF2B5EF4-FFF2-40B4-BE49-F238E27FC236}">
+                <a16:creationId xmlns:a16="http://schemas.microsoft.com/office/drawing/2014/main" id="{8DB41184-8C94-46D3-9D80-4AC9E806E8D5}"/>
+              </a:ext>
+            </a:extLst>
+          </p:cNvPr>
+          <p:cNvSpPr>
+            <a:spLocks noGrp="1"/>
+          </p:cNvSpPr>
+          <p:nvPr>
+            <p:ph type="title"/>
+          </p:nvPr>
+        </p:nvSpPr>
+        <p:spPr>
+          <a:xfrm>
+            <a:off x="838200" y="349662"/>
+            <a:ext cx="10515600" cy="1111250"/>
+          </a:xfrm>
+        </p:spPr>
+        <p:txBody>
+          <a:bodyPr>
+            <a:normAutofit/>
+          </a:bodyPr>
+          <a:lstStyle/>
+          <a:p>
+            <a:pPr algn="ctr"/>
+            <a:r>
+              <a:rPr lang="en-US" sz="4400" dirty="0"/>
+              <a:t>Covid-19 V</a:t>
+            </a:r>
+            <a:r>
+              <a:rPr lang="en-US" dirty="0"/>
+              <a:t>accine Percentages</a:t>
+            </a:r>
+          </a:p>
+        </p:txBody>
+      </p:sp>
+      <p:sp>
+        <p:nvSpPr>
+          <p:cNvPr id="7" name="Footer Placeholder 6">
+            <a:extLst>
+              <a:ext uri="{FF2B5EF4-FFF2-40B4-BE49-F238E27FC236}">
+                <a16:creationId xmlns:a16="http://schemas.microsoft.com/office/drawing/2014/main" id="{840787EF-019F-4D4A-9C20-A253BA226D98}"/>
+              </a:ext>
+            </a:extLst>
+          </p:cNvPr>
+          <p:cNvSpPr>
+            <a:spLocks noGrp="1"/>
+          </p:cNvSpPr>
+          <p:nvPr>
+            <p:ph type="ftr" sz="quarter" idx="11"/>
+          </p:nvPr>
+        </p:nvSpPr>
+        <p:spPr/>
+        <p:txBody>
+          <a:bodyPr/>
+          <a:lstStyle/>
+          <a:p>
+            <a:pPr marL="0" marR="0" lvl="0" indent="0" algn="ctr" defTabSz="914400" rtl="0" eaLnBrk="1" fontAlgn="auto" latinLnBrk="0" hangingPunct="1">
+              <a:lnSpc>
+                <a:spcPct val="100000"/>
+              </a:lnSpc>
+              <a:spcBef>
+                <a:spcPts val="0"/>
+              </a:spcBef>
+              <a:spcAft>
+                <a:spcPts val="0"/>
+              </a:spcAft>
+              <a:buClrTx/>
+              <a:buSzTx/>
+              <a:buFontTx/>
+              <a:buNone/>
+              <a:tabLst/>
+              <a:defRPr/>
+            </a:pPr>
+            <a:r>
+              <a:rPr kumimoji="0" lang="en-US" sz="1200" b="0" i="0" u="none" strike="noStrike" kern="1200" cap="none" spc="0" normalizeH="0" baseline="0" noProof="0">
+                <a:ln>
+                  <a:noFill/>
+                </a:ln>
+                <a:solidFill>
+                  <a:prstClr val="black">
+                    <a:tint val="75000"/>
+                  </a:prstClr>
+                </a:solidFill>
+                <a:effectLst/>
+                <a:uLnTx/>
+                <a:uFillTx/>
+                <a:latin typeface="Calibri" panose="020F0502020204030204"/>
+                <a:ea typeface="+mn-ea"/>
+                <a:cs typeface="+mn-cs"/>
+              </a:rPr>
+              <a:t>https://github.com/makbarish/Grp5_Project1_Covid19</a:t>
+            </a:r>
+          </a:p>
+        </p:txBody>
+      </p:sp>
+      <p:sp>
+        <p:nvSpPr>
+          <p:cNvPr id="2" name="Date Placeholder 1">
+            <a:extLst>
+              <a:ext uri="{FF2B5EF4-FFF2-40B4-BE49-F238E27FC236}">
+                <a16:creationId xmlns:a16="http://schemas.microsoft.com/office/drawing/2014/main" id="{A346B64B-8A1C-43A1-84CB-2D58DBBC7959}"/>
+              </a:ext>
+            </a:extLst>
+          </p:cNvPr>
+          <p:cNvSpPr>
+            <a:spLocks noGrp="1"/>
+          </p:cNvSpPr>
+          <p:nvPr>
+            <p:ph type="dt" sz="half" idx="10"/>
+          </p:nvPr>
+        </p:nvSpPr>
+        <p:spPr/>
+        <p:txBody>
+          <a:bodyPr/>
+          <a:lstStyle/>
+          <a:p>
+            <a:pPr marL="0" marR="0" lvl="0" indent="0" algn="l" defTabSz="914400" rtl="0" eaLnBrk="1" fontAlgn="auto" latinLnBrk="0" hangingPunct="1">
+              <a:lnSpc>
+                <a:spcPct val="100000"/>
+              </a:lnSpc>
+              <a:spcBef>
+                <a:spcPts val="0"/>
+              </a:spcBef>
+              <a:spcAft>
+                <a:spcPts val="0"/>
+              </a:spcAft>
+              <a:buClrTx/>
+              <a:buSzTx/>
+              <a:buFontTx/>
+              <a:buNone/>
+              <a:tabLst/>
+              <a:defRPr/>
+            </a:pPr>
+            <a:r>
+              <a:rPr kumimoji="0" lang="en-US" sz="1200" b="0" i="0" u="none" strike="noStrike" kern="1200" cap="none" spc="0" normalizeH="0" baseline="0" noProof="0">
+                <a:ln>
+                  <a:noFill/>
+                </a:ln>
+                <a:solidFill>
+                  <a:prstClr val="black">
+                    <a:tint val="75000"/>
+                  </a:prstClr>
+                </a:solidFill>
+                <a:effectLst/>
+                <a:uLnTx/>
+                <a:uFillTx/>
+                <a:latin typeface="Calibri" panose="020F0502020204030204"/>
+                <a:ea typeface="+mn-ea"/>
+                <a:cs typeface="+mn-cs"/>
+              </a:rPr>
+              <a:t>6/9/2021</a:t>
+            </a:r>
+          </a:p>
+        </p:txBody>
+      </p:sp>
+      <p:sp>
+        <p:nvSpPr>
+          <p:cNvPr id="3" name="Slide Number Placeholder 2">
+            <a:extLst>
+              <a:ext uri="{FF2B5EF4-FFF2-40B4-BE49-F238E27FC236}">
+                <a16:creationId xmlns:a16="http://schemas.microsoft.com/office/drawing/2014/main" id="{0AB42B2B-D6AE-4A28-9832-61266DCC28CC}"/>
+              </a:ext>
+            </a:extLst>
+          </p:cNvPr>
+          <p:cNvSpPr>
+            <a:spLocks noGrp="1"/>
+          </p:cNvSpPr>
+          <p:nvPr>
+            <p:ph type="sldNum" sz="quarter" idx="12"/>
+          </p:nvPr>
+        </p:nvSpPr>
+        <p:spPr/>
+        <p:txBody>
+          <a:bodyPr/>
+          <a:lstStyle/>
+          <a:p>
+            <a:pPr marL="0" marR="0" lvl="0" indent="0" algn="r" defTabSz="914400" rtl="0" eaLnBrk="1" fontAlgn="auto" latinLnBrk="0" hangingPunct="1">
+              <a:lnSpc>
+                <a:spcPct val="100000"/>
+              </a:lnSpc>
+              <a:spcBef>
+                <a:spcPts val="0"/>
+              </a:spcBef>
+              <a:spcAft>
+                <a:spcPts val="0"/>
+              </a:spcAft>
+              <a:buClrTx/>
+              <a:buSzTx/>
+              <a:buFontTx/>
+              <a:buNone/>
+              <a:tabLst/>
+              <a:defRPr/>
+            </a:pPr>
+            <a:fld id="{3AA9003C-6A8E-4863-AB7A-EC3E1B799067}" type="slidenum">
+              <a:rPr kumimoji="0" lang="en-US" sz="1200" b="0" i="0" u="none" strike="noStrike" kern="1200" cap="none" spc="0" normalizeH="0" baseline="0" noProof="0" smtClean="0">
+                <a:ln>
+                  <a:noFill/>
+                </a:ln>
+                <a:solidFill>
+                  <a:prstClr val="black">
+                    <a:tint val="75000"/>
+                  </a:prstClr>
+                </a:solidFill>
+                <a:effectLst/>
+                <a:uLnTx/>
+                <a:uFillTx/>
+                <a:latin typeface="Calibri" panose="020F0502020204030204"/>
+                <a:ea typeface="+mn-ea"/>
+                <a:cs typeface="+mn-cs"/>
+              </a:rPr>
+              <a:pPr marL="0" marR="0" lvl="0" indent="0" algn="r" defTabSz="914400" rtl="0" eaLnBrk="1" fontAlgn="auto" latinLnBrk="0" hangingPunct="1">
+                <a:lnSpc>
+                  <a:spcPct val="100000"/>
+                </a:lnSpc>
+                <a:spcBef>
+                  <a:spcPts val="0"/>
+                </a:spcBef>
+                <a:spcAft>
+                  <a:spcPts val="0"/>
+                </a:spcAft>
+                <a:buClrTx/>
+                <a:buSzTx/>
+                <a:buFontTx/>
+                <a:buNone/>
+                <a:tabLst/>
+                <a:defRPr/>
+              </a:pPr>
+              <a:t>15</a:t>
+            </a:fld>
+            <a:endParaRPr kumimoji="0" lang="en-US" sz="1200" b="0" i="0" u="none" strike="noStrike" kern="1200" cap="none" spc="0" normalizeH="0" baseline="0" noProof="0">
+              <a:ln>
+                <a:noFill/>
+              </a:ln>
+              <a:solidFill>
+                <a:prstClr val="black">
+                  <a:tint val="75000"/>
+                </a:prstClr>
+              </a:solidFill>
+              <a:effectLst/>
+              <a:uLnTx/>
+              <a:uFillTx/>
+              <a:latin typeface="Calibri" panose="020F0502020204030204"/>
+              <a:ea typeface="+mn-ea"/>
+              <a:cs typeface="+mn-cs"/>
+            </a:endParaRPr>
+          </a:p>
+        </p:txBody>
+      </p:sp>
+      <p:pic>
+        <p:nvPicPr>
+          <p:cNvPr id="8" name="Picture 7">
+            <a:extLst>
+              <a:ext uri="{FF2B5EF4-FFF2-40B4-BE49-F238E27FC236}">
+                <a16:creationId xmlns:a16="http://schemas.microsoft.com/office/drawing/2014/main" id="{C76F8A2B-78AF-4E36-8074-C27EBDFDA220}"/>
+              </a:ext>
+            </a:extLst>
+          </p:cNvPr>
+          <p:cNvPicPr>
+            <a:picLocks noChangeAspect="1"/>
+          </p:cNvPicPr>
+          <p:nvPr/>
+        </p:nvPicPr>
+        <p:blipFill>
+          <a:blip r:embed="rId3">
+            <a:extLst>
+              <a:ext uri="{28A0092B-C50C-407E-A947-70E740481C1C}">
+                <a14:useLocalDpi xmlns:a14="http://schemas.microsoft.com/office/drawing/2010/main" val="0"/>
+              </a:ext>
+            </a:extLst>
+          </a:blip>
+          <a:stretch>
+            <a:fillRect/>
+          </a:stretch>
+        </p:blipFill>
+        <p:spPr>
+          <a:xfrm>
+            <a:off x="629571" y="2038954"/>
+            <a:ext cx="4939682" cy="3326984"/>
+          </a:xfrm>
+          <a:prstGeom prst="rect">
+            <a:avLst/>
+          </a:prstGeom>
+        </p:spPr>
+      </p:pic>
+      <p:sp>
+        <p:nvSpPr>
+          <p:cNvPr id="14" name="Title 3">
+            <a:extLst>
+              <a:ext uri="{FF2B5EF4-FFF2-40B4-BE49-F238E27FC236}">
+                <a16:creationId xmlns:a16="http://schemas.microsoft.com/office/drawing/2014/main" id="{6C5C848E-0ADF-4767-8C04-46FD377E0E28}"/>
+              </a:ext>
+            </a:extLst>
+          </p:cNvPr>
+          <p:cNvSpPr txBox="1">
+            <a:spLocks/>
+          </p:cNvSpPr>
+          <p:nvPr/>
+        </p:nvSpPr>
+        <p:spPr>
+          <a:xfrm>
+            <a:off x="2209801" y="1538820"/>
+            <a:ext cx="2180421" cy="485573"/>
+          </a:xfrm>
+          <a:prstGeom prst="rect">
+            <a:avLst/>
+          </a:prstGeom>
+        </p:spPr>
+        <p:txBody>
+          <a:bodyPr vert="horz" lIns="91440" tIns="45720" rIns="91440" bIns="45720" rtlCol="0" anchor="ctr">
+            <a:normAutofit fontScale="97500"/>
+          </a:bodyPr>
+          <a:lstStyle>
+            <a:lvl1pPr algn="l" defTabSz="914400" rtl="0" eaLnBrk="1" latinLnBrk="0" hangingPunct="1">
+              <a:lnSpc>
+                <a:spcPct val="90000"/>
+              </a:lnSpc>
+              <a:spcBef>
+                <a:spcPct val="0"/>
+              </a:spcBef>
+              <a:buNone/>
+              <a:defRPr sz="4400" kern="1200">
+                <a:solidFill>
+                  <a:schemeClr val="tx1"/>
+                </a:solidFill>
+                <a:latin typeface="+mj-lt"/>
+                <a:ea typeface="+mj-ea"/>
+                <a:cs typeface="+mj-cs"/>
+              </a:defRPr>
+            </a:lvl1pPr>
+          </a:lstStyle>
+          <a:p>
+            <a:pPr algn="ctr"/>
+            <a:r>
+              <a:rPr lang="en-US" sz="2000" dirty="0"/>
+              <a:t>Full Vaccinations</a:t>
+            </a:r>
+          </a:p>
+        </p:txBody>
+      </p:sp>
+      <p:pic>
+        <p:nvPicPr>
+          <p:cNvPr id="10" name="Picture 9">
+            <a:extLst>
+              <a:ext uri="{FF2B5EF4-FFF2-40B4-BE49-F238E27FC236}">
+                <a16:creationId xmlns:a16="http://schemas.microsoft.com/office/drawing/2014/main" id="{84AD14BF-DE84-4639-B7C5-6541C1B1F008}"/>
+              </a:ext>
+            </a:extLst>
+          </p:cNvPr>
+          <p:cNvPicPr>
+            <a:picLocks noChangeAspect="1"/>
+          </p:cNvPicPr>
+          <p:nvPr/>
+        </p:nvPicPr>
+        <p:blipFill>
+          <a:blip r:embed="rId4">
+            <a:extLst>
+              <a:ext uri="{28A0092B-C50C-407E-A947-70E740481C1C}">
+                <a14:useLocalDpi xmlns:a14="http://schemas.microsoft.com/office/drawing/2010/main" val="0"/>
+              </a:ext>
+            </a:extLst>
+          </a:blip>
+          <a:stretch>
+            <a:fillRect/>
+          </a:stretch>
+        </p:blipFill>
+        <p:spPr>
+          <a:xfrm>
+            <a:off x="5917668" y="2000859"/>
+            <a:ext cx="4939682" cy="3365079"/>
+          </a:xfrm>
+          <a:prstGeom prst="rect">
+            <a:avLst/>
+          </a:prstGeom>
+        </p:spPr>
+      </p:pic>
+      <p:sp>
+        <p:nvSpPr>
+          <p:cNvPr id="15" name="Title 3">
+            <a:extLst>
+              <a:ext uri="{FF2B5EF4-FFF2-40B4-BE49-F238E27FC236}">
+                <a16:creationId xmlns:a16="http://schemas.microsoft.com/office/drawing/2014/main" id="{B86456C2-DC94-4457-97B6-C96649C7DFFC}"/>
+              </a:ext>
+            </a:extLst>
+          </p:cNvPr>
+          <p:cNvSpPr txBox="1">
+            <a:spLocks/>
+          </p:cNvSpPr>
+          <p:nvPr/>
+        </p:nvSpPr>
+        <p:spPr>
+          <a:xfrm>
+            <a:off x="7096699" y="1553381"/>
+            <a:ext cx="3447362" cy="485573"/>
+          </a:xfrm>
+          <a:prstGeom prst="rect">
+            <a:avLst/>
+          </a:prstGeom>
+        </p:spPr>
+        <p:txBody>
+          <a:bodyPr vert="horz" lIns="91440" tIns="45720" rIns="91440" bIns="45720" rtlCol="0" anchor="ctr">
+            <a:normAutofit fontScale="90000"/>
+          </a:bodyPr>
+          <a:lstStyle>
+            <a:lvl1pPr algn="l" defTabSz="914400" rtl="0" eaLnBrk="1" latinLnBrk="0" hangingPunct="1">
+              <a:lnSpc>
+                <a:spcPct val="90000"/>
+              </a:lnSpc>
+              <a:spcBef>
+                <a:spcPct val="0"/>
+              </a:spcBef>
+              <a:buNone/>
+              <a:defRPr sz="4400" kern="1200">
+                <a:solidFill>
+                  <a:schemeClr val="tx1"/>
+                </a:solidFill>
+                <a:latin typeface="+mj-lt"/>
+                <a:ea typeface="+mj-ea"/>
+                <a:cs typeface="+mj-cs"/>
+              </a:defRPr>
+            </a:lvl1pPr>
+          </a:lstStyle>
+          <a:p>
+            <a:pPr algn="ctr"/>
+            <a:r>
+              <a:rPr lang="en-US" sz="2000" dirty="0"/>
+              <a:t>Partial (Single Dose) Vaccinations</a:t>
+            </a:r>
+          </a:p>
+        </p:txBody>
+      </p:sp>
+    </p:spTree>
+    <p:extLst>
+      <p:ext uri="{BB962C8B-B14F-4D97-AF65-F5344CB8AC3E}">
+        <p14:creationId xmlns:p14="http://schemas.microsoft.com/office/powerpoint/2010/main" val="2723266477"/>
+      </p:ext>
+    </p:extLst>
+  </p:cSld>
+  <p:clrMapOvr>
+    <a:masterClrMapping/>
+  </p:clrMapOvr>
+</p:sld>
+</file>
+
+<file path=ppt/slides/slide16.xml><?xml version="1.0" encoding="utf-8"?>
+<p:sld xmlns:a="http://schemas.openxmlformats.org/drawingml/2006/main" xmlns:r="http://schemas.openxmlformats.org/officeDocument/2006/relationships" xmlns:p="http://schemas.openxmlformats.org/presentationml/2006/main">
+  <p:cSld>
+    <p:spTree>
+      <p:nvGrpSpPr>
+        <p:cNvPr id="1" name=""/>
+        <p:cNvGrpSpPr/>
+        <p:nvPr/>
+      </p:nvGrpSpPr>
+      <p:grpSpPr>
+        <a:xfrm>
+          <a:off x="0" y="0"/>
+          <a:ext cx="0" cy="0"/>
+          <a:chOff x="0" y="0"/>
+          <a:chExt cx="0" cy="0"/>
+        </a:xfrm>
+      </p:grpSpPr>
+      <p:sp>
+        <p:nvSpPr>
+          <p:cNvPr id="4" name="Title 3">
+            <a:extLst>
+              <a:ext uri="{FF2B5EF4-FFF2-40B4-BE49-F238E27FC236}">
+                <a16:creationId xmlns:a16="http://schemas.microsoft.com/office/drawing/2014/main" id="{8DB41184-8C94-46D3-9D80-4AC9E806E8D5}"/>
+              </a:ext>
+            </a:extLst>
+          </p:cNvPr>
+          <p:cNvSpPr>
+            <a:spLocks noGrp="1"/>
+          </p:cNvSpPr>
+          <p:nvPr>
+            <p:ph type="title"/>
+          </p:nvPr>
+        </p:nvSpPr>
+        <p:spPr>
+          <a:xfrm>
+            <a:off x="838200" y="349662"/>
+            <a:ext cx="10515600" cy="1111250"/>
+          </a:xfrm>
+        </p:spPr>
+        <p:txBody>
+          <a:bodyPr>
+            <a:normAutofit/>
+          </a:bodyPr>
+          <a:lstStyle/>
+          <a:p>
+            <a:pPr algn="ctr"/>
+            <a:r>
+              <a:rPr lang="en-US" sz="4400" dirty="0"/>
+              <a:t>Covid-19 V</a:t>
+            </a:r>
+            <a:r>
+              <a:rPr lang="en-US" dirty="0"/>
+              <a:t>accine Percentages</a:t>
+            </a:r>
+          </a:p>
+        </p:txBody>
+      </p:sp>
+      <p:sp>
+        <p:nvSpPr>
+          <p:cNvPr id="7" name="Footer Placeholder 6">
+            <a:extLst>
+              <a:ext uri="{FF2B5EF4-FFF2-40B4-BE49-F238E27FC236}">
+                <a16:creationId xmlns:a16="http://schemas.microsoft.com/office/drawing/2014/main" id="{840787EF-019F-4D4A-9C20-A253BA226D98}"/>
+              </a:ext>
+            </a:extLst>
+          </p:cNvPr>
+          <p:cNvSpPr>
+            <a:spLocks noGrp="1"/>
+          </p:cNvSpPr>
+          <p:nvPr>
+            <p:ph type="ftr" sz="quarter" idx="11"/>
+          </p:nvPr>
+        </p:nvSpPr>
+        <p:spPr/>
+        <p:txBody>
+          <a:bodyPr/>
+          <a:lstStyle/>
+          <a:p>
+            <a:pPr marL="0" marR="0" lvl="0" indent="0" algn="ctr" defTabSz="914400" rtl="0" eaLnBrk="1" fontAlgn="auto" latinLnBrk="0" hangingPunct="1">
+              <a:lnSpc>
+                <a:spcPct val="100000"/>
+              </a:lnSpc>
+              <a:spcBef>
+                <a:spcPts val="0"/>
+              </a:spcBef>
+              <a:spcAft>
+                <a:spcPts val="0"/>
+              </a:spcAft>
+              <a:buClrTx/>
+              <a:buSzTx/>
+              <a:buFontTx/>
+              <a:buNone/>
+              <a:tabLst/>
+              <a:defRPr/>
+            </a:pPr>
+            <a:r>
+              <a:rPr kumimoji="0" lang="en-US" sz="1200" b="0" i="0" u="none" strike="noStrike" kern="1200" cap="none" spc="0" normalizeH="0" baseline="0" noProof="0">
+                <a:ln>
+                  <a:noFill/>
+                </a:ln>
+                <a:solidFill>
+                  <a:prstClr val="black">
+                    <a:tint val="75000"/>
+                  </a:prstClr>
+                </a:solidFill>
+                <a:effectLst/>
+                <a:uLnTx/>
+                <a:uFillTx/>
+                <a:latin typeface="Calibri" panose="020F0502020204030204"/>
+                <a:ea typeface="+mn-ea"/>
+                <a:cs typeface="+mn-cs"/>
+              </a:rPr>
+              <a:t>https://github.com/makbarish/Grp5_Project1_Covid19</a:t>
+            </a:r>
+          </a:p>
+        </p:txBody>
+      </p:sp>
+      <p:sp>
+        <p:nvSpPr>
+          <p:cNvPr id="2" name="Date Placeholder 1">
+            <a:extLst>
+              <a:ext uri="{FF2B5EF4-FFF2-40B4-BE49-F238E27FC236}">
+                <a16:creationId xmlns:a16="http://schemas.microsoft.com/office/drawing/2014/main" id="{A346B64B-8A1C-43A1-84CB-2D58DBBC7959}"/>
+              </a:ext>
+            </a:extLst>
+          </p:cNvPr>
+          <p:cNvSpPr>
+            <a:spLocks noGrp="1"/>
+          </p:cNvSpPr>
+          <p:nvPr>
+            <p:ph type="dt" sz="half" idx="10"/>
+          </p:nvPr>
+        </p:nvSpPr>
+        <p:spPr/>
+        <p:txBody>
+          <a:bodyPr/>
+          <a:lstStyle/>
+          <a:p>
+            <a:pPr marL="0" marR="0" lvl="0" indent="0" algn="l" defTabSz="914400" rtl="0" eaLnBrk="1" fontAlgn="auto" latinLnBrk="0" hangingPunct="1">
+              <a:lnSpc>
+                <a:spcPct val="100000"/>
+              </a:lnSpc>
+              <a:spcBef>
+                <a:spcPts val="0"/>
+              </a:spcBef>
+              <a:spcAft>
+                <a:spcPts val="0"/>
+              </a:spcAft>
+              <a:buClrTx/>
+              <a:buSzTx/>
+              <a:buFontTx/>
+              <a:buNone/>
+              <a:tabLst/>
+              <a:defRPr/>
+            </a:pPr>
+            <a:r>
+              <a:rPr kumimoji="0" lang="en-US" sz="1200" b="0" i="0" u="none" strike="noStrike" kern="1200" cap="none" spc="0" normalizeH="0" baseline="0" noProof="0">
+                <a:ln>
+                  <a:noFill/>
+                </a:ln>
+                <a:solidFill>
+                  <a:prstClr val="black">
+                    <a:tint val="75000"/>
+                  </a:prstClr>
+                </a:solidFill>
+                <a:effectLst/>
+                <a:uLnTx/>
+                <a:uFillTx/>
+                <a:latin typeface="Calibri" panose="020F0502020204030204"/>
+                <a:ea typeface="+mn-ea"/>
+                <a:cs typeface="+mn-cs"/>
+              </a:rPr>
+              <a:t>6/9/2021</a:t>
+            </a:r>
+          </a:p>
+        </p:txBody>
+      </p:sp>
+      <p:sp>
+        <p:nvSpPr>
+          <p:cNvPr id="3" name="Slide Number Placeholder 2">
+            <a:extLst>
+              <a:ext uri="{FF2B5EF4-FFF2-40B4-BE49-F238E27FC236}">
+                <a16:creationId xmlns:a16="http://schemas.microsoft.com/office/drawing/2014/main" id="{0AB42B2B-D6AE-4A28-9832-61266DCC28CC}"/>
+              </a:ext>
+            </a:extLst>
+          </p:cNvPr>
+          <p:cNvSpPr>
+            <a:spLocks noGrp="1"/>
+          </p:cNvSpPr>
+          <p:nvPr>
+            <p:ph type="sldNum" sz="quarter" idx="12"/>
+          </p:nvPr>
+        </p:nvSpPr>
+        <p:spPr/>
+        <p:txBody>
+          <a:bodyPr/>
+          <a:lstStyle/>
+          <a:p>
+            <a:pPr marL="0" marR="0" lvl="0" indent="0" algn="r" defTabSz="914400" rtl="0" eaLnBrk="1" fontAlgn="auto" latinLnBrk="0" hangingPunct="1">
+              <a:lnSpc>
+                <a:spcPct val="100000"/>
+              </a:lnSpc>
+              <a:spcBef>
+                <a:spcPts val="0"/>
+              </a:spcBef>
+              <a:spcAft>
+                <a:spcPts val="0"/>
+              </a:spcAft>
+              <a:buClrTx/>
+              <a:buSzTx/>
+              <a:buFontTx/>
+              <a:buNone/>
+              <a:tabLst/>
+              <a:defRPr/>
+            </a:pPr>
+            <a:fld id="{3AA9003C-6A8E-4863-AB7A-EC3E1B799067}" type="slidenum">
+              <a:rPr kumimoji="0" lang="en-US" sz="1200" b="0" i="0" u="none" strike="noStrike" kern="1200" cap="none" spc="0" normalizeH="0" baseline="0" noProof="0" smtClean="0">
+                <a:ln>
+                  <a:noFill/>
+                </a:ln>
+                <a:solidFill>
+                  <a:prstClr val="black">
+                    <a:tint val="75000"/>
+                  </a:prstClr>
+                </a:solidFill>
+                <a:effectLst/>
+                <a:uLnTx/>
+                <a:uFillTx/>
+                <a:latin typeface="Calibri" panose="020F0502020204030204"/>
+                <a:ea typeface="+mn-ea"/>
+                <a:cs typeface="+mn-cs"/>
+              </a:rPr>
+              <a:pPr marL="0" marR="0" lvl="0" indent="0" algn="r" defTabSz="914400" rtl="0" eaLnBrk="1" fontAlgn="auto" latinLnBrk="0" hangingPunct="1">
+                <a:lnSpc>
+                  <a:spcPct val="100000"/>
+                </a:lnSpc>
+                <a:spcBef>
+                  <a:spcPts val="0"/>
+                </a:spcBef>
+                <a:spcAft>
+                  <a:spcPts val="0"/>
+                </a:spcAft>
+                <a:buClrTx/>
+                <a:buSzTx/>
+                <a:buFontTx/>
+                <a:buNone/>
+                <a:tabLst/>
+                <a:defRPr/>
+              </a:pPr>
+              <a:t>16</a:t>
+            </a:fld>
+            <a:endParaRPr kumimoji="0" lang="en-US" sz="1200" b="0" i="0" u="none" strike="noStrike" kern="1200" cap="none" spc="0" normalizeH="0" baseline="0" noProof="0">
+              <a:ln>
+                <a:noFill/>
+              </a:ln>
+              <a:solidFill>
+                <a:prstClr val="black">
+                  <a:tint val="75000"/>
+                </a:prstClr>
+              </a:solidFill>
+              <a:effectLst/>
+              <a:uLnTx/>
+              <a:uFillTx/>
+              <a:latin typeface="Calibri" panose="020F0502020204030204"/>
+              <a:ea typeface="+mn-ea"/>
+              <a:cs typeface="+mn-cs"/>
+            </a:endParaRPr>
+          </a:p>
+        </p:txBody>
+      </p:sp>
+      <p:pic>
+        <p:nvPicPr>
+          <p:cNvPr id="6" name="Picture 5">
+            <a:extLst>
+              <a:ext uri="{FF2B5EF4-FFF2-40B4-BE49-F238E27FC236}">
+                <a16:creationId xmlns:a16="http://schemas.microsoft.com/office/drawing/2014/main" id="{54BDC084-6B29-4E93-932E-A109808D7E0A}"/>
+              </a:ext>
+            </a:extLst>
+          </p:cNvPr>
+          <p:cNvPicPr>
+            <a:picLocks noChangeAspect="1"/>
+          </p:cNvPicPr>
+          <p:nvPr/>
+        </p:nvPicPr>
+        <p:blipFill>
+          <a:blip r:embed="rId3">
+            <a:extLst>
+              <a:ext uri="{28A0092B-C50C-407E-A947-70E740481C1C}">
+                <a14:useLocalDpi xmlns:a14="http://schemas.microsoft.com/office/drawing/2010/main" val="0"/>
+              </a:ext>
+            </a:extLst>
+          </a:blip>
+          <a:stretch>
+            <a:fillRect/>
+          </a:stretch>
+        </p:blipFill>
+        <p:spPr>
+          <a:xfrm>
+            <a:off x="2016088" y="1460912"/>
+            <a:ext cx="7304182" cy="4137301"/>
+          </a:xfrm>
+          <a:prstGeom prst="rect">
+            <a:avLst/>
+          </a:prstGeom>
+        </p:spPr>
+      </p:pic>
+    </p:spTree>
+    <p:extLst>
+      <p:ext uri="{BB962C8B-B14F-4D97-AF65-F5344CB8AC3E}">
+        <p14:creationId xmlns:p14="http://schemas.microsoft.com/office/powerpoint/2010/main" val="505637918"/>
+      </p:ext>
+    </p:extLst>
+  </p:cSld>
+  <p:clrMapOvr>
+    <a:masterClrMapping/>
+  </p:clrMapOvr>
+</p:sld>
+</file>
+
+<file path=ppt/slides/slide17.xml><?xml version="1.0" encoding="utf-8"?>
+<p:sld xmlns:a="http://schemas.openxmlformats.org/drawingml/2006/main" xmlns:r="http://schemas.openxmlformats.org/officeDocument/2006/relationships" xmlns:p="http://schemas.openxmlformats.org/presentationml/2006/main">
+  <p:cSld>
+    <p:spTree>
+      <p:nvGrpSpPr>
+        <p:cNvPr id="1" name=""/>
+        <p:cNvGrpSpPr/>
+        <p:nvPr/>
+      </p:nvGrpSpPr>
+      <p:grpSpPr>
+        <a:xfrm>
+          <a:off x="0" y="0"/>
+          <a:ext cx="0" cy="0"/>
+          <a:chOff x="0" y="0"/>
+          <a:chExt cx="0" cy="0"/>
+        </a:xfrm>
+      </p:grpSpPr>
+      <p:sp>
+        <p:nvSpPr>
+          <p:cNvPr id="4" name="Title 3">
+            <a:extLst>
+              <a:ext uri="{FF2B5EF4-FFF2-40B4-BE49-F238E27FC236}">
+                <a16:creationId xmlns:a16="http://schemas.microsoft.com/office/drawing/2014/main" id="{8DB41184-8C94-46D3-9D80-4AC9E806E8D5}"/>
+              </a:ext>
+            </a:extLst>
+          </p:cNvPr>
+          <p:cNvSpPr>
+            <a:spLocks noGrp="1"/>
+          </p:cNvSpPr>
+          <p:nvPr>
+            <p:ph type="title"/>
+          </p:nvPr>
+        </p:nvSpPr>
+        <p:spPr>
+          <a:xfrm>
+            <a:off x="838200" y="212726"/>
+            <a:ext cx="10515600" cy="1111250"/>
+          </a:xfrm>
+        </p:spPr>
+        <p:txBody>
+          <a:bodyPr>
+            <a:normAutofit/>
+          </a:bodyPr>
+          <a:lstStyle/>
+          <a:p>
+            <a:pPr algn="ctr"/>
+            <a:r>
+              <a:rPr lang="en-US" sz="4400" dirty="0"/>
+              <a:t>Covid-19 Cumulative Global </a:t>
+            </a:r>
+            <a:r>
+              <a:rPr lang="en-US" dirty="0"/>
+              <a:t>Cases</a:t>
+            </a:r>
+          </a:p>
+        </p:txBody>
+      </p:sp>
+      <p:sp>
+        <p:nvSpPr>
+          <p:cNvPr id="7" name="Footer Placeholder 6">
+            <a:extLst>
+              <a:ext uri="{FF2B5EF4-FFF2-40B4-BE49-F238E27FC236}">
+                <a16:creationId xmlns:a16="http://schemas.microsoft.com/office/drawing/2014/main" id="{840787EF-019F-4D4A-9C20-A253BA226D98}"/>
+              </a:ext>
+            </a:extLst>
+          </p:cNvPr>
+          <p:cNvSpPr>
+            <a:spLocks noGrp="1"/>
+          </p:cNvSpPr>
+          <p:nvPr>
+            <p:ph type="ftr" sz="quarter" idx="11"/>
+          </p:nvPr>
+        </p:nvSpPr>
+        <p:spPr/>
+        <p:txBody>
+          <a:bodyPr/>
+          <a:lstStyle/>
+          <a:p>
+            <a:pPr marL="0" marR="0" lvl="0" indent="0" algn="ctr" defTabSz="914400" rtl="0" eaLnBrk="1" fontAlgn="auto" latinLnBrk="0" hangingPunct="1">
+              <a:lnSpc>
+                <a:spcPct val="100000"/>
+              </a:lnSpc>
+              <a:spcBef>
+                <a:spcPts val="0"/>
+              </a:spcBef>
+              <a:spcAft>
+                <a:spcPts val="0"/>
+              </a:spcAft>
+              <a:buClrTx/>
+              <a:buSzTx/>
+              <a:buFontTx/>
+              <a:buNone/>
+              <a:tabLst/>
+              <a:defRPr/>
+            </a:pPr>
+            <a:r>
+              <a:rPr kumimoji="0" lang="en-US" sz="1200" b="0" i="0" u="none" strike="noStrike" kern="1200" cap="none" spc="0" normalizeH="0" baseline="0" noProof="0">
+                <a:ln>
+                  <a:noFill/>
+                </a:ln>
+                <a:solidFill>
+                  <a:prstClr val="black">
+                    <a:tint val="75000"/>
+                  </a:prstClr>
+                </a:solidFill>
+                <a:effectLst/>
+                <a:uLnTx/>
+                <a:uFillTx/>
+                <a:latin typeface="Calibri" panose="020F0502020204030204"/>
+                <a:ea typeface="+mn-ea"/>
+                <a:cs typeface="+mn-cs"/>
+              </a:rPr>
+              <a:t>https://github.com/makbarish/Grp5_Project1_Covid19</a:t>
+            </a:r>
+          </a:p>
+        </p:txBody>
+      </p:sp>
+      <p:sp>
+        <p:nvSpPr>
+          <p:cNvPr id="2" name="Date Placeholder 1">
+            <a:extLst>
+              <a:ext uri="{FF2B5EF4-FFF2-40B4-BE49-F238E27FC236}">
+                <a16:creationId xmlns:a16="http://schemas.microsoft.com/office/drawing/2014/main" id="{A346B64B-8A1C-43A1-84CB-2D58DBBC7959}"/>
+              </a:ext>
+            </a:extLst>
+          </p:cNvPr>
+          <p:cNvSpPr>
+            <a:spLocks noGrp="1"/>
+          </p:cNvSpPr>
+          <p:nvPr>
+            <p:ph type="dt" sz="half" idx="10"/>
+          </p:nvPr>
+        </p:nvSpPr>
+        <p:spPr/>
+        <p:txBody>
+          <a:bodyPr/>
+          <a:lstStyle/>
+          <a:p>
+            <a:pPr marL="0" marR="0" lvl="0" indent="0" algn="l" defTabSz="914400" rtl="0" eaLnBrk="1" fontAlgn="auto" latinLnBrk="0" hangingPunct="1">
+              <a:lnSpc>
+                <a:spcPct val="100000"/>
+              </a:lnSpc>
+              <a:spcBef>
+                <a:spcPts val="0"/>
+              </a:spcBef>
+              <a:spcAft>
+                <a:spcPts val="0"/>
+              </a:spcAft>
+              <a:buClrTx/>
+              <a:buSzTx/>
+              <a:buFontTx/>
+              <a:buNone/>
+              <a:tabLst/>
+              <a:defRPr/>
+            </a:pPr>
+            <a:r>
+              <a:rPr kumimoji="0" lang="en-US" sz="1200" b="0" i="0" u="none" strike="noStrike" kern="1200" cap="none" spc="0" normalizeH="0" baseline="0" noProof="0">
+                <a:ln>
+                  <a:noFill/>
+                </a:ln>
+                <a:solidFill>
+                  <a:prstClr val="black">
+                    <a:tint val="75000"/>
+                  </a:prstClr>
+                </a:solidFill>
+                <a:effectLst/>
+                <a:uLnTx/>
+                <a:uFillTx/>
+                <a:latin typeface="Calibri" panose="020F0502020204030204"/>
+                <a:ea typeface="+mn-ea"/>
+                <a:cs typeface="+mn-cs"/>
+              </a:rPr>
+              <a:t>6/9/2021</a:t>
+            </a:r>
+          </a:p>
+        </p:txBody>
+      </p:sp>
+      <p:sp>
+        <p:nvSpPr>
+          <p:cNvPr id="3" name="Slide Number Placeholder 2">
+            <a:extLst>
+              <a:ext uri="{FF2B5EF4-FFF2-40B4-BE49-F238E27FC236}">
+                <a16:creationId xmlns:a16="http://schemas.microsoft.com/office/drawing/2014/main" id="{0AB42B2B-D6AE-4A28-9832-61266DCC28CC}"/>
+              </a:ext>
+            </a:extLst>
+          </p:cNvPr>
+          <p:cNvSpPr>
+            <a:spLocks noGrp="1"/>
+          </p:cNvSpPr>
+          <p:nvPr>
+            <p:ph type="sldNum" sz="quarter" idx="12"/>
+          </p:nvPr>
+        </p:nvSpPr>
+        <p:spPr/>
+        <p:txBody>
+          <a:bodyPr/>
+          <a:lstStyle/>
+          <a:p>
+            <a:pPr marL="0" marR="0" lvl="0" indent="0" algn="r" defTabSz="914400" rtl="0" eaLnBrk="1" fontAlgn="auto" latinLnBrk="0" hangingPunct="1">
+              <a:lnSpc>
+                <a:spcPct val="100000"/>
+              </a:lnSpc>
+              <a:spcBef>
+                <a:spcPts val="0"/>
+              </a:spcBef>
+              <a:spcAft>
+                <a:spcPts val="0"/>
+              </a:spcAft>
+              <a:buClrTx/>
+              <a:buSzTx/>
+              <a:buFontTx/>
+              <a:buNone/>
+              <a:tabLst/>
+              <a:defRPr/>
+            </a:pPr>
+            <a:fld id="{3AA9003C-6A8E-4863-AB7A-EC3E1B799067}" type="slidenum">
+              <a:rPr kumimoji="0" lang="en-US" sz="1200" b="0" i="0" u="none" strike="noStrike" kern="1200" cap="none" spc="0" normalizeH="0" baseline="0" noProof="0" smtClean="0">
+                <a:ln>
+                  <a:noFill/>
+                </a:ln>
+                <a:solidFill>
+                  <a:prstClr val="black">
+                    <a:tint val="75000"/>
+                  </a:prstClr>
+                </a:solidFill>
+                <a:effectLst/>
+                <a:uLnTx/>
+                <a:uFillTx/>
+                <a:latin typeface="Calibri" panose="020F0502020204030204"/>
+                <a:ea typeface="+mn-ea"/>
+                <a:cs typeface="+mn-cs"/>
+              </a:rPr>
+              <a:pPr marL="0" marR="0" lvl="0" indent="0" algn="r" defTabSz="914400" rtl="0" eaLnBrk="1" fontAlgn="auto" latinLnBrk="0" hangingPunct="1">
+                <a:lnSpc>
+                  <a:spcPct val="100000"/>
+                </a:lnSpc>
+                <a:spcBef>
+                  <a:spcPts val="0"/>
+                </a:spcBef>
+                <a:spcAft>
+                  <a:spcPts val="0"/>
+                </a:spcAft>
+                <a:buClrTx/>
+                <a:buSzTx/>
+                <a:buFontTx/>
+                <a:buNone/>
+                <a:tabLst/>
+                <a:defRPr/>
+              </a:pPr>
+              <a:t>17</a:t>
             </a:fld>
             <a:endParaRPr kumimoji="0" lang="en-US" sz="1200" b="0" i="0" u="none" strike="noStrike" kern="1200" cap="none" spc="0" normalizeH="0" baseline="0" noProof="0">
               <a:ln>

</xml_diff>

<commit_message>
Added 4 slides from Ravathi into the power point file
</commit_message>
<xml_diff>
--- a/Clay/Novel_Corona_Virus_2019_v2.pptx
+++ b/Clay/Novel_Corona_Virus_2019_v2.pptx
@@ -5,10 +5,10 @@
     <p:sldMasterId id="2147483648" r:id="rId1"/>
   </p:sldMasterIdLst>
   <p:notesMasterIdLst>
-    <p:notesMasterId r:id="rId19"/>
+    <p:notesMasterId r:id="rId21"/>
   </p:notesMasterIdLst>
   <p:handoutMasterIdLst>
-    <p:handoutMasterId r:id="rId20"/>
+    <p:handoutMasterId r:id="rId22"/>
   </p:handoutMasterIdLst>
   <p:sldIdLst>
     <p:sldId id="256" r:id="rId2"/>
@@ -27,7 +27,9 @@
     <p:sldId id="272" r:id="rId15"/>
     <p:sldId id="273" r:id="rId16"/>
     <p:sldId id="274" r:id="rId17"/>
-    <p:sldId id="265" r:id="rId18"/>
+    <p:sldId id="276" r:id="rId18"/>
+    <p:sldId id="277" r:id="rId19"/>
+    <p:sldId id="265" r:id="rId20"/>
   </p:sldIdLst>
   <p:sldSz cx="12192000" cy="6858000"/>
   <p:notesSz cx="6858000" cy="9144000"/>
@@ -129,12 +131,42 @@
   <p:extLst>
     <p:ext uri="{EFAFB233-063F-42B5-8137-9DF3F51BA10A}">
       <p15:sldGuideLst xmlns:p15="http://schemas.microsoft.com/office/powerpoint/2012/main">
-        <p15:guide id="1" orient="horz" pos="1224" userDrawn="1">
+        <p15:guide id="1" orient="horz" pos="3000" userDrawn="1">
           <p15:clr>
             <a:srgbClr val="A4A3A4"/>
           </p15:clr>
         </p15:guide>
-        <p15:guide id="2" pos="3840" userDrawn="1">
+        <p15:guide id="2" pos="3264" userDrawn="1">
+          <p15:clr>
+            <a:srgbClr val="A4A3A4"/>
+          </p15:clr>
+        </p15:guide>
+        <p15:guide id="3" orient="horz" pos="1296" userDrawn="1">
+          <p15:clr>
+            <a:srgbClr val="A4A3A4"/>
+          </p15:clr>
+        </p15:guide>
+        <p15:guide id="4" pos="3840" userDrawn="1">
+          <p15:clr>
+            <a:srgbClr val="A4A3A4"/>
+          </p15:clr>
+        </p15:guide>
+        <p15:guide id="5" pos="4392" userDrawn="1">
+          <p15:clr>
+            <a:srgbClr val="A4A3A4"/>
+          </p15:clr>
+        </p15:guide>
+        <p15:guide id="6" pos="7008" userDrawn="1">
+          <p15:clr>
+            <a:srgbClr val="A4A3A4"/>
+          </p15:clr>
+        </p15:guide>
+        <p15:guide id="7" pos="672" userDrawn="1">
+          <p15:clr>
+            <a:srgbClr val="A4A3A4"/>
+          </p15:clr>
+        </p15:guide>
+        <p15:guide id="8" orient="horz" pos="696" userDrawn="1">
           <p15:clr>
             <a:srgbClr val="A4A3A4"/>
           </p15:clr>
@@ -239,7 +271,7 @@
           <a:p>
             <a:fld id="{49E4E37A-8C9F-4B25-B068-6A7177E6E2F6}" type="datetimeFigureOut">
               <a:rPr lang="en-US" smtClean="0"/>
-              <a:t>6/7/2021</a:t>
+              <a:t>6/8/2021</a:t>
             </a:fld>
             <a:endParaRPr lang="en-US"/>
           </a:p>
@@ -417,7 +449,7 @@
           <a:p>
             <a:fld id="{9023BEA9-FA89-4F42-A6AE-03E83D737B38}" type="datetimeFigureOut">
               <a:rPr lang="en-US" smtClean="0"/>
-              <a:t>6/7/2021</a:t>
+              <a:t>6/8/2021</a:t>
             </a:fld>
             <a:endParaRPr lang="en-US"/>
           </a:p>
@@ -1078,7 +1110,7 @@
     </p:spTree>
     <p:extLst>
       <p:ext uri="{BB962C8B-B14F-4D97-AF65-F5344CB8AC3E}">
-        <p14:creationId xmlns:p14="http://schemas.microsoft.com/office/powerpoint/2010/main" val="2545437872"/>
+        <p14:creationId xmlns:p14="http://schemas.microsoft.com/office/powerpoint/2010/main" val="1980557837"/>
       </p:ext>
     </p:extLst>
   </p:cSld>
@@ -1139,7 +1171,7 @@
     </p:spTree>
     <p:extLst>
       <p:ext uri="{BB962C8B-B14F-4D97-AF65-F5344CB8AC3E}">
-        <p14:creationId xmlns:p14="http://schemas.microsoft.com/office/powerpoint/2010/main" val="1718413972"/>
+        <p14:creationId xmlns:p14="http://schemas.microsoft.com/office/powerpoint/2010/main" val="2545437872"/>
       </p:ext>
     </p:extLst>
   </p:cSld>
@@ -1200,6 +1232,67 @@
     </p:spTree>
     <p:extLst>
       <p:ext uri="{BB962C8B-B14F-4D97-AF65-F5344CB8AC3E}">
+        <p14:creationId xmlns:p14="http://schemas.microsoft.com/office/powerpoint/2010/main" val="1718413972"/>
+      </p:ext>
+    </p:extLst>
+  </p:cSld>
+  <p:clrMapOvr>
+    <a:masterClrMapping/>
+  </p:clrMapOvr>
+</p:notes>
+</file>
+
+<file path=ppt/notesSlides/notesSlide7.xml><?xml version="1.0" encoding="utf-8"?>
+<p:notes xmlns:a="http://schemas.openxmlformats.org/drawingml/2006/main" xmlns:r="http://schemas.openxmlformats.org/officeDocument/2006/relationships" xmlns:p="http://schemas.openxmlformats.org/presentationml/2006/main">
+  <p:cSld>
+    <p:spTree>
+      <p:nvGrpSpPr>
+        <p:cNvPr id="1" name=""/>
+        <p:cNvGrpSpPr/>
+        <p:nvPr/>
+      </p:nvGrpSpPr>
+      <p:grpSpPr>
+        <a:xfrm>
+          <a:off x="0" y="0"/>
+          <a:ext cx="0" cy="0"/>
+          <a:chOff x="0" y="0"/>
+          <a:chExt cx="0" cy="0"/>
+        </a:xfrm>
+      </p:grpSpPr>
+      <p:sp>
+        <p:nvSpPr>
+          <p:cNvPr id="2" name="Slide Image Placeholder 1"/>
+          <p:cNvSpPr>
+            <a:spLocks noGrp="1" noRot="1" noChangeAspect="1"/>
+          </p:cNvSpPr>
+          <p:nvPr>
+            <p:ph type="sldImg"/>
+          </p:nvPr>
+        </p:nvSpPr>
+        <p:spPr/>
+      </p:sp>
+      <p:sp>
+        <p:nvSpPr>
+          <p:cNvPr id="3" name="Notes Placeholder 2"/>
+          <p:cNvSpPr>
+            <a:spLocks noGrp="1"/>
+          </p:cNvSpPr>
+          <p:nvPr>
+            <p:ph type="body" idx="1"/>
+          </p:nvPr>
+        </p:nvSpPr>
+        <p:spPr/>
+        <p:txBody>
+          <a:bodyPr/>
+          <a:lstStyle/>
+          <a:p>
+            <a:endParaRPr lang="en-US" dirty="0"/>
+          </a:p>
+        </p:txBody>
+      </p:sp>
+    </p:spTree>
+    <p:extLst>
+      <p:ext uri="{BB962C8B-B14F-4D97-AF65-F5344CB8AC3E}">
         <p14:creationId xmlns:p14="http://schemas.microsoft.com/office/powerpoint/2010/main" val="1115554497"/>
       </p:ext>
     </p:extLst>
@@ -1210,7 +1303,7 @@
 </p:notes>
 </file>
 
-<file path=ppt/notesSlides/notesSlide7.xml><?xml version="1.0" encoding="utf-8"?>
+<file path=ppt/notesSlides/notesSlide8.xml><?xml version="1.0" encoding="utf-8"?>
 <p:notes xmlns:a="http://schemas.openxmlformats.org/drawingml/2006/main" xmlns:r="http://schemas.openxmlformats.org/officeDocument/2006/relationships" xmlns:p="http://schemas.openxmlformats.org/presentationml/2006/main">
   <p:cSld>
     <p:spTree>
@@ -4858,7 +4951,7 @@
                 <a:effectLst/>
                 <a:latin typeface="Roboto" panose="020B0604020202020204" pitchFamily="2" charset="0"/>
               </a:rPr>
-              <a:t>Islands in the Pacific and Atlantic oceans, and are likely benefiting by bordering only the sea. Strict travel policies may be responsible for low confirmed cases.</a:t>
+              <a:t>Islands in the Pacific and Atlantic oceans, are likely benefiting by bordering only the sea. Strict travel policies may be responsible for low confirmed cases.</a:t>
             </a:r>
             <a:endParaRPr lang="en-US" sz="1100" dirty="0"/>
           </a:p>
@@ -4936,7 +5029,7 @@
           <p:nvPr/>
         </p:nvPicPr>
         <p:blipFill>
-          <a:blip r:embed="rId2">
+          <a:blip r:embed="rId3">
             <a:extLst>
               <a:ext uri="{28A0092B-C50C-407E-A947-70E740481C1C}">
                 <a14:useLocalDpi xmlns:a14="http://schemas.microsoft.com/office/drawing/2010/main" val="0"/>
@@ -5022,7 +5115,7 @@
             </a:r>
             <a:r>
               <a:rPr lang="en-US" dirty="0"/>
-              <a:t>Deaths (50k or greater)</a:t>
+              <a:t>Deaths</a:t>
             </a:r>
             <a:endParaRPr lang="en-US" sz="2200" dirty="0"/>
           </a:p>
@@ -5197,13 +5290,13 @@
         </p:nvSpPr>
         <p:spPr>
           <a:xfrm>
-            <a:off x="838200" y="212726"/>
+            <a:off x="838200" y="118814"/>
             <a:ext cx="10515600" cy="1111250"/>
           </a:xfrm>
         </p:spPr>
         <p:txBody>
           <a:bodyPr>
-            <a:normAutofit/>
+            <a:normAutofit fontScale="90000"/>
           </a:bodyPr>
           <a:lstStyle/>
           <a:p>
@@ -5214,9 +5307,15 @@
             </a:r>
             <a:r>
               <a:rPr lang="en-US" dirty="0"/>
-              <a:t>Deaths (2M or greater)</a:t>
-            </a:r>
-            <a:endParaRPr lang="en-US" sz="2200" dirty="0"/>
+              <a:t>Deaths – Percent (Deaths/Confirmed)</a:t>
+            </a:r>
+            <a:br>
+              <a:rPr lang="en-US" dirty="0"/>
+            </a:br>
+            <a:r>
+              <a:rPr lang="en-US" sz="2200" dirty="0"/>
+              <a:t>(Countries with 2M or greater confirmed cases)</a:t>
+            </a:r>
           </a:p>
         </p:txBody>
       </p:sp>
@@ -5333,7 +5432,7 @@
         </p:blipFill>
         <p:spPr>
           <a:xfrm>
-            <a:off x="519054" y="1145754"/>
+            <a:off x="530071" y="1200839"/>
             <a:ext cx="10945236" cy="5210596"/>
           </a:xfrm>
           <a:prstGeom prst="rect">
@@ -5390,12 +5489,12 @@
         <p:spPr>
           <a:xfrm>
             <a:off x="838200" y="212726"/>
-            <a:ext cx="10515600" cy="1111250"/>
+            <a:ext cx="10515600" cy="1672094"/>
           </a:xfrm>
         </p:spPr>
         <p:txBody>
           <a:bodyPr>
-            <a:normAutofit fontScale="90000"/>
+            <a:normAutofit/>
           </a:bodyPr>
           <a:lstStyle/>
           <a:p>
@@ -5655,8 +5754,8 @@
         </p:blipFill>
         <p:spPr>
           <a:xfrm>
-            <a:off x="871251" y="1796684"/>
-            <a:ext cx="4838603" cy="3198529"/>
+            <a:off x="699301" y="1479847"/>
+            <a:ext cx="4578756" cy="4540701"/>
           </a:xfrm>
           <a:prstGeom prst="rect">
             <a:avLst/>
@@ -5691,8 +5790,8 @@
         </p:blipFill>
         <p:spPr>
           <a:xfrm>
-            <a:off x="6038563" y="1884820"/>
-            <a:ext cx="5210175" cy="3346428"/>
+            <a:off x="6481824" y="1608881"/>
+            <a:ext cx="4701251" cy="4540701"/>
           </a:xfrm>
           <a:prstGeom prst="rect">
             <a:avLst/>
@@ -6010,8 +6109,8 @@
         </p:blipFill>
         <p:spPr>
           <a:xfrm>
-            <a:off x="480930" y="1946446"/>
-            <a:ext cx="5104762" cy="3339682"/>
+            <a:off x="312515" y="1657072"/>
+            <a:ext cx="4960651" cy="3339682"/>
           </a:xfrm>
           <a:prstGeom prst="rect">
             <a:avLst/>
@@ -6046,8 +6145,8 @@
         </p:blipFill>
         <p:spPr>
           <a:xfrm>
-            <a:off x="5867801" y="1946446"/>
-            <a:ext cx="5193651" cy="3339682"/>
+            <a:off x="6200119" y="1656624"/>
+            <a:ext cx="5153681" cy="3339681"/>
           </a:xfrm>
           <a:prstGeom prst="rect">
             <a:avLst/>
@@ -6070,7 +6169,7 @@
         </p:nvSpPr>
         <p:spPr>
           <a:xfrm>
-            <a:off x="2209801" y="1538820"/>
+            <a:off x="2024606" y="1171052"/>
             <a:ext cx="2180421" cy="485573"/>
           </a:xfrm>
           <a:prstGeom prst="rect">
@@ -6125,7 +6224,7 @@
         </p:nvSpPr>
         <p:spPr>
           <a:xfrm>
-            <a:off x="7096699" y="1553381"/>
+            <a:off x="7170452" y="1196705"/>
             <a:ext cx="3447362" cy="485573"/>
           </a:xfrm>
           <a:prstGeom prst="rect">
@@ -6212,7 +6311,7 @@
         </p:nvSpPr>
         <p:spPr>
           <a:xfrm>
-            <a:off x="838200" y="349662"/>
+            <a:off x="1254889" y="380812"/>
             <a:ext cx="10515600" cy="1111250"/>
           </a:xfrm>
         </p:spPr>
@@ -6475,8 +6574,8 @@
         </p:blipFill>
         <p:spPr>
           <a:xfrm>
-            <a:off x="629571" y="2038954"/>
-            <a:ext cx="4939682" cy="3326984"/>
+            <a:off x="520860" y="1633840"/>
+            <a:ext cx="4759019" cy="3326984"/>
           </a:xfrm>
           <a:prstGeom prst="rect">
             <a:avLst/>
@@ -6499,7 +6598,7 @@
         </p:nvSpPr>
         <p:spPr>
           <a:xfrm>
-            <a:off x="2209801" y="1538820"/>
+            <a:off x="2209801" y="1180000"/>
             <a:ext cx="2180421" cy="485573"/>
           </a:xfrm>
           <a:prstGeom prst="rect">
@@ -6566,8 +6665,8 @@
         </p:blipFill>
         <p:spPr>
           <a:xfrm>
-            <a:off x="5917668" y="2000859"/>
-            <a:ext cx="4939682" cy="3365079"/>
+            <a:off x="6350539" y="1633840"/>
+            <a:ext cx="4876904" cy="3365079"/>
           </a:xfrm>
           <a:prstGeom prst="rect">
             <a:avLst/>
@@ -6590,7 +6689,7 @@
         </p:nvSpPr>
         <p:spPr>
           <a:xfrm>
-            <a:off x="7096699" y="1553381"/>
+            <a:off x="7246331" y="1182011"/>
             <a:ext cx="3447362" cy="485573"/>
           </a:xfrm>
           <a:prstGeom prst="rect">
@@ -6980,6 +7079,724 @@
       </p:grpSpPr>
       <p:sp>
         <p:nvSpPr>
+          <p:cNvPr id="2" name="Date Placeholder 1">
+            <a:extLst>
+              <a:ext uri="{FF2B5EF4-FFF2-40B4-BE49-F238E27FC236}">
+                <a16:creationId xmlns:a16="http://schemas.microsoft.com/office/drawing/2014/main" id="{36632D0E-C2A5-4905-8F64-A4ADC4709217}"/>
+              </a:ext>
+            </a:extLst>
+          </p:cNvPr>
+          <p:cNvSpPr>
+            <a:spLocks noGrp="1"/>
+          </p:cNvSpPr>
+          <p:nvPr>
+            <p:ph type="dt" sz="half" idx="10"/>
+          </p:nvPr>
+        </p:nvSpPr>
+        <p:spPr/>
+        <p:txBody>
+          <a:bodyPr/>
+          <a:lstStyle/>
+          <a:p>
+            <a:r>
+              <a:rPr lang="en-US"/>
+              <a:t>6/9/2021</a:t>
+            </a:r>
+          </a:p>
+        </p:txBody>
+      </p:sp>
+      <p:sp>
+        <p:nvSpPr>
+          <p:cNvPr id="3" name="Footer Placeholder 2">
+            <a:extLst>
+              <a:ext uri="{FF2B5EF4-FFF2-40B4-BE49-F238E27FC236}">
+                <a16:creationId xmlns:a16="http://schemas.microsoft.com/office/drawing/2014/main" id="{8222DC66-956C-491D-9068-0C20BC6AE45E}"/>
+              </a:ext>
+            </a:extLst>
+          </p:cNvPr>
+          <p:cNvSpPr>
+            <a:spLocks noGrp="1"/>
+          </p:cNvSpPr>
+          <p:nvPr>
+            <p:ph type="ftr" sz="quarter" idx="11"/>
+          </p:nvPr>
+        </p:nvSpPr>
+        <p:spPr/>
+        <p:txBody>
+          <a:bodyPr/>
+          <a:lstStyle/>
+          <a:p>
+            <a:r>
+              <a:rPr lang="en-US"/>
+              <a:t>https://github.com/makbarish/Grp5_Project1_Covid19</a:t>
+            </a:r>
+          </a:p>
+        </p:txBody>
+      </p:sp>
+      <p:sp>
+        <p:nvSpPr>
+          <p:cNvPr id="4" name="Slide Number Placeholder 3">
+            <a:extLst>
+              <a:ext uri="{FF2B5EF4-FFF2-40B4-BE49-F238E27FC236}">
+                <a16:creationId xmlns:a16="http://schemas.microsoft.com/office/drawing/2014/main" id="{6304CB3B-2910-4BBC-A9B9-46CAEDAFC34A}"/>
+              </a:ext>
+            </a:extLst>
+          </p:cNvPr>
+          <p:cNvSpPr>
+            <a:spLocks noGrp="1"/>
+          </p:cNvSpPr>
+          <p:nvPr>
+            <p:ph type="sldNum" sz="quarter" idx="12"/>
+          </p:nvPr>
+        </p:nvSpPr>
+        <p:spPr/>
+        <p:txBody>
+          <a:bodyPr/>
+          <a:lstStyle/>
+          <a:p>
+            <a:fld id="{3AA9003C-6A8E-4863-AB7A-EC3E1B799067}" type="slidenum">
+              <a:rPr lang="en-US" smtClean="0"/>
+              <a:t>17</a:t>
+            </a:fld>
+            <a:endParaRPr lang="en-US"/>
+          </a:p>
+        </p:txBody>
+      </p:sp>
+      <p:pic>
+        <p:nvPicPr>
+          <p:cNvPr id="10" name="Picture 9">
+            <a:extLst>
+              <a:ext uri="{FF2B5EF4-FFF2-40B4-BE49-F238E27FC236}">
+                <a16:creationId xmlns:a16="http://schemas.microsoft.com/office/drawing/2014/main" id="{E5C30BCE-0EDC-41CC-9A5C-6A2C1F611906}"/>
+              </a:ext>
+            </a:extLst>
+          </p:cNvPr>
+          <p:cNvPicPr>
+            <a:picLocks noChangeAspect="1"/>
+          </p:cNvPicPr>
+          <p:nvPr/>
+        </p:nvPicPr>
+        <p:blipFill>
+          <a:blip r:embed="rId2">
+            <a:extLst>
+              <a:ext uri="{28A0092B-C50C-407E-A947-70E740481C1C}">
+                <a14:useLocalDpi xmlns:a14="http://schemas.microsoft.com/office/drawing/2010/main" val="0"/>
+              </a:ext>
+            </a:extLst>
+          </a:blip>
+          <a:stretch>
+            <a:fillRect/>
+          </a:stretch>
+        </p:blipFill>
+        <p:spPr>
+          <a:xfrm>
+            <a:off x="694481" y="1817225"/>
+            <a:ext cx="4606236" cy="3240912"/>
+          </a:xfrm>
+          <a:prstGeom prst="rect">
+            <a:avLst/>
+          </a:prstGeom>
+        </p:spPr>
+      </p:pic>
+      <p:pic>
+        <p:nvPicPr>
+          <p:cNvPr id="13" name="Picture 12">
+            <a:extLst>
+              <a:ext uri="{FF2B5EF4-FFF2-40B4-BE49-F238E27FC236}">
+                <a16:creationId xmlns:a16="http://schemas.microsoft.com/office/drawing/2014/main" id="{ABED8E23-D4CF-4BCD-A474-04B3E7A74FC4}"/>
+              </a:ext>
+            </a:extLst>
+          </p:cNvPr>
+          <p:cNvPicPr>
+            <a:picLocks noChangeAspect="1"/>
+          </p:cNvPicPr>
+          <p:nvPr/>
+        </p:nvPicPr>
+        <p:blipFill>
+          <a:blip r:embed="rId3">
+            <a:extLst>
+              <a:ext uri="{28A0092B-C50C-407E-A947-70E740481C1C}">
+                <a14:useLocalDpi xmlns:a14="http://schemas.microsoft.com/office/drawing/2010/main" val="0"/>
+              </a:ext>
+            </a:extLst>
+          </a:blip>
+          <a:stretch>
+            <a:fillRect/>
+          </a:stretch>
+        </p:blipFill>
+        <p:spPr>
+          <a:xfrm>
+            <a:off x="6632781" y="1817226"/>
+            <a:ext cx="4606236" cy="3240912"/>
+          </a:xfrm>
+          <a:prstGeom prst="rect">
+            <a:avLst/>
+          </a:prstGeom>
+        </p:spPr>
+      </p:pic>
+      <p:sp>
+        <p:nvSpPr>
+          <p:cNvPr id="14" name="Title 3">
+            <a:extLst>
+              <a:ext uri="{FF2B5EF4-FFF2-40B4-BE49-F238E27FC236}">
+                <a16:creationId xmlns:a16="http://schemas.microsoft.com/office/drawing/2014/main" id="{9A3B9815-E80F-4C4D-AEFD-C184A8ADF626}"/>
+              </a:ext>
+            </a:extLst>
+          </p:cNvPr>
+          <p:cNvSpPr txBox="1">
+            <a:spLocks/>
+          </p:cNvSpPr>
+          <p:nvPr/>
+        </p:nvSpPr>
+        <p:spPr>
+          <a:xfrm>
+            <a:off x="2209800" y="1206147"/>
+            <a:ext cx="2180421" cy="485573"/>
+          </a:xfrm>
+          <a:prstGeom prst="rect">
+            <a:avLst/>
+          </a:prstGeom>
+        </p:spPr>
+        <p:txBody>
+          <a:bodyPr vert="horz" lIns="91440" tIns="45720" rIns="91440" bIns="45720" rtlCol="0" anchor="ctr">
+            <a:normAutofit fontScale="97500"/>
+          </a:bodyPr>
+          <a:lstStyle>
+            <a:lvl1pPr algn="l" defTabSz="914400" rtl="0" eaLnBrk="1" latinLnBrk="0" hangingPunct="1">
+              <a:lnSpc>
+                <a:spcPct val="90000"/>
+              </a:lnSpc>
+              <a:spcBef>
+                <a:spcPct val="0"/>
+              </a:spcBef>
+              <a:buNone/>
+              <a:defRPr sz="4400" kern="1200">
+                <a:solidFill>
+                  <a:schemeClr val="tx1"/>
+                </a:solidFill>
+                <a:latin typeface="+mj-lt"/>
+                <a:ea typeface="+mj-ea"/>
+                <a:cs typeface="+mj-cs"/>
+              </a:defRPr>
+            </a:lvl1pPr>
+          </a:lstStyle>
+          <a:p>
+            <a:pPr algn="ctr"/>
+            <a:r>
+              <a:rPr lang="en-US" sz="2000" dirty="0"/>
+              <a:t>Full Vaccinations</a:t>
+            </a:r>
+          </a:p>
+        </p:txBody>
+      </p:sp>
+      <p:sp>
+        <p:nvSpPr>
+          <p:cNvPr id="15" name="Title 3">
+            <a:extLst>
+              <a:ext uri="{FF2B5EF4-FFF2-40B4-BE49-F238E27FC236}">
+                <a16:creationId xmlns:a16="http://schemas.microsoft.com/office/drawing/2014/main" id="{2C1C9508-5EFA-448D-A1CD-0B61AB7B2AD3}"/>
+              </a:ext>
+            </a:extLst>
+          </p:cNvPr>
+          <p:cNvSpPr txBox="1">
+            <a:spLocks/>
+          </p:cNvSpPr>
+          <p:nvPr/>
+        </p:nvSpPr>
+        <p:spPr>
+          <a:xfrm>
+            <a:off x="7200644" y="1206146"/>
+            <a:ext cx="3447362" cy="485573"/>
+          </a:xfrm>
+          <a:prstGeom prst="rect">
+            <a:avLst/>
+          </a:prstGeom>
+        </p:spPr>
+        <p:txBody>
+          <a:bodyPr vert="horz" lIns="91440" tIns="45720" rIns="91440" bIns="45720" rtlCol="0" anchor="ctr">
+            <a:normAutofit fontScale="90000"/>
+          </a:bodyPr>
+          <a:lstStyle>
+            <a:lvl1pPr algn="l" defTabSz="914400" rtl="0" eaLnBrk="1" latinLnBrk="0" hangingPunct="1">
+              <a:lnSpc>
+                <a:spcPct val="90000"/>
+              </a:lnSpc>
+              <a:spcBef>
+                <a:spcPct val="0"/>
+              </a:spcBef>
+              <a:buNone/>
+              <a:defRPr sz="4400" kern="1200">
+                <a:solidFill>
+                  <a:schemeClr val="tx1"/>
+                </a:solidFill>
+                <a:latin typeface="+mj-lt"/>
+                <a:ea typeface="+mj-ea"/>
+                <a:cs typeface="+mj-cs"/>
+              </a:defRPr>
+            </a:lvl1pPr>
+          </a:lstStyle>
+          <a:p>
+            <a:pPr algn="ctr"/>
+            <a:r>
+              <a:rPr lang="en-US" sz="2000" dirty="0"/>
+              <a:t>Partial (Single Dose) Vaccinations</a:t>
+            </a:r>
+          </a:p>
+        </p:txBody>
+      </p:sp>
+      <p:sp>
+        <p:nvSpPr>
+          <p:cNvPr id="16" name="Title 3">
+            <a:extLst>
+              <a:ext uri="{FF2B5EF4-FFF2-40B4-BE49-F238E27FC236}">
+                <a16:creationId xmlns:a16="http://schemas.microsoft.com/office/drawing/2014/main" id="{B463EAEC-424C-4E2D-B5D8-BEFBC19C529E}"/>
+              </a:ext>
+            </a:extLst>
+          </p:cNvPr>
+          <p:cNvSpPr txBox="1">
+            <a:spLocks/>
+          </p:cNvSpPr>
+          <p:nvPr/>
+        </p:nvSpPr>
+        <p:spPr>
+          <a:xfrm>
+            <a:off x="723417" y="314532"/>
+            <a:ext cx="10515600" cy="1111250"/>
+          </a:xfrm>
+          <a:prstGeom prst="rect">
+            <a:avLst/>
+          </a:prstGeom>
+        </p:spPr>
+        <p:txBody>
+          <a:bodyPr>
+            <a:normAutofit/>
+          </a:bodyPr>
+          <a:lstStyle>
+            <a:lvl1pPr algn="l" defTabSz="914400" rtl="0" eaLnBrk="1" latinLnBrk="0" hangingPunct="1">
+              <a:lnSpc>
+                <a:spcPct val="90000"/>
+              </a:lnSpc>
+              <a:spcBef>
+                <a:spcPct val="0"/>
+              </a:spcBef>
+              <a:buNone/>
+              <a:defRPr sz="4400" kern="1200">
+                <a:solidFill>
+                  <a:schemeClr val="tx1"/>
+                </a:solidFill>
+                <a:latin typeface="+mj-lt"/>
+                <a:ea typeface="+mj-ea"/>
+                <a:cs typeface="+mj-cs"/>
+              </a:defRPr>
+            </a:lvl1pPr>
+          </a:lstStyle>
+          <a:p>
+            <a:pPr algn="ctr"/>
+            <a:r>
+              <a:rPr lang="en-US" dirty="0"/>
+              <a:t>Covid-19 Vaccine Percentages </a:t>
+            </a:r>
+          </a:p>
+          <a:p>
+            <a:pPr algn="ctr"/>
+            <a:r>
+              <a:rPr lang="en-US" sz="1900" dirty="0"/>
+              <a:t>(Box plot with outliers)</a:t>
+            </a:r>
+          </a:p>
+        </p:txBody>
+      </p:sp>
+    </p:spTree>
+    <p:extLst>
+      <p:ext uri="{BB962C8B-B14F-4D97-AF65-F5344CB8AC3E}">
+        <p14:creationId xmlns:p14="http://schemas.microsoft.com/office/powerpoint/2010/main" val="3455937458"/>
+      </p:ext>
+    </p:extLst>
+  </p:cSld>
+  <p:clrMapOvr>
+    <a:masterClrMapping/>
+  </p:clrMapOvr>
+</p:sld>
+</file>
+
+<file path=ppt/slides/slide18.xml><?xml version="1.0" encoding="utf-8"?>
+<p:sld xmlns:a="http://schemas.openxmlformats.org/drawingml/2006/main" xmlns:r="http://schemas.openxmlformats.org/officeDocument/2006/relationships" xmlns:p="http://schemas.openxmlformats.org/presentationml/2006/main">
+  <p:cSld>
+    <p:spTree>
+      <p:nvGrpSpPr>
+        <p:cNvPr id="1" name=""/>
+        <p:cNvGrpSpPr/>
+        <p:nvPr/>
+      </p:nvGrpSpPr>
+      <p:grpSpPr>
+        <a:xfrm>
+          <a:off x="0" y="0"/>
+          <a:ext cx="0" cy="0"/>
+          <a:chOff x="0" y="0"/>
+          <a:chExt cx="0" cy="0"/>
+        </a:xfrm>
+      </p:grpSpPr>
+      <p:sp>
+        <p:nvSpPr>
+          <p:cNvPr id="2" name="Date Placeholder 1">
+            <a:extLst>
+              <a:ext uri="{FF2B5EF4-FFF2-40B4-BE49-F238E27FC236}">
+                <a16:creationId xmlns:a16="http://schemas.microsoft.com/office/drawing/2014/main" id="{36632D0E-C2A5-4905-8F64-A4ADC4709217}"/>
+              </a:ext>
+            </a:extLst>
+          </p:cNvPr>
+          <p:cNvSpPr>
+            <a:spLocks noGrp="1"/>
+          </p:cNvSpPr>
+          <p:nvPr>
+            <p:ph type="dt" sz="half" idx="10"/>
+          </p:nvPr>
+        </p:nvSpPr>
+        <p:spPr/>
+        <p:txBody>
+          <a:bodyPr/>
+          <a:lstStyle/>
+          <a:p>
+            <a:r>
+              <a:rPr lang="en-US"/>
+              <a:t>6/9/2021</a:t>
+            </a:r>
+          </a:p>
+        </p:txBody>
+      </p:sp>
+      <p:sp>
+        <p:nvSpPr>
+          <p:cNvPr id="3" name="Footer Placeholder 2">
+            <a:extLst>
+              <a:ext uri="{FF2B5EF4-FFF2-40B4-BE49-F238E27FC236}">
+                <a16:creationId xmlns:a16="http://schemas.microsoft.com/office/drawing/2014/main" id="{8222DC66-956C-491D-9068-0C20BC6AE45E}"/>
+              </a:ext>
+            </a:extLst>
+          </p:cNvPr>
+          <p:cNvSpPr>
+            <a:spLocks noGrp="1"/>
+          </p:cNvSpPr>
+          <p:nvPr>
+            <p:ph type="ftr" sz="quarter" idx="11"/>
+          </p:nvPr>
+        </p:nvSpPr>
+        <p:spPr/>
+        <p:txBody>
+          <a:bodyPr/>
+          <a:lstStyle/>
+          <a:p>
+            <a:r>
+              <a:rPr lang="en-US"/>
+              <a:t>https://github.com/makbarish/Grp5_Project1_Covid19</a:t>
+            </a:r>
+          </a:p>
+        </p:txBody>
+      </p:sp>
+      <p:sp>
+        <p:nvSpPr>
+          <p:cNvPr id="4" name="Slide Number Placeholder 3">
+            <a:extLst>
+              <a:ext uri="{FF2B5EF4-FFF2-40B4-BE49-F238E27FC236}">
+                <a16:creationId xmlns:a16="http://schemas.microsoft.com/office/drawing/2014/main" id="{6304CB3B-2910-4BBC-A9B9-46CAEDAFC34A}"/>
+              </a:ext>
+            </a:extLst>
+          </p:cNvPr>
+          <p:cNvSpPr>
+            <a:spLocks noGrp="1"/>
+          </p:cNvSpPr>
+          <p:nvPr>
+            <p:ph type="sldNum" sz="quarter" idx="12"/>
+          </p:nvPr>
+        </p:nvSpPr>
+        <p:spPr/>
+        <p:txBody>
+          <a:bodyPr/>
+          <a:lstStyle/>
+          <a:p>
+            <a:fld id="{3AA9003C-6A8E-4863-AB7A-EC3E1B799067}" type="slidenum">
+              <a:rPr lang="en-US" smtClean="0"/>
+              <a:t>18</a:t>
+            </a:fld>
+            <a:endParaRPr lang="en-US"/>
+          </a:p>
+        </p:txBody>
+      </p:sp>
+      <p:sp>
+        <p:nvSpPr>
+          <p:cNvPr id="14" name="Title 3">
+            <a:extLst>
+              <a:ext uri="{FF2B5EF4-FFF2-40B4-BE49-F238E27FC236}">
+                <a16:creationId xmlns:a16="http://schemas.microsoft.com/office/drawing/2014/main" id="{9A3B9815-E80F-4C4D-AEFD-C184A8ADF626}"/>
+              </a:ext>
+            </a:extLst>
+          </p:cNvPr>
+          <p:cNvSpPr txBox="1">
+            <a:spLocks/>
+          </p:cNvSpPr>
+          <p:nvPr/>
+        </p:nvSpPr>
+        <p:spPr>
+          <a:xfrm>
+            <a:off x="2209800" y="1321897"/>
+            <a:ext cx="2180421" cy="485573"/>
+          </a:xfrm>
+          <a:prstGeom prst="rect">
+            <a:avLst/>
+          </a:prstGeom>
+        </p:spPr>
+        <p:txBody>
+          <a:bodyPr vert="horz" lIns="91440" tIns="45720" rIns="91440" bIns="45720" rtlCol="0" anchor="ctr">
+            <a:normAutofit fontScale="97500"/>
+          </a:bodyPr>
+          <a:lstStyle>
+            <a:lvl1pPr algn="l" defTabSz="914400" rtl="0" eaLnBrk="1" latinLnBrk="0" hangingPunct="1">
+              <a:lnSpc>
+                <a:spcPct val="90000"/>
+              </a:lnSpc>
+              <a:spcBef>
+                <a:spcPct val="0"/>
+              </a:spcBef>
+              <a:buNone/>
+              <a:defRPr sz="4400" kern="1200">
+                <a:solidFill>
+                  <a:schemeClr val="tx1"/>
+                </a:solidFill>
+                <a:latin typeface="+mj-lt"/>
+                <a:ea typeface="+mj-ea"/>
+                <a:cs typeface="+mj-cs"/>
+              </a:defRPr>
+            </a:lvl1pPr>
+          </a:lstStyle>
+          <a:p>
+            <a:pPr algn="ctr"/>
+            <a:r>
+              <a:rPr lang="en-US" sz="2000" dirty="0"/>
+              <a:t>Full Vaccinations</a:t>
+            </a:r>
+          </a:p>
+        </p:txBody>
+      </p:sp>
+      <p:sp>
+        <p:nvSpPr>
+          <p:cNvPr id="15" name="Title 3">
+            <a:extLst>
+              <a:ext uri="{FF2B5EF4-FFF2-40B4-BE49-F238E27FC236}">
+                <a16:creationId xmlns:a16="http://schemas.microsoft.com/office/drawing/2014/main" id="{2C1C9508-5EFA-448D-A1CD-0B61AB7B2AD3}"/>
+              </a:ext>
+            </a:extLst>
+          </p:cNvPr>
+          <p:cNvSpPr txBox="1">
+            <a:spLocks/>
+          </p:cNvSpPr>
+          <p:nvPr/>
+        </p:nvSpPr>
+        <p:spPr>
+          <a:xfrm>
+            <a:off x="7200644" y="1321896"/>
+            <a:ext cx="3447362" cy="485573"/>
+          </a:xfrm>
+          <a:prstGeom prst="rect">
+            <a:avLst/>
+          </a:prstGeom>
+        </p:spPr>
+        <p:txBody>
+          <a:bodyPr vert="horz" lIns="91440" tIns="45720" rIns="91440" bIns="45720" rtlCol="0" anchor="ctr">
+            <a:normAutofit fontScale="90000"/>
+          </a:bodyPr>
+          <a:lstStyle>
+            <a:lvl1pPr algn="l" defTabSz="914400" rtl="0" eaLnBrk="1" latinLnBrk="0" hangingPunct="1">
+              <a:lnSpc>
+                <a:spcPct val="90000"/>
+              </a:lnSpc>
+              <a:spcBef>
+                <a:spcPct val="0"/>
+              </a:spcBef>
+              <a:buNone/>
+              <a:defRPr sz="4400" kern="1200">
+                <a:solidFill>
+                  <a:schemeClr val="tx1"/>
+                </a:solidFill>
+                <a:latin typeface="+mj-lt"/>
+                <a:ea typeface="+mj-ea"/>
+                <a:cs typeface="+mj-cs"/>
+              </a:defRPr>
+            </a:lvl1pPr>
+          </a:lstStyle>
+          <a:p>
+            <a:pPr algn="ctr"/>
+            <a:r>
+              <a:rPr lang="en-US" sz="2000" dirty="0"/>
+              <a:t>Partial (Single Dose) Vaccinations</a:t>
+            </a:r>
+          </a:p>
+        </p:txBody>
+      </p:sp>
+      <p:sp>
+        <p:nvSpPr>
+          <p:cNvPr id="16" name="Title 3">
+            <a:extLst>
+              <a:ext uri="{FF2B5EF4-FFF2-40B4-BE49-F238E27FC236}">
+                <a16:creationId xmlns:a16="http://schemas.microsoft.com/office/drawing/2014/main" id="{B463EAEC-424C-4E2D-B5D8-BEFBC19C529E}"/>
+              </a:ext>
+            </a:extLst>
+          </p:cNvPr>
+          <p:cNvSpPr txBox="1">
+            <a:spLocks/>
+          </p:cNvSpPr>
+          <p:nvPr/>
+        </p:nvSpPr>
+        <p:spPr>
+          <a:xfrm>
+            <a:off x="838200" y="349662"/>
+            <a:ext cx="10515600" cy="1111250"/>
+          </a:xfrm>
+          <a:prstGeom prst="rect">
+            <a:avLst/>
+          </a:prstGeom>
+        </p:spPr>
+        <p:txBody>
+          <a:bodyPr>
+            <a:normAutofit/>
+          </a:bodyPr>
+          <a:lstStyle>
+            <a:lvl1pPr algn="l" defTabSz="914400" rtl="0" eaLnBrk="1" latinLnBrk="0" hangingPunct="1">
+              <a:lnSpc>
+                <a:spcPct val="90000"/>
+              </a:lnSpc>
+              <a:spcBef>
+                <a:spcPct val="0"/>
+              </a:spcBef>
+              <a:buNone/>
+              <a:defRPr sz="4400" kern="1200">
+                <a:solidFill>
+                  <a:schemeClr val="tx1"/>
+                </a:solidFill>
+                <a:latin typeface="+mj-lt"/>
+                <a:ea typeface="+mj-ea"/>
+                <a:cs typeface="+mj-cs"/>
+              </a:defRPr>
+            </a:lvl1pPr>
+          </a:lstStyle>
+          <a:p>
+            <a:pPr algn="ctr"/>
+            <a:r>
+              <a:rPr lang="en-US" dirty="0"/>
+              <a:t>Covid-19 Vaccine Percentages </a:t>
+            </a:r>
+          </a:p>
+          <a:p>
+            <a:pPr algn="ctr"/>
+            <a:r>
+              <a:rPr lang="en-US" sz="1900" dirty="0"/>
+              <a:t>(Box plot excludes outliers)</a:t>
+            </a:r>
+          </a:p>
+        </p:txBody>
+      </p:sp>
+      <p:pic>
+        <p:nvPicPr>
+          <p:cNvPr id="6" name="Picture 5">
+            <a:extLst>
+              <a:ext uri="{FF2B5EF4-FFF2-40B4-BE49-F238E27FC236}">
+                <a16:creationId xmlns:a16="http://schemas.microsoft.com/office/drawing/2014/main" id="{50F45603-71B1-4384-A181-DC2AA9C7EEA3}"/>
+              </a:ext>
+            </a:extLst>
+          </p:cNvPr>
+          <p:cNvPicPr>
+            <a:picLocks noChangeAspect="1"/>
+          </p:cNvPicPr>
+          <p:nvPr/>
+        </p:nvPicPr>
+        <p:blipFill>
+          <a:blip r:embed="rId2">
+            <a:extLst>
+              <a:ext uri="{28A0092B-C50C-407E-A947-70E740481C1C}">
+                <a14:useLocalDpi xmlns:a14="http://schemas.microsoft.com/office/drawing/2010/main" val="0"/>
+              </a:ext>
+            </a:extLst>
+          </a:blip>
+          <a:stretch>
+            <a:fillRect/>
+          </a:stretch>
+        </p:blipFill>
+        <p:spPr>
+          <a:xfrm>
+            <a:off x="678380" y="1877152"/>
+            <a:ext cx="4585451" cy="3192559"/>
+          </a:xfrm>
+          <a:prstGeom prst="rect">
+            <a:avLst/>
+          </a:prstGeom>
+        </p:spPr>
+      </p:pic>
+      <p:pic>
+        <p:nvPicPr>
+          <p:cNvPr id="8" name="Picture 7">
+            <a:extLst>
+              <a:ext uri="{FF2B5EF4-FFF2-40B4-BE49-F238E27FC236}">
+                <a16:creationId xmlns:a16="http://schemas.microsoft.com/office/drawing/2014/main" id="{3AA06597-8A9B-456D-802D-961130F5E3A4}"/>
+              </a:ext>
+            </a:extLst>
+          </p:cNvPr>
+          <p:cNvPicPr>
+            <a:picLocks noChangeAspect="1"/>
+          </p:cNvPicPr>
+          <p:nvPr/>
+        </p:nvPicPr>
+        <p:blipFill>
+          <a:blip r:embed="rId3">
+            <a:extLst>
+              <a:ext uri="{28A0092B-C50C-407E-A947-70E740481C1C}">
+                <a14:useLocalDpi xmlns:a14="http://schemas.microsoft.com/office/drawing/2010/main" val="0"/>
+              </a:ext>
+            </a:extLst>
+          </a:blip>
+          <a:stretch>
+            <a:fillRect/>
+          </a:stretch>
+        </p:blipFill>
+        <p:spPr>
+          <a:xfrm>
+            <a:off x="6573998" y="1877152"/>
+            <a:ext cx="4676594" cy="3192558"/>
+          </a:xfrm>
+          <a:prstGeom prst="rect">
+            <a:avLst/>
+          </a:prstGeom>
+        </p:spPr>
+      </p:pic>
+    </p:spTree>
+    <p:extLst>
+      <p:ext uri="{BB962C8B-B14F-4D97-AF65-F5344CB8AC3E}">
+        <p14:creationId xmlns:p14="http://schemas.microsoft.com/office/powerpoint/2010/main" val="2028187030"/>
+      </p:ext>
+    </p:extLst>
+  </p:cSld>
+  <p:clrMapOvr>
+    <a:masterClrMapping/>
+  </p:clrMapOvr>
+</p:sld>
+</file>
+
+<file path=ppt/slides/slide19.xml><?xml version="1.0" encoding="utf-8"?>
+<p:sld xmlns:a="http://schemas.openxmlformats.org/drawingml/2006/main" xmlns:r="http://schemas.openxmlformats.org/officeDocument/2006/relationships" xmlns:p="http://schemas.openxmlformats.org/presentationml/2006/main">
+  <p:cSld>
+    <p:spTree>
+      <p:nvGrpSpPr>
+        <p:cNvPr id="1" name=""/>
+        <p:cNvGrpSpPr/>
+        <p:nvPr/>
+      </p:nvGrpSpPr>
+      <p:grpSpPr>
+        <a:xfrm>
+          <a:off x="0" y="0"/>
+          <a:ext cx="0" cy="0"/>
+          <a:chOff x="0" y="0"/>
+          <a:chExt cx="0" cy="0"/>
+        </a:xfrm>
+      </p:grpSpPr>
+      <p:sp>
+        <p:nvSpPr>
           <p:cNvPr id="4" name="Title 3">
             <a:extLst>
               <a:ext uri="{FF2B5EF4-FFF2-40B4-BE49-F238E27FC236}">
@@ -7210,7 +8027,7 @@
                 <a:tabLst/>
                 <a:defRPr/>
               </a:pPr>
-              <a:t>17</a:t>
+              <a:t>19</a:t>
             </a:fld>
             <a:endParaRPr kumimoji="0" lang="en-US" sz="1200" b="0" i="0" u="none" strike="noStrike" kern="1200" cap="none" spc="0" normalizeH="0" baseline="0" noProof="0">
               <a:ln>
@@ -7418,8 +8235,8 @@
         </p:nvSpPr>
         <p:spPr>
           <a:xfrm>
-            <a:off x="923925" y="1278037"/>
-            <a:ext cx="10515600" cy="5355312"/>
+            <a:off x="965524" y="1017490"/>
+            <a:ext cx="10515600" cy="5062924"/>
           </a:xfrm>
           <a:prstGeom prst="rect">
             <a:avLst/>
@@ -7433,12 +8250,12 @@
           <a:lstStyle/>
           <a:p>
             <a:r>
-              <a:rPr lang="en-US" dirty="0"/>
+              <a:rPr lang="en-US" sz="1700" dirty="0"/>
               <a:t>Project Summary/Objectives </a:t>
             </a:r>
           </a:p>
           <a:p>
-            <a:endParaRPr lang="en-US" dirty="0"/>
+            <a:endParaRPr lang="en-US" sz="1700" dirty="0"/>
           </a:p>
           <a:p>
             <a:pPr marL="742950" lvl="1" indent="-285750">
@@ -7446,7 +8263,7 @@
               <a:buChar char="•"/>
             </a:pPr>
             <a:r>
-              <a:rPr lang="en-US" dirty="0"/>
+              <a:rPr lang="en-US" sz="1700" dirty="0"/>
               <a:t>The team objectives are to identify significant trends of the global Covid-19 outbreak from January 2020 through April 2021.  In addition, the team will look at trends of the Covid-19 outbreak in relationship to World Population, GDP, and available vaccinations.   </a:t>
             </a:r>
           </a:p>
@@ -7456,7 +8273,7 @@
               <a:buChar char="•"/>
             </a:pPr>
             <a:r>
-              <a:rPr lang="en-US" dirty="0"/>
+              <a:rPr lang="en-US" sz="1700" dirty="0"/>
               <a:t>Pandas data queries and Matplotlib data visualization charts will be used for analysis.  </a:t>
             </a:r>
           </a:p>
@@ -7465,16 +8282,16 @@
               <a:buFont typeface="Arial" panose="020B0604020202020204" pitchFamily="34" charset="0"/>
               <a:buChar char="•"/>
             </a:pPr>
-            <a:endParaRPr lang="en-US" dirty="0"/>
-          </a:p>
-          <a:p>
-            <a:r>
-              <a:rPr lang="en-US" dirty="0"/>
+            <a:endParaRPr lang="en-US" sz="1700" dirty="0"/>
+          </a:p>
+          <a:p>
+            <a:r>
+              <a:rPr lang="en-US" sz="1700" dirty="0"/>
               <a:t>Questions asked by the Team </a:t>
             </a:r>
           </a:p>
           <a:p>
-            <a:endParaRPr lang="en-US" dirty="0"/>
+            <a:endParaRPr lang="en-US" sz="1700" dirty="0"/>
           </a:p>
           <a:p>
             <a:pPr marL="742950" lvl="1" indent="-285750">
@@ -7482,7 +8299,7 @@
               <a:buChar char="•"/>
             </a:pPr>
             <a:r>
-              <a:rPr lang="en-US" dirty="0"/>
+              <a:rPr lang="en-US" sz="1700" dirty="0"/>
               <a:t>Where did the first Covid-19 cases get reported?     </a:t>
             </a:r>
           </a:p>
@@ -7492,7 +8309,7 @@
               <a:buChar char="•"/>
             </a:pPr>
             <a:r>
-              <a:rPr lang="en-US" dirty="0"/>
+              <a:rPr lang="en-US" sz="1700" dirty="0"/>
               <a:t>Availability vaccinations by manufacturer and country?   	</a:t>
             </a:r>
           </a:p>
@@ -7502,7 +8319,7 @@
               <a:buChar char="•"/>
             </a:pPr>
             <a:r>
-              <a:rPr lang="en-US" dirty="0"/>
+              <a:rPr lang="en-US" sz="1700" dirty="0"/>
               <a:t>Does GDP and population have any impact or influence on the covid 19 outbreak?</a:t>
             </a:r>
           </a:p>
@@ -7512,16 +8329,16 @@
               <a:buChar char="•"/>
             </a:pPr>
             <a:r>
-              <a:rPr lang="en-US" dirty="0"/>
+              <a:rPr lang="en-US" sz="1700" dirty="0"/>
               <a:t>Which countries are impacted the most and least by the covid 19 outbreak?  </a:t>
             </a:r>
           </a:p>
           <a:p>
-            <a:endParaRPr lang="en-US" dirty="0"/>
-          </a:p>
-          <a:p>
-            <a:r>
-              <a:rPr lang="en-US" dirty="0"/>
+            <a:endParaRPr lang="en-US" sz="1700" dirty="0"/>
+          </a:p>
+          <a:p>
+            <a:r>
+              <a:rPr lang="en-US" sz="1700" dirty="0"/>
               <a:t>Were the questions answered to the teams satisfaction?   The following exceptions were noted during the teams analysis:</a:t>
             </a:r>
           </a:p>
@@ -7530,10 +8347,7 @@
               <a:buFont typeface="Arial" panose="020B0604020202020204" pitchFamily="34" charset="0"/>
               <a:buChar char="•"/>
             </a:pPr>
-            <a:r>
-              <a:rPr lang="en-US" dirty="0"/>
-              <a:t>Mexico - unusually high percent relationship between deaths and the number of confirmed Covid 19 cases.  </a:t>
-            </a:r>
+            <a:endParaRPr lang="en-US" sz="1700" dirty="0"/>
           </a:p>
           <a:p>
             <a:pPr marL="742950" lvl="1" indent="-285750">
@@ -7541,7 +8355,17 @@
               <a:buChar char="•"/>
             </a:pPr>
             <a:r>
-              <a:rPr lang="en-US" dirty="0"/>
+              <a:rPr lang="en-US" sz="1700" dirty="0"/>
+              <a:t>Mexico - unusually high percent relationship between deaths and the number of confirmed Covid 19 cases.  </a:t>
+            </a:r>
+          </a:p>
+          <a:p>
+            <a:pPr marL="742950" lvl="1" indent="-285750">
+              <a:buFont typeface="Arial" panose="020B0604020202020204" pitchFamily="34" charset="0"/>
+              <a:buChar char="•"/>
+            </a:pPr>
+            <a:r>
+              <a:rPr lang="en-US" sz="1700" dirty="0"/>
               <a:t>US - discontinuance  of reporting Covid 19 recoveries in mid December 2020.</a:t>
             </a:r>
           </a:p>
@@ -7716,7 +8540,7 @@
         </p:nvSpPr>
         <p:spPr>
           <a:xfrm>
-            <a:off x="483393" y="2574887"/>
+            <a:off x="966787" y="2464308"/>
             <a:ext cx="11225213" cy="3539430"/>
           </a:xfrm>
           <a:prstGeom prst="rect">
@@ -7862,7 +8686,7 @@
         </p:nvSpPr>
         <p:spPr>
           <a:xfrm>
-            <a:off x="483393" y="1700648"/>
+            <a:off x="966787" y="1516088"/>
             <a:ext cx="7279482" cy="923330"/>
           </a:xfrm>
           <a:prstGeom prst="rect">
@@ -8048,7 +8872,7 @@
             <a:pPr algn="ctr"/>
             <a:r>
               <a:rPr lang="en-US" sz="3600" dirty="0"/>
-              <a:t>Where did the first Covid-19 cases get reported</a:t>
+              <a:t>Where did the first Covid-19 cases get reported?</a:t>
             </a:r>
           </a:p>
         </p:txBody>
@@ -9528,8 +10352,8 @@
         </p:nvSpPr>
         <p:spPr>
           <a:xfrm>
-            <a:off x="838200" y="212726"/>
-            <a:ext cx="10515600" cy="1111250"/>
+            <a:off x="483365" y="21774"/>
+            <a:ext cx="11225270" cy="1111250"/>
           </a:xfrm>
         </p:spPr>
         <p:txBody>
@@ -9545,7 +10369,11 @@
             </a:r>
             <a:r>
               <a:rPr lang="en-US" dirty="0"/>
-              <a:t>Confirmed (over 1million reported)</a:t>
+              <a:t>Confirmed  - </a:t>
+            </a:r>
+            <a:r>
+              <a:rPr lang="en-US" sz="4000" dirty="0"/>
+              <a:t>1M or greater cases</a:t>
             </a:r>
           </a:p>
         </p:txBody>

</xml_diff>

<commit_message>
updates to PPT file from slide number 19
</commit_message>
<xml_diff>
--- a/Clay/Novel_Corona_Virus_2019_v2.pptx
+++ b/Clay/Novel_Corona_Virus_2019_v2.pptx
@@ -5,10 +5,10 @@
     <p:sldMasterId id="2147483648" r:id="rId1"/>
   </p:sldMasterIdLst>
   <p:notesMasterIdLst>
-    <p:notesMasterId r:id="rId21"/>
+    <p:notesMasterId r:id="rId22"/>
   </p:notesMasterIdLst>
   <p:handoutMasterIdLst>
-    <p:handoutMasterId r:id="rId22"/>
+    <p:handoutMasterId r:id="rId23"/>
   </p:handoutMasterIdLst>
   <p:sldIdLst>
     <p:sldId id="256" r:id="rId2"/>
@@ -29,7 +29,8 @@
     <p:sldId id="274" r:id="rId17"/>
     <p:sldId id="276" r:id="rId18"/>
     <p:sldId id="277" r:id="rId19"/>
-    <p:sldId id="265" r:id="rId20"/>
+    <p:sldId id="278" r:id="rId20"/>
+    <p:sldId id="265" r:id="rId21"/>
   </p:sldIdLst>
   <p:sldSz cx="12192000" cy="6858000"/>
   <p:notesSz cx="6858000" cy="9144000"/>
@@ -166,7 +167,7 @@
             <a:srgbClr val="A4A3A4"/>
           </p15:clr>
         </p15:guide>
-        <p15:guide id="8" orient="horz" pos="696" userDrawn="1">
+        <p15:guide id="8" orient="horz" pos="744" userDrawn="1">
           <p15:clr>
             <a:srgbClr val="A4A3A4"/>
           </p15:clr>
@@ -7797,6 +7798,755 @@
       </p:grpSpPr>
       <p:sp>
         <p:nvSpPr>
+          <p:cNvPr id="2" name="Date Placeholder 1">
+            <a:extLst>
+              <a:ext uri="{FF2B5EF4-FFF2-40B4-BE49-F238E27FC236}">
+                <a16:creationId xmlns:a16="http://schemas.microsoft.com/office/drawing/2014/main" id="{981AEB5F-F639-4224-9DBA-375CFDE75F01}"/>
+              </a:ext>
+            </a:extLst>
+          </p:cNvPr>
+          <p:cNvSpPr>
+            <a:spLocks noGrp="1"/>
+          </p:cNvSpPr>
+          <p:nvPr>
+            <p:ph type="dt" sz="half" idx="10"/>
+          </p:nvPr>
+        </p:nvSpPr>
+        <p:spPr/>
+        <p:txBody>
+          <a:bodyPr/>
+          <a:lstStyle/>
+          <a:p>
+            <a:r>
+              <a:rPr lang="en-US"/>
+              <a:t>6/9/2021</a:t>
+            </a:r>
+          </a:p>
+        </p:txBody>
+      </p:sp>
+      <p:sp>
+        <p:nvSpPr>
+          <p:cNvPr id="3" name="Footer Placeholder 2">
+            <a:extLst>
+              <a:ext uri="{FF2B5EF4-FFF2-40B4-BE49-F238E27FC236}">
+                <a16:creationId xmlns:a16="http://schemas.microsoft.com/office/drawing/2014/main" id="{0354D911-AECE-4E89-AF4A-97B2710E3711}"/>
+              </a:ext>
+            </a:extLst>
+          </p:cNvPr>
+          <p:cNvSpPr>
+            <a:spLocks noGrp="1"/>
+          </p:cNvSpPr>
+          <p:nvPr>
+            <p:ph type="ftr" sz="quarter" idx="11"/>
+          </p:nvPr>
+        </p:nvSpPr>
+        <p:spPr/>
+        <p:txBody>
+          <a:bodyPr/>
+          <a:lstStyle/>
+          <a:p>
+            <a:r>
+              <a:rPr lang="en-US"/>
+              <a:t>https://github.com/makbarish/Grp5_Project1_Covid19</a:t>
+            </a:r>
+          </a:p>
+        </p:txBody>
+      </p:sp>
+      <p:sp>
+        <p:nvSpPr>
+          <p:cNvPr id="4" name="Slide Number Placeholder 3">
+            <a:extLst>
+              <a:ext uri="{FF2B5EF4-FFF2-40B4-BE49-F238E27FC236}">
+                <a16:creationId xmlns:a16="http://schemas.microsoft.com/office/drawing/2014/main" id="{FDFF7BE1-0DB2-4F16-B327-7747F60DF5F2}"/>
+              </a:ext>
+            </a:extLst>
+          </p:cNvPr>
+          <p:cNvSpPr>
+            <a:spLocks noGrp="1"/>
+          </p:cNvSpPr>
+          <p:nvPr>
+            <p:ph type="sldNum" sz="quarter" idx="12"/>
+          </p:nvPr>
+        </p:nvSpPr>
+        <p:spPr/>
+        <p:txBody>
+          <a:bodyPr/>
+          <a:lstStyle/>
+          <a:p>
+            <a:fld id="{3AA9003C-6A8E-4863-AB7A-EC3E1B799067}" type="slidenum">
+              <a:rPr lang="en-US" smtClean="0"/>
+              <a:t>19</a:t>
+            </a:fld>
+            <a:endParaRPr lang="en-US"/>
+          </a:p>
+        </p:txBody>
+      </p:sp>
+      <p:pic>
+        <p:nvPicPr>
+          <p:cNvPr id="6" name="Picture 5">
+            <a:extLst>
+              <a:ext uri="{FF2B5EF4-FFF2-40B4-BE49-F238E27FC236}">
+                <a16:creationId xmlns:a16="http://schemas.microsoft.com/office/drawing/2014/main" id="{4A2CE639-D774-4A38-B6F0-547E053ABC20}"/>
+              </a:ext>
+            </a:extLst>
+          </p:cNvPr>
+          <p:cNvPicPr>
+            <a:picLocks noChangeAspect="1"/>
+          </p:cNvPicPr>
+          <p:nvPr/>
+        </p:nvPicPr>
+        <p:blipFill>
+          <a:blip r:embed="rId2"/>
+          <a:stretch>
+            <a:fillRect/>
+          </a:stretch>
+        </p:blipFill>
+        <p:spPr>
+          <a:xfrm>
+            <a:off x="1066800" y="1404082"/>
+            <a:ext cx="10058399" cy="4879921"/>
+          </a:xfrm>
+          <a:prstGeom prst="rect">
+            <a:avLst/>
+          </a:prstGeom>
+          <a:ln>
+            <a:solidFill>
+              <a:schemeClr val="tx1"/>
+            </a:solidFill>
+          </a:ln>
+        </p:spPr>
+      </p:pic>
+      <p:pic>
+        <p:nvPicPr>
+          <p:cNvPr id="10" name="Picture 9">
+            <a:extLst>
+              <a:ext uri="{FF2B5EF4-FFF2-40B4-BE49-F238E27FC236}">
+                <a16:creationId xmlns:a16="http://schemas.microsoft.com/office/drawing/2014/main" id="{52788023-E63B-482B-B33D-1B11BB111F10}"/>
+              </a:ext>
+            </a:extLst>
+          </p:cNvPr>
+          <p:cNvPicPr>
+            <a:picLocks noChangeAspect="1"/>
+          </p:cNvPicPr>
+          <p:nvPr/>
+        </p:nvPicPr>
+        <p:blipFill>
+          <a:blip r:embed="rId3"/>
+          <a:stretch>
+            <a:fillRect/>
+          </a:stretch>
+        </p:blipFill>
+        <p:spPr>
+          <a:xfrm>
+            <a:off x="6748150" y="2579744"/>
+            <a:ext cx="825818" cy="917575"/>
+          </a:xfrm>
+          <a:prstGeom prst="rect">
+            <a:avLst/>
+          </a:prstGeom>
+        </p:spPr>
+      </p:pic>
+      <p:pic>
+        <p:nvPicPr>
+          <p:cNvPr id="12" name="Picture 11">
+            <a:extLst>
+              <a:ext uri="{FF2B5EF4-FFF2-40B4-BE49-F238E27FC236}">
+                <a16:creationId xmlns:a16="http://schemas.microsoft.com/office/drawing/2014/main" id="{BB490CC1-5D24-4A90-A4CE-7F4577A90560}"/>
+              </a:ext>
+            </a:extLst>
+          </p:cNvPr>
+          <p:cNvPicPr>
+            <a:picLocks noChangeAspect="1"/>
+          </p:cNvPicPr>
+          <p:nvPr/>
+        </p:nvPicPr>
+        <p:blipFill>
+          <a:blip r:embed="rId4"/>
+          <a:stretch>
+            <a:fillRect/>
+          </a:stretch>
+        </p:blipFill>
+        <p:spPr>
+          <a:xfrm>
+            <a:off x="7227679" y="4915136"/>
+            <a:ext cx="822515" cy="977544"/>
+          </a:xfrm>
+          <a:prstGeom prst="rect">
+            <a:avLst/>
+          </a:prstGeom>
+        </p:spPr>
+      </p:pic>
+      <p:cxnSp>
+        <p:nvCxnSpPr>
+          <p:cNvPr id="14" name="Straight Connector 13">
+            <a:extLst>
+              <a:ext uri="{FF2B5EF4-FFF2-40B4-BE49-F238E27FC236}">
+                <a16:creationId xmlns:a16="http://schemas.microsoft.com/office/drawing/2014/main" id="{5A6AFE82-521C-493A-9738-84B4655E10E5}"/>
+              </a:ext>
+            </a:extLst>
+          </p:cNvPr>
+          <p:cNvCxnSpPr/>
+          <p:nvPr/>
+        </p:nvCxnSpPr>
+        <p:spPr>
+          <a:xfrm flipH="1">
+            <a:off x="6595979" y="3528012"/>
+            <a:ext cx="123296" cy="211667"/>
+          </a:xfrm>
+          <a:prstGeom prst="line">
+            <a:avLst/>
+          </a:prstGeom>
+        </p:spPr>
+        <p:style>
+          <a:lnRef idx="1">
+            <a:schemeClr val="accent1"/>
+          </a:lnRef>
+          <a:fillRef idx="0">
+            <a:schemeClr val="accent1"/>
+          </a:fillRef>
+          <a:effectRef idx="0">
+            <a:schemeClr val="accent1"/>
+          </a:effectRef>
+          <a:fontRef idx="minor">
+            <a:schemeClr val="tx1"/>
+          </a:fontRef>
+        </p:style>
+      </p:cxnSp>
+      <p:cxnSp>
+        <p:nvCxnSpPr>
+          <p:cNvPr id="16" name="Straight Connector 15">
+            <a:extLst>
+              <a:ext uri="{FF2B5EF4-FFF2-40B4-BE49-F238E27FC236}">
+                <a16:creationId xmlns:a16="http://schemas.microsoft.com/office/drawing/2014/main" id="{4F658AF1-059C-4402-9035-EBCA0D12D3E4}"/>
+              </a:ext>
+            </a:extLst>
+          </p:cNvPr>
+          <p:cNvCxnSpPr/>
+          <p:nvPr/>
+        </p:nvCxnSpPr>
+        <p:spPr>
+          <a:xfrm flipH="1" flipV="1">
+            <a:off x="7110575" y="4869271"/>
+            <a:ext cx="71966" cy="84667"/>
+          </a:xfrm>
+          <a:prstGeom prst="line">
+            <a:avLst/>
+          </a:prstGeom>
+        </p:spPr>
+        <p:style>
+          <a:lnRef idx="1">
+            <a:schemeClr val="accent1"/>
+          </a:lnRef>
+          <a:fillRef idx="0">
+            <a:schemeClr val="accent1"/>
+          </a:fillRef>
+          <a:effectRef idx="0">
+            <a:schemeClr val="accent1"/>
+          </a:effectRef>
+          <a:fontRef idx="minor">
+            <a:schemeClr val="tx1"/>
+          </a:fontRef>
+        </p:style>
+      </p:cxnSp>
+      <p:pic>
+        <p:nvPicPr>
+          <p:cNvPr id="18" name="Picture 17">
+            <a:extLst>
+              <a:ext uri="{FF2B5EF4-FFF2-40B4-BE49-F238E27FC236}">
+                <a16:creationId xmlns:a16="http://schemas.microsoft.com/office/drawing/2014/main" id="{534B802F-9812-45B1-B79D-11BB16AF83B8}"/>
+              </a:ext>
+            </a:extLst>
+          </p:cNvPr>
+          <p:cNvPicPr>
+            <a:picLocks noChangeAspect="1"/>
+          </p:cNvPicPr>
+          <p:nvPr/>
+        </p:nvPicPr>
+        <p:blipFill>
+          <a:blip r:embed="rId5"/>
+          <a:stretch>
+            <a:fillRect/>
+          </a:stretch>
+        </p:blipFill>
+        <p:spPr>
+          <a:xfrm>
+            <a:off x="2281980" y="4688846"/>
+            <a:ext cx="738663" cy="877887"/>
+          </a:xfrm>
+          <a:prstGeom prst="rect">
+            <a:avLst/>
+          </a:prstGeom>
+        </p:spPr>
+      </p:pic>
+      <p:cxnSp>
+        <p:nvCxnSpPr>
+          <p:cNvPr id="20" name="Straight Connector 19">
+            <a:extLst>
+              <a:ext uri="{FF2B5EF4-FFF2-40B4-BE49-F238E27FC236}">
+                <a16:creationId xmlns:a16="http://schemas.microsoft.com/office/drawing/2014/main" id="{8D0C36B7-B43D-4D28-BC2A-4B45A8C6A8A1}"/>
+              </a:ext>
+            </a:extLst>
+          </p:cNvPr>
+          <p:cNvCxnSpPr>
+            <a:cxnSpLocks/>
+          </p:cNvCxnSpPr>
+          <p:nvPr/>
+        </p:nvCxnSpPr>
+        <p:spPr>
+          <a:xfrm flipV="1">
+            <a:off x="3020643" y="4074421"/>
+            <a:ext cx="545114" cy="545705"/>
+          </a:xfrm>
+          <a:prstGeom prst="line">
+            <a:avLst/>
+          </a:prstGeom>
+        </p:spPr>
+        <p:style>
+          <a:lnRef idx="1">
+            <a:schemeClr val="accent1"/>
+          </a:lnRef>
+          <a:fillRef idx="0">
+            <a:schemeClr val="accent1"/>
+          </a:fillRef>
+          <a:effectRef idx="0">
+            <a:schemeClr val="accent1"/>
+          </a:effectRef>
+          <a:fontRef idx="minor">
+            <a:schemeClr val="tx1"/>
+          </a:fontRef>
+        </p:style>
+      </p:cxnSp>
+      <p:sp>
+        <p:nvSpPr>
+          <p:cNvPr id="21" name="Title 3">
+            <a:extLst>
+              <a:ext uri="{FF2B5EF4-FFF2-40B4-BE49-F238E27FC236}">
+                <a16:creationId xmlns:a16="http://schemas.microsoft.com/office/drawing/2014/main" id="{E7C07790-CF27-40B5-8659-5A64568497A6}"/>
+              </a:ext>
+            </a:extLst>
+          </p:cNvPr>
+          <p:cNvSpPr txBox="1">
+            <a:spLocks/>
+          </p:cNvSpPr>
+          <p:nvPr/>
+        </p:nvSpPr>
+        <p:spPr>
+          <a:xfrm>
+            <a:off x="1216995" y="471509"/>
+            <a:ext cx="9506686" cy="576260"/>
+          </a:xfrm>
+          <a:prstGeom prst="rect">
+            <a:avLst/>
+          </a:prstGeom>
+        </p:spPr>
+        <p:txBody>
+          <a:bodyPr>
+            <a:normAutofit lnSpcReduction="10000"/>
+          </a:bodyPr>
+          <a:lstStyle>
+            <a:lvl1pPr algn="l" defTabSz="914400" rtl="0" eaLnBrk="1" latinLnBrk="0" hangingPunct="1">
+              <a:lnSpc>
+                <a:spcPct val="90000"/>
+              </a:lnSpc>
+              <a:spcBef>
+                <a:spcPct val="0"/>
+              </a:spcBef>
+              <a:buNone/>
+              <a:defRPr sz="4400" kern="1200">
+                <a:solidFill>
+                  <a:schemeClr val="tx1"/>
+                </a:solidFill>
+                <a:latin typeface="+mj-lt"/>
+                <a:ea typeface="+mj-ea"/>
+                <a:cs typeface="+mj-cs"/>
+              </a:defRPr>
+            </a:lvl1pPr>
+          </a:lstStyle>
+          <a:p>
+            <a:pPr algn="ctr"/>
+            <a:r>
+              <a:rPr lang="en-US" sz="3600" dirty="0"/>
+              <a:t>Covid-19 Countries: Bermuda, Israel, Seychelles </a:t>
+            </a:r>
+          </a:p>
+        </p:txBody>
+      </p:sp>
+      <p:sp>
+        <p:nvSpPr>
+          <p:cNvPr id="22" name="TextBox 21">
+            <a:extLst>
+              <a:ext uri="{FF2B5EF4-FFF2-40B4-BE49-F238E27FC236}">
+                <a16:creationId xmlns:a16="http://schemas.microsoft.com/office/drawing/2014/main" id="{6FF29675-33F8-4613-AF2C-2D6A57EE786E}"/>
+              </a:ext>
+            </a:extLst>
+          </p:cNvPr>
+          <p:cNvSpPr txBox="1"/>
+          <p:nvPr/>
+        </p:nvSpPr>
+        <p:spPr>
+          <a:xfrm>
+            <a:off x="2599614" y="962403"/>
+            <a:ext cx="6592513" cy="369332"/>
+          </a:xfrm>
+          <a:prstGeom prst="rect">
+            <a:avLst/>
+          </a:prstGeom>
+          <a:noFill/>
+        </p:spPr>
+        <p:txBody>
+          <a:bodyPr wrap="square" rtlCol="0">
+            <a:spAutoFit/>
+          </a:bodyPr>
+          <a:lstStyle/>
+          <a:p>
+            <a:r>
+              <a:rPr lang="en-US" sz="1800" dirty="0"/>
+              <a:t>High GDP,  High Vaccination Rate, and Low Death Rate by Population</a:t>
+            </a:r>
+            <a:endParaRPr lang="en-US" dirty="0"/>
+          </a:p>
+        </p:txBody>
+      </p:sp>
+    </p:spTree>
+    <p:extLst>
+      <p:ext uri="{BB962C8B-B14F-4D97-AF65-F5344CB8AC3E}">
+        <p14:creationId xmlns:p14="http://schemas.microsoft.com/office/powerpoint/2010/main" val="528814730"/>
+      </p:ext>
+    </p:extLst>
+  </p:cSld>
+  <p:clrMapOvr>
+    <a:masterClrMapping/>
+  </p:clrMapOvr>
+</p:sld>
+</file>
+
+<file path=ppt/slides/slide2.xml><?xml version="1.0" encoding="utf-8"?>
+<p:sld xmlns:a="http://schemas.openxmlformats.org/drawingml/2006/main" xmlns:r="http://schemas.openxmlformats.org/officeDocument/2006/relationships" xmlns:p="http://schemas.openxmlformats.org/presentationml/2006/main">
+  <p:cSld>
+    <p:spTree>
+      <p:nvGrpSpPr>
+        <p:cNvPr id="1" name=""/>
+        <p:cNvGrpSpPr/>
+        <p:nvPr/>
+      </p:nvGrpSpPr>
+      <p:grpSpPr>
+        <a:xfrm>
+          <a:off x="0" y="0"/>
+          <a:ext cx="0" cy="0"/>
+          <a:chOff x="0" y="0"/>
+          <a:chExt cx="0" cy="0"/>
+        </a:xfrm>
+      </p:grpSpPr>
+      <p:sp>
+        <p:nvSpPr>
+          <p:cNvPr id="4" name="Title 3">
+            <a:extLst>
+              <a:ext uri="{FF2B5EF4-FFF2-40B4-BE49-F238E27FC236}">
+                <a16:creationId xmlns:a16="http://schemas.microsoft.com/office/drawing/2014/main" id="{8DB41184-8C94-46D3-9D80-4AC9E806E8D5}"/>
+              </a:ext>
+            </a:extLst>
+          </p:cNvPr>
+          <p:cNvSpPr>
+            <a:spLocks noGrp="1"/>
+          </p:cNvSpPr>
+          <p:nvPr>
+            <p:ph type="title"/>
+          </p:nvPr>
+        </p:nvSpPr>
+        <p:spPr>
+          <a:xfrm>
+            <a:off x="838200" y="212726"/>
+            <a:ext cx="10515600" cy="1111250"/>
+          </a:xfrm>
+        </p:spPr>
+        <p:txBody>
+          <a:bodyPr>
+            <a:normAutofit fontScale="90000"/>
+          </a:bodyPr>
+          <a:lstStyle/>
+          <a:p>
+            <a:pPr algn="ctr"/>
+            <a:br>
+              <a:rPr lang="en-US" sz="4400" dirty="0"/>
+            </a:br>
+            <a:r>
+              <a:rPr lang="en-US" sz="4400" b="1" dirty="0"/>
+              <a:t>Novel Corona Virus 2019</a:t>
+            </a:r>
+            <a:br>
+              <a:rPr lang="en-US" sz="4400" dirty="0"/>
+            </a:br>
+            <a:endParaRPr lang="en-US" dirty="0"/>
+          </a:p>
+        </p:txBody>
+      </p:sp>
+      <p:sp>
+        <p:nvSpPr>
+          <p:cNvPr id="2" name="TextBox 1">
+            <a:extLst>
+              <a:ext uri="{FF2B5EF4-FFF2-40B4-BE49-F238E27FC236}">
+                <a16:creationId xmlns:a16="http://schemas.microsoft.com/office/drawing/2014/main" id="{33404137-0131-4B8F-86C0-74DB67499F7B}"/>
+              </a:ext>
+            </a:extLst>
+          </p:cNvPr>
+          <p:cNvSpPr txBox="1"/>
+          <p:nvPr/>
+        </p:nvSpPr>
+        <p:spPr>
+          <a:xfrm>
+            <a:off x="965524" y="1017490"/>
+            <a:ext cx="10515600" cy="5062924"/>
+          </a:xfrm>
+          <a:prstGeom prst="rect">
+            <a:avLst/>
+          </a:prstGeom>
+          <a:noFill/>
+        </p:spPr>
+        <p:txBody>
+          <a:bodyPr wrap="square" rtlCol="0">
+            <a:spAutoFit/>
+          </a:bodyPr>
+          <a:lstStyle/>
+          <a:p>
+            <a:r>
+              <a:rPr lang="en-US" sz="1700" dirty="0"/>
+              <a:t>Project Summary/Objectives </a:t>
+            </a:r>
+          </a:p>
+          <a:p>
+            <a:endParaRPr lang="en-US" sz="1700" dirty="0"/>
+          </a:p>
+          <a:p>
+            <a:pPr marL="742950" lvl="1" indent="-285750">
+              <a:buFont typeface="Arial" panose="020B0604020202020204" pitchFamily="34" charset="0"/>
+              <a:buChar char="•"/>
+            </a:pPr>
+            <a:r>
+              <a:rPr lang="en-US" sz="1700" dirty="0"/>
+              <a:t>The team objectives are to identify significant trends of the global Covid-19 outbreak from January 2020 through April 2021.  In addition, the team will look at trends of the Covid-19 outbreak in relationship to World Population, GDP, and available vaccinations.   </a:t>
+            </a:r>
+          </a:p>
+          <a:p>
+            <a:pPr marL="742950" lvl="1" indent="-285750">
+              <a:buFont typeface="Arial" panose="020B0604020202020204" pitchFamily="34" charset="0"/>
+              <a:buChar char="•"/>
+            </a:pPr>
+            <a:r>
+              <a:rPr lang="en-US" sz="1700" dirty="0"/>
+              <a:t>Pandas data queries, Matplotlib data visualization charts, and GMAPS will be used for analysis.  </a:t>
+            </a:r>
+          </a:p>
+          <a:p>
+            <a:pPr marL="742950" lvl="1" indent="-285750">
+              <a:buFont typeface="Arial" panose="020B0604020202020204" pitchFamily="34" charset="0"/>
+              <a:buChar char="•"/>
+            </a:pPr>
+            <a:endParaRPr lang="en-US" sz="1700" dirty="0"/>
+          </a:p>
+          <a:p>
+            <a:r>
+              <a:rPr lang="en-US" sz="1700" dirty="0"/>
+              <a:t>Questions asked by the Team </a:t>
+            </a:r>
+          </a:p>
+          <a:p>
+            <a:endParaRPr lang="en-US" sz="1700" dirty="0"/>
+          </a:p>
+          <a:p>
+            <a:pPr marL="742950" lvl="1" indent="-285750">
+              <a:buFont typeface="Arial" panose="020B0604020202020204" pitchFamily="34" charset="0"/>
+              <a:buChar char="•"/>
+            </a:pPr>
+            <a:r>
+              <a:rPr lang="en-US" sz="1700" dirty="0"/>
+              <a:t>Where did the first Covid-19 cases get reported?     </a:t>
+            </a:r>
+          </a:p>
+          <a:p>
+            <a:pPr marL="742950" lvl="1" indent="-285750">
+              <a:buFont typeface="Arial" panose="020B0604020202020204" pitchFamily="34" charset="0"/>
+              <a:buChar char="•"/>
+            </a:pPr>
+            <a:r>
+              <a:rPr lang="en-US" sz="1700" dirty="0"/>
+              <a:t>Availability vaccinations by manufacturer and country?   	</a:t>
+            </a:r>
+          </a:p>
+          <a:p>
+            <a:pPr marL="742950" lvl="1" indent="-285750">
+              <a:buFont typeface="Arial" panose="020B0604020202020204" pitchFamily="34" charset="0"/>
+              <a:buChar char="•"/>
+            </a:pPr>
+            <a:r>
+              <a:rPr lang="en-US" sz="1700" dirty="0"/>
+              <a:t>Does GDP and population have any impact or influence on the covid 19 outbreak?</a:t>
+            </a:r>
+          </a:p>
+          <a:p>
+            <a:pPr marL="742950" lvl="1" indent="-285750">
+              <a:buFont typeface="Arial" panose="020B0604020202020204" pitchFamily="34" charset="0"/>
+              <a:buChar char="•"/>
+            </a:pPr>
+            <a:r>
+              <a:rPr lang="en-US" sz="1700" dirty="0"/>
+              <a:t>Which countries are impacted the most and least by the covid 19 outbreak?  </a:t>
+            </a:r>
+          </a:p>
+          <a:p>
+            <a:endParaRPr lang="en-US" sz="1700" dirty="0"/>
+          </a:p>
+          <a:p>
+            <a:r>
+              <a:rPr lang="en-US" sz="1700" dirty="0"/>
+              <a:t>Were the questions answered to the teams satisfaction?   The following exceptions were noted during the teams analysis:</a:t>
+            </a:r>
+          </a:p>
+          <a:p>
+            <a:pPr marL="742950" lvl="1" indent="-285750">
+              <a:buFont typeface="Arial" panose="020B0604020202020204" pitchFamily="34" charset="0"/>
+              <a:buChar char="•"/>
+            </a:pPr>
+            <a:endParaRPr lang="en-US" sz="1700" dirty="0"/>
+          </a:p>
+          <a:p>
+            <a:pPr marL="742950" lvl="1" indent="-285750">
+              <a:buFont typeface="Arial" panose="020B0604020202020204" pitchFamily="34" charset="0"/>
+              <a:buChar char="•"/>
+            </a:pPr>
+            <a:r>
+              <a:rPr lang="en-US" sz="1700" dirty="0"/>
+              <a:t>Mexico - unusually high percent relationship between deaths and the number of confirmed Covid 19 cases.  </a:t>
+            </a:r>
+          </a:p>
+          <a:p>
+            <a:pPr marL="742950" lvl="1" indent="-285750">
+              <a:buFont typeface="Arial" panose="020B0604020202020204" pitchFamily="34" charset="0"/>
+              <a:buChar char="•"/>
+            </a:pPr>
+            <a:r>
+              <a:rPr lang="en-US" sz="1700" dirty="0"/>
+              <a:t>US - discontinuance  of reporting Covid 19 recoveries in mid December 2020.</a:t>
+            </a:r>
+          </a:p>
+        </p:txBody>
+      </p:sp>
+      <p:sp>
+        <p:nvSpPr>
+          <p:cNvPr id="6" name="Footer Placeholder 5">
+            <a:extLst>
+              <a:ext uri="{FF2B5EF4-FFF2-40B4-BE49-F238E27FC236}">
+                <a16:creationId xmlns:a16="http://schemas.microsoft.com/office/drawing/2014/main" id="{77C2FFDB-1B57-42BE-AE0C-A6DF0E49B352}"/>
+              </a:ext>
+            </a:extLst>
+          </p:cNvPr>
+          <p:cNvSpPr>
+            <a:spLocks noGrp="1"/>
+          </p:cNvSpPr>
+          <p:nvPr>
+            <p:ph type="ftr" sz="quarter" idx="11"/>
+          </p:nvPr>
+        </p:nvSpPr>
+        <p:spPr/>
+        <p:txBody>
+          <a:bodyPr/>
+          <a:lstStyle/>
+          <a:p>
+            <a:r>
+              <a:rPr lang="en-US"/>
+              <a:t>https://github.com/makbarish/Grp5_Project1_Covid19</a:t>
+            </a:r>
+          </a:p>
+        </p:txBody>
+      </p:sp>
+      <p:sp>
+        <p:nvSpPr>
+          <p:cNvPr id="3" name="Date Placeholder 2">
+            <a:extLst>
+              <a:ext uri="{FF2B5EF4-FFF2-40B4-BE49-F238E27FC236}">
+                <a16:creationId xmlns:a16="http://schemas.microsoft.com/office/drawing/2014/main" id="{01C4E82E-C648-46BF-B81C-6E9F354A79D6}"/>
+              </a:ext>
+            </a:extLst>
+          </p:cNvPr>
+          <p:cNvSpPr>
+            <a:spLocks noGrp="1"/>
+          </p:cNvSpPr>
+          <p:nvPr>
+            <p:ph type="dt" sz="half" idx="10"/>
+          </p:nvPr>
+        </p:nvSpPr>
+        <p:spPr/>
+        <p:txBody>
+          <a:bodyPr/>
+          <a:lstStyle/>
+          <a:p>
+            <a:r>
+              <a:rPr lang="en-US"/>
+              <a:t>6/9/2021</a:t>
+            </a:r>
+          </a:p>
+        </p:txBody>
+      </p:sp>
+      <p:sp>
+        <p:nvSpPr>
+          <p:cNvPr id="5" name="Slide Number Placeholder 4">
+            <a:extLst>
+              <a:ext uri="{FF2B5EF4-FFF2-40B4-BE49-F238E27FC236}">
+                <a16:creationId xmlns:a16="http://schemas.microsoft.com/office/drawing/2014/main" id="{5D043AD4-BD37-4211-85A4-DB5E5AC9EB55}"/>
+              </a:ext>
+            </a:extLst>
+          </p:cNvPr>
+          <p:cNvSpPr>
+            <a:spLocks noGrp="1"/>
+          </p:cNvSpPr>
+          <p:nvPr>
+            <p:ph type="sldNum" sz="quarter" idx="12"/>
+          </p:nvPr>
+        </p:nvSpPr>
+        <p:spPr/>
+        <p:txBody>
+          <a:bodyPr/>
+          <a:lstStyle/>
+          <a:p>
+            <a:fld id="{3AA9003C-6A8E-4863-AB7A-EC3E1B799067}" type="slidenum">
+              <a:rPr lang="en-US" smtClean="0"/>
+              <a:t>2</a:t>
+            </a:fld>
+            <a:endParaRPr lang="en-US"/>
+          </a:p>
+        </p:txBody>
+      </p:sp>
+    </p:spTree>
+    <p:extLst>
+      <p:ext uri="{BB962C8B-B14F-4D97-AF65-F5344CB8AC3E}">
+        <p14:creationId xmlns:p14="http://schemas.microsoft.com/office/powerpoint/2010/main" val="292027236"/>
+      </p:ext>
+    </p:extLst>
+  </p:cSld>
+  <p:clrMapOvr>
+    <a:masterClrMapping/>
+  </p:clrMapOvr>
+</p:sld>
+</file>
+
+<file path=ppt/slides/slide20.xml><?xml version="1.0" encoding="utf-8"?>
+<p:sld xmlns:a="http://schemas.openxmlformats.org/drawingml/2006/main" xmlns:r="http://schemas.openxmlformats.org/officeDocument/2006/relationships" xmlns:p="http://schemas.openxmlformats.org/presentationml/2006/main">
+  <p:cSld>
+    <p:spTree>
+      <p:nvGrpSpPr>
+        <p:cNvPr id="1" name=""/>
+        <p:cNvGrpSpPr/>
+        <p:nvPr/>
+      </p:nvGrpSpPr>
+      <p:grpSpPr>
+        <a:xfrm>
+          <a:off x="0" y="0"/>
+          <a:ext cx="0" cy="0"/>
+          <a:chOff x="0" y="0"/>
+          <a:chExt cx="0" cy="0"/>
+        </a:xfrm>
+      </p:grpSpPr>
+      <p:sp>
+        <p:nvSpPr>
           <p:cNvPr id="4" name="Title 3">
             <a:extLst>
               <a:ext uri="{FF2B5EF4-FFF2-40B4-BE49-F238E27FC236}">
@@ -8027,7 +8777,7 @@
                 <a:tabLst/>
                 <a:defRPr/>
               </a:pPr>
-              <a:t>19</a:t>
+              <a:t>20</a:t>
             </a:fld>
             <a:endParaRPr kumimoji="0" lang="en-US" sz="1200" b="0" i="0" u="none" strike="noStrike" kern="1200" cap="none" spc="0" normalizeH="0" baseline="0" noProof="0">
               <a:ln>
@@ -8152,314 +8902,6 @@
     <p:extLst>
       <p:ext uri="{BB962C8B-B14F-4D97-AF65-F5344CB8AC3E}">
         <p14:creationId xmlns:p14="http://schemas.microsoft.com/office/powerpoint/2010/main" val="1607740863"/>
-      </p:ext>
-    </p:extLst>
-  </p:cSld>
-  <p:clrMapOvr>
-    <a:masterClrMapping/>
-  </p:clrMapOvr>
-</p:sld>
-</file>
-
-<file path=ppt/slides/slide2.xml><?xml version="1.0" encoding="utf-8"?>
-<p:sld xmlns:a="http://schemas.openxmlformats.org/drawingml/2006/main" xmlns:r="http://schemas.openxmlformats.org/officeDocument/2006/relationships" xmlns:p="http://schemas.openxmlformats.org/presentationml/2006/main">
-  <p:cSld>
-    <p:spTree>
-      <p:nvGrpSpPr>
-        <p:cNvPr id="1" name=""/>
-        <p:cNvGrpSpPr/>
-        <p:nvPr/>
-      </p:nvGrpSpPr>
-      <p:grpSpPr>
-        <a:xfrm>
-          <a:off x="0" y="0"/>
-          <a:ext cx="0" cy="0"/>
-          <a:chOff x="0" y="0"/>
-          <a:chExt cx="0" cy="0"/>
-        </a:xfrm>
-      </p:grpSpPr>
-      <p:sp>
-        <p:nvSpPr>
-          <p:cNvPr id="4" name="Title 3">
-            <a:extLst>
-              <a:ext uri="{FF2B5EF4-FFF2-40B4-BE49-F238E27FC236}">
-                <a16:creationId xmlns:a16="http://schemas.microsoft.com/office/drawing/2014/main" id="{8DB41184-8C94-46D3-9D80-4AC9E806E8D5}"/>
-              </a:ext>
-            </a:extLst>
-          </p:cNvPr>
-          <p:cNvSpPr>
-            <a:spLocks noGrp="1"/>
-          </p:cNvSpPr>
-          <p:nvPr>
-            <p:ph type="title"/>
-          </p:nvPr>
-        </p:nvSpPr>
-        <p:spPr>
-          <a:xfrm>
-            <a:off x="838200" y="212726"/>
-            <a:ext cx="10515600" cy="1111250"/>
-          </a:xfrm>
-        </p:spPr>
-        <p:txBody>
-          <a:bodyPr>
-            <a:normAutofit fontScale="90000"/>
-          </a:bodyPr>
-          <a:lstStyle/>
-          <a:p>
-            <a:pPr algn="ctr"/>
-            <a:br>
-              <a:rPr lang="en-US" sz="4400" dirty="0"/>
-            </a:br>
-            <a:r>
-              <a:rPr lang="en-US" sz="4400" b="1" dirty="0"/>
-              <a:t>Novel Corona Virus 2019</a:t>
-            </a:r>
-            <a:br>
-              <a:rPr lang="en-US" sz="4400" dirty="0"/>
-            </a:br>
-            <a:endParaRPr lang="en-US" dirty="0"/>
-          </a:p>
-        </p:txBody>
-      </p:sp>
-      <p:sp>
-        <p:nvSpPr>
-          <p:cNvPr id="2" name="TextBox 1">
-            <a:extLst>
-              <a:ext uri="{FF2B5EF4-FFF2-40B4-BE49-F238E27FC236}">
-                <a16:creationId xmlns:a16="http://schemas.microsoft.com/office/drawing/2014/main" id="{33404137-0131-4B8F-86C0-74DB67499F7B}"/>
-              </a:ext>
-            </a:extLst>
-          </p:cNvPr>
-          <p:cNvSpPr txBox="1"/>
-          <p:nvPr/>
-        </p:nvSpPr>
-        <p:spPr>
-          <a:xfrm>
-            <a:off x="965524" y="1017490"/>
-            <a:ext cx="10515600" cy="5062924"/>
-          </a:xfrm>
-          <a:prstGeom prst="rect">
-            <a:avLst/>
-          </a:prstGeom>
-          <a:noFill/>
-        </p:spPr>
-        <p:txBody>
-          <a:bodyPr wrap="square" rtlCol="0">
-            <a:spAutoFit/>
-          </a:bodyPr>
-          <a:lstStyle/>
-          <a:p>
-            <a:r>
-              <a:rPr lang="en-US" sz="1700" dirty="0"/>
-              <a:t>Project Summary/Objectives </a:t>
-            </a:r>
-          </a:p>
-          <a:p>
-            <a:endParaRPr lang="en-US" sz="1700" dirty="0"/>
-          </a:p>
-          <a:p>
-            <a:pPr marL="742950" lvl="1" indent="-285750">
-              <a:buFont typeface="Arial" panose="020B0604020202020204" pitchFamily="34" charset="0"/>
-              <a:buChar char="•"/>
-            </a:pPr>
-            <a:r>
-              <a:rPr lang="en-US" sz="1700" dirty="0"/>
-              <a:t>The team objectives are to identify significant trends of the global Covid-19 outbreak from January 2020 through April 2021.  In addition, the team will look at trends of the Covid-19 outbreak in relationship to World Population, GDP, and available vaccinations.   </a:t>
-            </a:r>
-          </a:p>
-          <a:p>
-            <a:pPr marL="742950" lvl="1" indent="-285750">
-              <a:buFont typeface="Arial" panose="020B0604020202020204" pitchFamily="34" charset="0"/>
-              <a:buChar char="•"/>
-            </a:pPr>
-            <a:r>
-              <a:rPr lang="en-US" sz="1700" dirty="0"/>
-              <a:t>Pandas data queries and Matplotlib data visualization charts will be used for analysis.  </a:t>
-            </a:r>
-          </a:p>
-          <a:p>
-            <a:pPr marL="742950" lvl="1" indent="-285750">
-              <a:buFont typeface="Arial" panose="020B0604020202020204" pitchFamily="34" charset="0"/>
-              <a:buChar char="•"/>
-            </a:pPr>
-            <a:endParaRPr lang="en-US" sz="1700" dirty="0"/>
-          </a:p>
-          <a:p>
-            <a:r>
-              <a:rPr lang="en-US" sz="1700" dirty="0"/>
-              <a:t>Questions asked by the Team </a:t>
-            </a:r>
-          </a:p>
-          <a:p>
-            <a:endParaRPr lang="en-US" sz="1700" dirty="0"/>
-          </a:p>
-          <a:p>
-            <a:pPr marL="742950" lvl="1" indent="-285750">
-              <a:buFont typeface="Arial" panose="020B0604020202020204" pitchFamily="34" charset="0"/>
-              <a:buChar char="•"/>
-            </a:pPr>
-            <a:r>
-              <a:rPr lang="en-US" sz="1700" dirty="0"/>
-              <a:t>Where did the first Covid-19 cases get reported?     </a:t>
-            </a:r>
-          </a:p>
-          <a:p>
-            <a:pPr marL="742950" lvl="1" indent="-285750">
-              <a:buFont typeface="Arial" panose="020B0604020202020204" pitchFamily="34" charset="0"/>
-              <a:buChar char="•"/>
-            </a:pPr>
-            <a:r>
-              <a:rPr lang="en-US" sz="1700" dirty="0"/>
-              <a:t>Availability vaccinations by manufacturer and country?   	</a:t>
-            </a:r>
-          </a:p>
-          <a:p>
-            <a:pPr marL="742950" lvl="1" indent="-285750">
-              <a:buFont typeface="Arial" panose="020B0604020202020204" pitchFamily="34" charset="0"/>
-              <a:buChar char="•"/>
-            </a:pPr>
-            <a:r>
-              <a:rPr lang="en-US" sz="1700" dirty="0"/>
-              <a:t>Does GDP and population have any impact or influence on the covid 19 outbreak?</a:t>
-            </a:r>
-          </a:p>
-          <a:p>
-            <a:pPr marL="742950" lvl="1" indent="-285750">
-              <a:buFont typeface="Arial" panose="020B0604020202020204" pitchFamily="34" charset="0"/>
-              <a:buChar char="•"/>
-            </a:pPr>
-            <a:r>
-              <a:rPr lang="en-US" sz="1700" dirty="0"/>
-              <a:t>Which countries are impacted the most and least by the covid 19 outbreak?  </a:t>
-            </a:r>
-          </a:p>
-          <a:p>
-            <a:endParaRPr lang="en-US" sz="1700" dirty="0"/>
-          </a:p>
-          <a:p>
-            <a:r>
-              <a:rPr lang="en-US" sz="1700" dirty="0"/>
-              <a:t>Were the questions answered to the teams satisfaction?   The following exceptions were noted during the teams analysis:</a:t>
-            </a:r>
-          </a:p>
-          <a:p>
-            <a:pPr marL="742950" lvl="1" indent="-285750">
-              <a:buFont typeface="Arial" panose="020B0604020202020204" pitchFamily="34" charset="0"/>
-              <a:buChar char="•"/>
-            </a:pPr>
-            <a:endParaRPr lang="en-US" sz="1700" dirty="0"/>
-          </a:p>
-          <a:p>
-            <a:pPr marL="742950" lvl="1" indent="-285750">
-              <a:buFont typeface="Arial" panose="020B0604020202020204" pitchFamily="34" charset="0"/>
-              <a:buChar char="•"/>
-            </a:pPr>
-            <a:r>
-              <a:rPr lang="en-US" sz="1700" dirty="0"/>
-              <a:t>Mexico - unusually high percent relationship between deaths and the number of confirmed Covid 19 cases.  </a:t>
-            </a:r>
-          </a:p>
-          <a:p>
-            <a:pPr marL="742950" lvl="1" indent="-285750">
-              <a:buFont typeface="Arial" panose="020B0604020202020204" pitchFamily="34" charset="0"/>
-              <a:buChar char="•"/>
-            </a:pPr>
-            <a:r>
-              <a:rPr lang="en-US" sz="1700" dirty="0"/>
-              <a:t>US - discontinuance  of reporting Covid 19 recoveries in mid December 2020.</a:t>
-            </a:r>
-          </a:p>
-        </p:txBody>
-      </p:sp>
-      <p:sp>
-        <p:nvSpPr>
-          <p:cNvPr id="6" name="Footer Placeholder 5">
-            <a:extLst>
-              <a:ext uri="{FF2B5EF4-FFF2-40B4-BE49-F238E27FC236}">
-                <a16:creationId xmlns:a16="http://schemas.microsoft.com/office/drawing/2014/main" id="{77C2FFDB-1B57-42BE-AE0C-A6DF0E49B352}"/>
-              </a:ext>
-            </a:extLst>
-          </p:cNvPr>
-          <p:cNvSpPr>
-            <a:spLocks noGrp="1"/>
-          </p:cNvSpPr>
-          <p:nvPr>
-            <p:ph type="ftr" sz="quarter" idx="11"/>
-          </p:nvPr>
-        </p:nvSpPr>
-        <p:spPr/>
-        <p:txBody>
-          <a:bodyPr/>
-          <a:lstStyle/>
-          <a:p>
-            <a:r>
-              <a:rPr lang="en-US"/>
-              <a:t>https://github.com/makbarish/Grp5_Project1_Covid19</a:t>
-            </a:r>
-          </a:p>
-        </p:txBody>
-      </p:sp>
-      <p:sp>
-        <p:nvSpPr>
-          <p:cNvPr id="3" name="Date Placeholder 2">
-            <a:extLst>
-              <a:ext uri="{FF2B5EF4-FFF2-40B4-BE49-F238E27FC236}">
-                <a16:creationId xmlns:a16="http://schemas.microsoft.com/office/drawing/2014/main" id="{01C4E82E-C648-46BF-B81C-6E9F354A79D6}"/>
-              </a:ext>
-            </a:extLst>
-          </p:cNvPr>
-          <p:cNvSpPr>
-            <a:spLocks noGrp="1"/>
-          </p:cNvSpPr>
-          <p:nvPr>
-            <p:ph type="dt" sz="half" idx="10"/>
-          </p:nvPr>
-        </p:nvSpPr>
-        <p:spPr/>
-        <p:txBody>
-          <a:bodyPr/>
-          <a:lstStyle/>
-          <a:p>
-            <a:r>
-              <a:rPr lang="en-US"/>
-              <a:t>6/9/2021</a:t>
-            </a:r>
-          </a:p>
-        </p:txBody>
-      </p:sp>
-      <p:sp>
-        <p:nvSpPr>
-          <p:cNvPr id="5" name="Slide Number Placeholder 4">
-            <a:extLst>
-              <a:ext uri="{FF2B5EF4-FFF2-40B4-BE49-F238E27FC236}">
-                <a16:creationId xmlns:a16="http://schemas.microsoft.com/office/drawing/2014/main" id="{5D043AD4-BD37-4211-85A4-DB5E5AC9EB55}"/>
-              </a:ext>
-            </a:extLst>
-          </p:cNvPr>
-          <p:cNvSpPr>
-            <a:spLocks noGrp="1"/>
-          </p:cNvSpPr>
-          <p:nvPr>
-            <p:ph type="sldNum" sz="quarter" idx="12"/>
-          </p:nvPr>
-        </p:nvSpPr>
-        <p:spPr/>
-        <p:txBody>
-          <a:bodyPr/>
-          <a:lstStyle/>
-          <a:p>
-            <a:fld id="{3AA9003C-6A8E-4863-AB7A-EC3E1B799067}" type="slidenum">
-              <a:rPr lang="en-US" smtClean="0"/>
-              <a:t>2</a:t>
-            </a:fld>
-            <a:endParaRPr lang="en-US"/>
-          </a:p>
-        </p:txBody>
-      </p:sp>
-    </p:spTree>
-    <p:extLst>
-      <p:ext uri="{BB962C8B-B14F-4D97-AF65-F5344CB8AC3E}">
-        <p14:creationId xmlns:p14="http://schemas.microsoft.com/office/powerpoint/2010/main" val="292027236"/>
       </p:ext>
     </p:extLst>
   </p:cSld>

</xml_diff>

<commit_message>
Edited ppt file slides 5, & 6
</commit_message>
<xml_diff>
--- a/Clay/Novel_Corona_Virus_2019_v2.pptx
+++ b/Clay/Novel_Corona_Virus_2019_v2.pptx
@@ -272,7 +272,7 @@
           <a:p>
             <a:fld id="{49E4E37A-8C9F-4B25-B068-6A7177E6E2F6}" type="datetimeFigureOut">
               <a:rPr lang="en-US" smtClean="0"/>
-              <a:t>6/8/2021</a:t>
+              <a:t>6/9/2021</a:t>
             </a:fld>
             <a:endParaRPr lang="en-US"/>
           </a:p>
@@ -450,7 +450,7 @@
           <a:p>
             <a:fld id="{9023BEA9-FA89-4F42-A6AE-03E83D737B38}" type="datetimeFigureOut">
               <a:rPr lang="en-US" smtClean="0"/>
-              <a:t>6/8/2021</a:t>
+              <a:t>6/9/2021</a:t>
             </a:fld>
             <a:endParaRPr lang="en-US"/>
           </a:p>
@@ -9844,6 +9844,583 @@
           </a:prstGeom>
         </p:spPr>
       </p:pic>
+      <p:cxnSp>
+        <p:nvCxnSpPr>
+          <p:cNvPr id="12" name="Straight Connector 11">
+            <a:extLst>
+              <a:ext uri="{FF2B5EF4-FFF2-40B4-BE49-F238E27FC236}">
+                <a16:creationId xmlns:a16="http://schemas.microsoft.com/office/drawing/2014/main" id="{28183E56-8C91-4D07-B069-DCF6777EC2A8}"/>
+              </a:ext>
+            </a:extLst>
+          </p:cNvPr>
+          <p:cNvCxnSpPr>
+            <a:cxnSpLocks/>
+          </p:cNvCxnSpPr>
+          <p:nvPr/>
+        </p:nvCxnSpPr>
+        <p:spPr>
+          <a:xfrm>
+            <a:off x="7117359" y="4373026"/>
+            <a:ext cx="0" cy="1377086"/>
+          </a:xfrm>
+          <a:prstGeom prst="line">
+            <a:avLst/>
+          </a:prstGeom>
+          <a:ln>
+            <a:prstDash val="lgDashDotDot"/>
+          </a:ln>
+        </p:spPr>
+        <p:style>
+          <a:lnRef idx="1">
+            <a:schemeClr val="accent1"/>
+          </a:lnRef>
+          <a:fillRef idx="0">
+            <a:schemeClr val="accent1"/>
+          </a:fillRef>
+          <a:effectRef idx="0">
+            <a:schemeClr val="accent1"/>
+          </a:effectRef>
+          <a:fontRef idx="minor">
+            <a:schemeClr val="tx1"/>
+          </a:fontRef>
+        </p:style>
+      </p:cxnSp>
+      <p:cxnSp>
+        <p:nvCxnSpPr>
+          <p:cNvPr id="14" name="Straight Connector 13">
+            <a:extLst>
+              <a:ext uri="{FF2B5EF4-FFF2-40B4-BE49-F238E27FC236}">
+                <a16:creationId xmlns:a16="http://schemas.microsoft.com/office/drawing/2014/main" id="{1ADFAFD7-F17B-45D1-AE2D-43C20CEAA64B}"/>
+              </a:ext>
+            </a:extLst>
+          </p:cNvPr>
+          <p:cNvCxnSpPr>
+            <a:cxnSpLocks/>
+          </p:cNvCxnSpPr>
+          <p:nvPr/>
+        </p:nvCxnSpPr>
+        <p:spPr>
+          <a:xfrm>
+            <a:off x="1835788" y="4363537"/>
+            <a:ext cx="5289960" cy="1"/>
+          </a:xfrm>
+          <a:prstGeom prst="line">
+            <a:avLst/>
+          </a:prstGeom>
+          <a:ln>
+            <a:prstDash val="lgDashDotDot"/>
+          </a:ln>
+        </p:spPr>
+        <p:style>
+          <a:lnRef idx="1">
+            <a:schemeClr val="accent1"/>
+          </a:lnRef>
+          <a:fillRef idx="0">
+            <a:schemeClr val="accent1"/>
+          </a:fillRef>
+          <a:effectRef idx="0">
+            <a:schemeClr val="accent1"/>
+          </a:effectRef>
+          <a:fontRef idx="minor">
+            <a:schemeClr val="tx1"/>
+          </a:fontRef>
+        </p:style>
+      </p:cxnSp>
+      <p:cxnSp>
+        <p:nvCxnSpPr>
+          <p:cNvPr id="22" name="Straight Connector 21">
+            <a:extLst>
+              <a:ext uri="{FF2B5EF4-FFF2-40B4-BE49-F238E27FC236}">
+                <a16:creationId xmlns:a16="http://schemas.microsoft.com/office/drawing/2014/main" id="{07E921A9-0C08-419A-9E43-3526E046626B}"/>
+              </a:ext>
+            </a:extLst>
+          </p:cNvPr>
+          <p:cNvCxnSpPr>
+            <a:cxnSpLocks/>
+          </p:cNvCxnSpPr>
+          <p:nvPr/>
+        </p:nvCxnSpPr>
+        <p:spPr>
+          <a:xfrm flipV="1">
+            <a:off x="1835788" y="5203632"/>
+            <a:ext cx="5289960" cy="1"/>
+          </a:xfrm>
+          <a:prstGeom prst="line">
+            <a:avLst/>
+          </a:prstGeom>
+          <a:ln>
+            <a:prstDash val="lgDashDotDot"/>
+          </a:ln>
+        </p:spPr>
+        <p:style>
+          <a:lnRef idx="1">
+            <a:schemeClr val="accent1"/>
+          </a:lnRef>
+          <a:fillRef idx="0">
+            <a:schemeClr val="accent1"/>
+          </a:fillRef>
+          <a:effectRef idx="0">
+            <a:schemeClr val="accent1"/>
+          </a:effectRef>
+          <a:fontRef idx="minor">
+            <a:schemeClr val="tx1"/>
+          </a:fontRef>
+        </p:style>
+      </p:cxnSp>
+      <p:cxnSp>
+        <p:nvCxnSpPr>
+          <p:cNvPr id="26" name="Straight Connector 25">
+            <a:extLst>
+              <a:ext uri="{FF2B5EF4-FFF2-40B4-BE49-F238E27FC236}">
+                <a16:creationId xmlns:a16="http://schemas.microsoft.com/office/drawing/2014/main" id="{3BFEDEAE-32FF-4FC8-A130-30D125E4294A}"/>
+              </a:ext>
+            </a:extLst>
+          </p:cNvPr>
+          <p:cNvCxnSpPr>
+            <a:cxnSpLocks/>
+          </p:cNvCxnSpPr>
+          <p:nvPr/>
+        </p:nvCxnSpPr>
+        <p:spPr>
+          <a:xfrm flipV="1">
+            <a:off x="1810622" y="4777054"/>
+            <a:ext cx="5289960" cy="1"/>
+          </a:xfrm>
+          <a:prstGeom prst="line">
+            <a:avLst/>
+          </a:prstGeom>
+          <a:ln>
+            <a:prstDash val="lgDashDotDot"/>
+          </a:ln>
+        </p:spPr>
+        <p:style>
+          <a:lnRef idx="1">
+            <a:schemeClr val="accent1"/>
+          </a:lnRef>
+          <a:fillRef idx="0">
+            <a:schemeClr val="accent1"/>
+          </a:fillRef>
+          <a:effectRef idx="0">
+            <a:schemeClr val="accent1"/>
+          </a:effectRef>
+          <a:fontRef idx="minor">
+            <a:schemeClr val="tx1"/>
+          </a:fontRef>
+        </p:style>
+      </p:cxnSp>
+      <p:sp>
+        <p:nvSpPr>
+          <p:cNvPr id="27" name="TextBox 26">
+            <a:extLst>
+              <a:ext uri="{FF2B5EF4-FFF2-40B4-BE49-F238E27FC236}">
+                <a16:creationId xmlns:a16="http://schemas.microsoft.com/office/drawing/2014/main" id="{68130FF9-79BF-472B-90AA-1B351D2CDAEC}"/>
+              </a:ext>
+            </a:extLst>
+          </p:cNvPr>
+          <p:cNvSpPr txBox="1"/>
+          <p:nvPr/>
+        </p:nvSpPr>
+        <p:spPr>
+          <a:xfrm>
+            <a:off x="2004968" y="2792631"/>
+            <a:ext cx="5922625" cy="923330"/>
+          </a:xfrm>
+          <a:prstGeom prst="rect">
+            <a:avLst/>
+          </a:prstGeom>
+          <a:noFill/>
+        </p:spPr>
+        <p:txBody>
+          <a:bodyPr wrap="square" rtlCol="0">
+            <a:spAutoFit/>
+          </a:bodyPr>
+          <a:lstStyle/>
+          <a:p>
+            <a:r>
+              <a:rPr lang="en-US" dirty="0">
+                <a:solidFill>
+                  <a:srgbClr val="0070C0"/>
+                </a:solidFill>
+                <a:latin typeface="Centaur" panose="02030504050205020304" pitchFamily="18" charset="0"/>
+              </a:rPr>
+              <a:t>Confirmed Cases </a:t>
+            </a:r>
+            <a:r>
+              <a:rPr lang="en-US" dirty="0">
+                <a:latin typeface="Centaur" panose="02030504050205020304" pitchFamily="18" charset="0"/>
+              </a:rPr>
+              <a:t>=</a:t>
+            </a:r>
+            <a:r>
+              <a:rPr lang="en-US" dirty="0">
+                <a:solidFill>
+                  <a:srgbClr val="0070C0"/>
+                </a:solidFill>
+                <a:latin typeface="Centaur" panose="02030504050205020304" pitchFamily="18" charset="0"/>
+              </a:rPr>
+              <a:t>  </a:t>
+            </a:r>
+            <a:r>
+              <a:rPr lang="en-US" dirty="0">
+                <a:solidFill>
+                  <a:srgbClr val="FF0000"/>
+                </a:solidFill>
+                <a:latin typeface="Centaur" panose="02030504050205020304" pitchFamily="18" charset="0"/>
+              </a:rPr>
+              <a:t>Active Cases </a:t>
+            </a:r>
+            <a:r>
+              <a:rPr lang="en-US" dirty="0">
+                <a:latin typeface="Centaur" panose="02030504050205020304" pitchFamily="18" charset="0"/>
+              </a:rPr>
+              <a:t>+</a:t>
+            </a:r>
+            <a:r>
+              <a:rPr lang="en-US" dirty="0">
+                <a:solidFill>
+                  <a:srgbClr val="0070C0"/>
+                </a:solidFill>
+                <a:latin typeface="Centaur" panose="02030504050205020304" pitchFamily="18" charset="0"/>
+              </a:rPr>
+              <a:t>  </a:t>
+            </a:r>
+            <a:r>
+              <a:rPr lang="en-US" dirty="0">
+                <a:solidFill>
+                  <a:srgbClr val="00B050"/>
+                </a:solidFill>
+                <a:latin typeface="Centaur" panose="02030504050205020304" pitchFamily="18" charset="0"/>
+              </a:rPr>
+              <a:t>Recovered Cases  </a:t>
+            </a:r>
+            <a:r>
+              <a:rPr lang="en-US" dirty="0">
+                <a:latin typeface="Centaur" panose="02030504050205020304" pitchFamily="18" charset="0"/>
+              </a:rPr>
+              <a:t>+</a:t>
+            </a:r>
+            <a:r>
+              <a:rPr lang="en-US" dirty="0">
+                <a:solidFill>
+                  <a:srgbClr val="0070C0"/>
+                </a:solidFill>
+                <a:latin typeface="Centaur" panose="02030504050205020304" pitchFamily="18" charset="0"/>
+              </a:rPr>
+              <a:t>     </a:t>
+            </a:r>
+            <a:r>
+              <a:rPr lang="en-US" dirty="0">
+                <a:solidFill>
+                  <a:srgbClr val="FFC000"/>
+                </a:solidFill>
+                <a:latin typeface="Centaur" panose="02030504050205020304" pitchFamily="18" charset="0"/>
+              </a:rPr>
+              <a:t>Deaths</a:t>
+            </a:r>
+          </a:p>
+          <a:p>
+            <a:r>
+              <a:rPr lang="en-US" dirty="0">
+                <a:solidFill>
+                  <a:srgbClr val="FFC000"/>
+                </a:solidFill>
+                <a:latin typeface="Centaur" panose="02030504050205020304" pitchFamily="18" charset="0"/>
+              </a:rPr>
+              <a:t>     </a:t>
+            </a:r>
+            <a:r>
+              <a:rPr lang="en-US" dirty="0">
+                <a:solidFill>
+                  <a:srgbClr val="0070C0"/>
+                </a:solidFill>
+                <a:latin typeface="Centaur" panose="02030504050205020304" pitchFamily="18" charset="0"/>
+              </a:rPr>
+              <a:t>0.502e8 </a:t>
+            </a:r>
+            <a:r>
+              <a:rPr lang="en-US" dirty="0">
+                <a:solidFill>
+                  <a:srgbClr val="FFC000"/>
+                </a:solidFill>
+                <a:latin typeface="Centaur" panose="02030504050205020304" pitchFamily="18" charset="0"/>
+              </a:rPr>
+              <a:t>        </a:t>
+            </a:r>
+            <a:r>
+              <a:rPr lang="en-US" dirty="0">
+                <a:latin typeface="Centaur" panose="02030504050205020304" pitchFamily="18" charset="0"/>
+              </a:rPr>
+              <a:t>=     </a:t>
+            </a:r>
+            <a:r>
+              <a:rPr lang="en-US" dirty="0">
+                <a:solidFill>
+                  <a:srgbClr val="FF0000"/>
+                </a:solidFill>
+                <a:latin typeface="Centaur" panose="02030504050205020304" pitchFamily="18" charset="0"/>
+              </a:rPr>
+              <a:t>0.16e8</a:t>
+            </a:r>
+            <a:r>
+              <a:rPr lang="en-US" dirty="0">
+                <a:latin typeface="Centaur" panose="02030504050205020304" pitchFamily="18" charset="0"/>
+              </a:rPr>
+              <a:t>      +       </a:t>
+            </a:r>
+            <a:r>
+              <a:rPr lang="en-US" dirty="0">
+                <a:solidFill>
+                  <a:srgbClr val="00B050"/>
+                </a:solidFill>
+                <a:latin typeface="Centaur" panose="02030504050205020304" pitchFamily="18" charset="0"/>
+              </a:rPr>
+              <a:t>0.33e8 </a:t>
+            </a:r>
+            <a:r>
+              <a:rPr lang="en-US" dirty="0">
+                <a:latin typeface="Centaur" panose="02030504050205020304" pitchFamily="18" charset="0"/>
+              </a:rPr>
+              <a:t>          +</a:t>
+            </a:r>
+            <a:r>
+              <a:rPr lang="en-US" dirty="0">
+                <a:solidFill>
+                  <a:srgbClr val="FFC000"/>
+                </a:solidFill>
+                <a:latin typeface="Centaur" panose="02030504050205020304" pitchFamily="18" charset="0"/>
+              </a:rPr>
+              <a:t>    0.012e8</a:t>
+            </a:r>
+          </a:p>
+          <a:p>
+            <a:r>
+              <a:rPr lang="en-US" dirty="0">
+                <a:solidFill>
+                  <a:srgbClr val="0070C0"/>
+                </a:solidFill>
+                <a:latin typeface="Centaur" panose="02030504050205020304" pitchFamily="18" charset="0"/>
+              </a:rPr>
+              <a:t>      50.3 M </a:t>
+            </a:r>
+            <a:r>
+              <a:rPr lang="en-US" dirty="0">
+                <a:solidFill>
+                  <a:srgbClr val="FFC000"/>
+                </a:solidFill>
+                <a:latin typeface="Centaur" panose="02030504050205020304" pitchFamily="18" charset="0"/>
+              </a:rPr>
+              <a:t>        </a:t>
+            </a:r>
+            <a:r>
+              <a:rPr lang="en-US" dirty="0">
+                <a:latin typeface="Centaur" panose="02030504050205020304" pitchFamily="18" charset="0"/>
+              </a:rPr>
+              <a:t>=     </a:t>
+            </a:r>
+            <a:r>
+              <a:rPr lang="en-US" dirty="0">
+                <a:solidFill>
+                  <a:srgbClr val="FF0000"/>
+                </a:solidFill>
+                <a:latin typeface="Centaur" panose="02030504050205020304" pitchFamily="18" charset="0"/>
+              </a:rPr>
+              <a:t>16 M</a:t>
+            </a:r>
+            <a:r>
+              <a:rPr lang="en-US" dirty="0">
+                <a:latin typeface="Centaur" panose="02030504050205020304" pitchFamily="18" charset="0"/>
+              </a:rPr>
+              <a:t>        +        </a:t>
+            </a:r>
+            <a:r>
+              <a:rPr lang="en-US" dirty="0">
+                <a:solidFill>
+                  <a:srgbClr val="00B050"/>
+                </a:solidFill>
+                <a:latin typeface="Centaur" panose="02030504050205020304" pitchFamily="18" charset="0"/>
+              </a:rPr>
+              <a:t>33 M </a:t>
+            </a:r>
+            <a:r>
+              <a:rPr lang="en-US" dirty="0">
+                <a:latin typeface="Centaur" panose="02030504050205020304" pitchFamily="18" charset="0"/>
+              </a:rPr>
+              <a:t>           +</a:t>
+            </a:r>
+            <a:r>
+              <a:rPr lang="en-US" dirty="0">
+                <a:solidFill>
+                  <a:srgbClr val="FFC000"/>
+                </a:solidFill>
+                <a:latin typeface="Centaur" panose="02030504050205020304" pitchFamily="18" charset="0"/>
+              </a:rPr>
+              <a:t>    1.3 M</a:t>
+            </a:r>
+          </a:p>
+        </p:txBody>
+      </p:sp>
+      <p:pic>
+        <p:nvPicPr>
+          <p:cNvPr id="29" name="Picture 28">
+            <a:extLst>
+              <a:ext uri="{FF2B5EF4-FFF2-40B4-BE49-F238E27FC236}">
+                <a16:creationId xmlns:a16="http://schemas.microsoft.com/office/drawing/2014/main" id="{60186337-0B7E-4095-B788-25F80F4B1BB2}"/>
+              </a:ext>
+            </a:extLst>
+          </p:cNvPr>
+          <p:cNvPicPr>
+            <a:picLocks noChangeAspect="1"/>
+          </p:cNvPicPr>
+          <p:nvPr/>
+        </p:nvPicPr>
+        <p:blipFill>
+          <a:blip r:embed="rId3"/>
+          <a:stretch>
+            <a:fillRect/>
+          </a:stretch>
+        </p:blipFill>
+        <p:spPr>
+          <a:xfrm>
+            <a:off x="10477849" y="3013733"/>
+            <a:ext cx="1571538" cy="2464680"/>
+          </a:xfrm>
+          <a:prstGeom prst="ellipse">
+            <a:avLst/>
+          </a:prstGeom>
+          <a:ln w="6350" cap="rnd">
+            <a:solidFill>
+              <a:srgbClr val="7030A0"/>
+            </a:solidFill>
+            <a:prstDash val="lgDashDotDot"/>
+          </a:ln>
+          <a:effectLst>
+            <a:outerShdw blurRad="381000" dist="292100" dir="5400000" sx="-80000" sy="-18000" rotWithShape="0">
+              <a:srgbClr val="000000">
+                <a:alpha val="22000"/>
+              </a:srgbClr>
+            </a:outerShdw>
+          </a:effectLst>
+          <a:scene3d>
+            <a:camera prst="orthographicFront"/>
+            <a:lightRig rig="contrasting" dir="t">
+              <a:rot lat="0" lon="0" rev="3000000"/>
+            </a:lightRig>
+          </a:scene3d>
+          <a:sp3d contourW="7620">
+            <a:bevelT w="95250" h="31750"/>
+            <a:contourClr>
+              <a:srgbClr val="333333"/>
+            </a:contourClr>
+          </a:sp3d>
+        </p:spPr>
+      </p:pic>
+      <p:sp>
+        <p:nvSpPr>
+          <p:cNvPr id="30" name="Oval 29">
+            <a:extLst>
+              <a:ext uri="{FF2B5EF4-FFF2-40B4-BE49-F238E27FC236}">
+                <a16:creationId xmlns:a16="http://schemas.microsoft.com/office/drawing/2014/main" id="{CDD4D6B3-6C45-4997-A67A-439A53D82EC1}"/>
+              </a:ext>
+            </a:extLst>
+          </p:cNvPr>
+          <p:cNvSpPr/>
+          <p:nvPr/>
+        </p:nvSpPr>
+        <p:spPr>
+          <a:xfrm>
+            <a:off x="7550092" y="4202884"/>
+            <a:ext cx="603301" cy="1000743"/>
+          </a:xfrm>
+          <a:prstGeom prst="ellipse">
+            <a:avLst/>
+          </a:prstGeom>
+          <a:noFill/>
+          <a:ln>
+            <a:prstDash val="dash"/>
+          </a:ln>
+        </p:spPr>
+        <p:style>
+          <a:lnRef idx="2">
+            <a:schemeClr val="accent1">
+              <a:shade val="50000"/>
+            </a:schemeClr>
+          </a:lnRef>
+          <a:fillRef idx="1">
+            <a:schemeClr val="accent1"/>
+          </a:fillRef>
+          <a:effectRef idx="0">
+            <a:schemeClr val="accent1"/>
+          </a:effectRef>
+          <a:fontRef idx="minor">
+            <a:schemeClr val="lt1"/>
+          </a:fontRef>
+        </p:style>
+        <p:txBody>
+          <a:bodyPr rtlCol="0" anchor="ctr"/>
+          <a:lstStyle/>
+          <a:p>
+            <a:pPr algn="ctr"/>
+            <a:endParaRPr lang="en-US" dirty="0"/>
+          </a:p>
+        </p:txBody>
+      </p:sp>
+      <p:sp>
+        <p:nvSpPr>
+          <p:cNvPr id="31" name="Arrow: Notched Right 30">
+            <a:extLst>
+              <a:ext uri="{FF2B5EF4-FFF2-40B4-BE49-F238E27FC236}">
+                <a16:creationId xmlns:a16="http://schemas.microsoft.com/office/drawing/2014/main" id="{B67CAE84-A1A0-4748-8724-60EEE59AA9CB}"/>
+              </a:ext>
+            </a:extLst>
+          </p:cNvPr>
+          <p:cNvSpPr/>
+          <p:nvPr/>
+        </p:nvSpPr>
+        <p:spPr>
+          <a:xfrm>
+            <a:off x="8676665" y="4703255"/>
+            <a:ext cx="1530302" cy="426573"/>
+          </a:xfrm>
+          <a:prstGeom prst="notchedRightArrow">
+            <a:avLst/>
+          </a:prstGeom>
+          <a:solidFill>
+            <a:schemeClr val="accent2">
+              <a:lumMod val="20000"/>
+              <a:lumOff val="80000"/>
+            </a:schemeClr>
+          </a:solidFill>
+          <a:ln>
+            <a:prstDash val="sysDash"/>
+          </a:ln>
+        </p:spPr>
+        <p:style>
+          <a:lnRef idx="2">
+            <a:schemeClr val="accent1">
+              <a:shade val="50000"/>
+            </a:schemeClr>
+          </a:lnRef>
+          <a:fillRef idx="1">
+            <a:schemeClr val="accent1"/>
+          </a:fillRef>
+          <a:effectRef idx="0">
+            <a:schemeClr val="accent1"/>
+          </a:effectRef>
+          <a:fontRef idx="minor">
+            <a:schemeClr val="lt1"/>
+          </a:fontRef>
+        </p:style>
+        <p:txBody>
+          <a:bodyPr rtlCol="0" anchor="ctr"/>
+          <a:lstStyle/>
+          <a:p>
+            <a:pPr algn="ctr"/>
+            <a:endParaRPr lang="en-US" dirty="0">
+              <a:noFill/>
+            </a:endParaRPr>
+          </a:p>
+        </p:txBody>
+      </p:sp>
     </p:spTree>
     <p:extLst>
       <p:ext uri="{BB962C8B-B14F-4D97-AF65-F5344CB8AC3E}">
@@ -10032,6 +10609,163 @@
               <a:t>6</a:t>
             </a:fld>
             <a:endParaRPr lang="en-US"/>
+          </a:p>
+        </p:txBody>
+      </p:sp>
+      <p:cxnSp>
+        <p:nvCxnSpPr>
+          <p:cNvPr id="8" name="Straight Connector 7">
+            <a:extLst>
+              <a:ext uri="{FF2B5EF4-FFF2-40B4-BE49-F238E27FC236}">
+                <a16:creationId xmlns:a16="http://schemas.microsoft.com/office/drawing/2014/main" id="{5B060142-80F5-4F31-9045-56E6F0890A70}"/>
+              </a:ext>
+            </a:extLst>
+          </p:cNvPr>
+          <p:cNvCxnSpPr>
+            <a:cxnSpLocks/>
+          </p:cNvCxnSpPr>
+          <p:nvPr/>
+        </p:nvCxnSpPr>
+        <p:spPr>
+          <a:xfrm>
+            <a:off x="2004969" y="4173759"/>
+            <a:ext cx="4954397" cy="1"/>
+          </a:xfrm>
+          <a:prstGeom prst="line">
+            <a:avLst/>
+          </a:prstGeom>
+          <a:ln>
+            <a:prstDash val="lgDashDotDot"/>
+          </a:ln>
+        </p:spPr>
+        <p:style>
+          <a:lnRef idx="1">
+            <a:schemeClr val="accent1"/>
+          </a:lnRef>
+          <a:fillRef idx="0">
+            <a:schemeClr val="accent1"/>
+          </a:fillRef>
+          <a:effectRef idx="0">
+            <a:schemeClr val="accent1"/>
+          </a:effectRef>
+          <a:fontRef idx="minor">
+            <a:schemeClr val="tx1"/>
+          </a:fontRef>
+        </p:style>
+      </p:cxnSp>
+      <p:cxnSp>
+        <p:nvCxnSpPr>
+          <p:cNvPr id="9" name="Straight Connector 8">
+            <a:extLst>
+              <a:ext uri="{FF2B5EF4-FFF2-40B4-BE49-F238E27FC236}">
+                <a16:creationId xmlns:a16="http://schemas.microsoft.com/office/drawing/2014/main" id="{7C3B22D1-F6E3-47B3-A58A-EE64F451DC09}"/>
+              </a:ext>
+            </a:extLst>
+          </p:cNvPr>
+          <p:cNvCxnSpPr>
+            <a:cxnSpLocks/>
+          </p:cNvCxnSpPr>
+          <p:nvPr/>
+        </p:nvCxnSpPr>
+        <p:spPr>
+          <a:xfrm>
+            <a:off x="6959366" y="4173759"/>
+            <a:ext cx="0" cy="1620474"/>
+          </a:xfrm>
+          <a:prstGeom prst="line">
+            <a:avLst/>
+          </a:prstGeom>
+          <a:ln>
+            <a:prstDash val="lgDashDotDot"/>
+          </a:ln>
+        </p:spPr>
+        <p:style>
+          <a:lnRef idx="1">
+            <a:schemeClr val="accent1"/>
+          </a:lnRef>
+          <a:fillRef idx="0">
+            <a:schemeClr val="accent1"/>
+          </a:fillRef>
+          <a:effectRef idx="0">
+            <a:schemeClr val="accent1"/>
+          </a:effectRef>
+          <a:fontRef idx="minor">
+            <a:schemeClr val="tx1"/>
+          </a:fontRef>
+        </p:style>
+      </p:cxnSp>
+      <p:sp>
+        <p:nvSpPr>
+          <p:cNvPr id="12" name="Callout: Bent Line with Accent Bar 11">
+            <a:extLst>
+              <a:ext uri="{FF2B5EF4-FFF2-40B4-BE49-F238E27FC236}">
+                <a16:creationId xmlns:a16="http://schemas.microsoft.com/office/drawing/2014/main" id="{FDC95A97-FD5B-4374-B8B5-C5834B27E6E5}"/>
+              </a:ext>
+            </a:extLst>
+          </p:cNvPr>
+          <p:cNvSpPr/>
+          <p:nvPr/>
+        </p:nvSpPr>
+        <p:spPr>
+          <a:xfrm>
+            <a:off x="2868418" y="3674380"/>
+            <a:ext cx="2140356" cy="377471"/>
+          </a:xfrm>
+          <a:prstGeom prst="accentCallout2">
+            <a:avLst>
+              <a:gd name="adj1" fmla="val 18750"/>
+              <a:gd name="adj2" fmla="val -8333"/>
+              <a:gd name="adj3" fmla="val 18750"/>
+              <a:gd name="adj4" fmla="val -16667"/>
+              <a:gd name="adj5" fmla="val 128057"/>
+              <a:gd name="adj6" fmla="val -39612"/>
+            </a:avLst>
+          </a:prstGeom>
+          <a:solidFill>
+            <a:schemeClr val="accent4">
+              <a:lumMod val="20000"/>
+              <a:lumOff val="80000"/>
+            </a:schemeClr>
+          </a:solidFill>
+          <a:ln>
+            <a:solidFill>
+              <a:schemeClr val="accent1"/>
+            </a:solidFill>
+            <a:headEnd type="none" w="med" len="med"/>
+            <a:tailEnd type="arrow" w="med" len="med"/>
+          </a:ln>
+        </p:spPr>
+        <p:style>
+          <a:lnRef idx="2">
+            <a:schemeClr val="accent1">
+              <a:shade val="50000"/>
+            </a:schemeClr>
+          </a:lnRef>
+          <a:fillRef idx="1">
+            <a:schemeClr val="accent1"/>
+          </a:fillRef>
+          <a:effectRef idx="0">
+            <a:schemeClr val="accent1"/>
+          </a:effectRef>
+          <a:fontRef idx="minor">
+            <a:schemeClr val="lt1"/>
+          </a:fontRef>
+        </p:style>
+        <p:txBody>
+          <a:bodyPr rtlCol="0" anchor="ctr"/>
+          <a:lstStyle/>
+          <a:p>
+            <a:pPr algn="ctr"/>
+            <a:r>
+              <a:rPr lang="en-US" dirty="0">
+                <a:solidFill>
+                  <a:srgbClr val="0070C0"/>
+                </a:solidFill>
+                <a:latin typeface="Arial" panose="020B0604020202020204" pitchFamily="34" charset="0"/>
+                <a:cs typeface="Arial" panose="020B0604020202020204" pitchFamily="34" charset="0"/>
+              </a:rPr>
+              <a:t>1.3e6 = 0.012e8</a:t>
+            </a:r>
           </a:p>
         </p:txBody>
       </p:sp>

</xml_diff>

<commit_message>
latest PPT slides and added Query_5 to Clay directory
</commit_message>
<xml_diff>
--- a/Clay/Novel_Corona_Virus_2019_v2.pptx
+++ b/Clay/Novel_Corona_Virus_2019_v2.pptx
@@ -272,7 +272,7 @@
           <a:p>
             <a:fld id="{49E4E37A-8C9F-4B25-B068-6A7177E6E2F6}" type="datetimeFigureOut">
               <a:rPr lang="en-US" smtClean="0"/>
-              <a:t>6/8/2021</a:t>
+              <a:t>6/9/2021</a:t>
             </a:fld>
             <a:endParaRPr lang="en-US"/>
           </a:p>
@@ -450,7 +450,7 @@
           <a:p>
             <a:fld id="{9023BEA9-FA89-4F42-A6AE-03E83D737B38}" type="datetimeFigureOut">
               <a:rPr lang="en-US" smtClean="0"/>
-              <a:t>6/8/2021</a:t>
+              <a:t>6/9/2021</a:t>
             </a:fld>
             <a:endParaRPr lang="en-US"/>
           </a:p>
@@ -8294,8 +8294,8 @@
         </p:nvSpPr>
         <p:spPr>
           <a:xfrm>
-            <a:off x="965524" y="1017490"/>
-            <a:ext cx="10515600" cy="5062924"/>
+            <a:off x="917899" y="997963"/>
+            <a:ext cx="10515600" cy="5509200"/>
           </a:xfrm>
           <a:prstGeom prst="rect">
             <a:avLst/>
@@ -8309,12 +8309,12 @@
           <a:lstStyle/>
           <a:p>
             <a:r>
-              <a:rPr lang="en-US" sz="1700" dirty="0"/>
+              <a:rPr lang="en-US" sz="1600" dirty="0"/>
               <a:t>Project Summary/Objectives </a:t>
             </a:r>
           </a:p>
           <a:p>
-            <a:endParaRPr lang="en-US" sz="1700" dirty="0"/>
+            <a:endParaRPr lang="en-US" sz="1600" dirty="0"/>
           </a:p>
           <a:p>
             <a:pPr marL="742950" lvl="1" indent="-285750">
@@ -8322,7 +8322,7 @@
               <a:buChar char="•"/>
             </a:pPr>
             <a:r>
-              <a:rPr lang="en-US" sz="1700" dirty="0"/>
+              <a:rPr lang="en-US" sz="1600" dirty="0"/>
               <a:t>The team objectives are to identify significant trends of the global Covid-19 outbreak from January 2020 through April 2021.  In addition, the team will look at trends of the Covid-19 outbreak in relationship to World Population, GDP, and available vaccinations.   </a:t>
             </a:r>
           </a:p>
@@ -8332,8 +8332,16 @@
               <a:buChar char="•"/>
             </a:pPr>
             <a:r>
-              <a:rPr lang="en-US" sz="1700" dirty="0"/>
-              <a:t>Pandas data queries, Matplotlib data visualization charts, and GMAPS will be used for analysis.  </a:t>
+              <a:rPr lang="en-US" sz="1600" dirty="0"/>
+              <a:t>Pandas data queries, Matplotlib data visualization charts, and </a:t>
+            </a:r>
+            <a:r>
+              <a:rPr lang="en-US" sz="1600" dirty="0" err="1"/>
+              <a:t>GMaps</a:t>
+            </a:r>
+            <a:r>
+              <a:rPr lang="en-US" sz="1600" dirty="0"/>
+              <a:t> will be used for analysis.  </a:t>
             </a:r>
           </a:p>
           <a:p>
@@ -8341,16 +8349,16 @@
               <a:buFont typeface="Arial" panose="020B0604020202020204" pitchFamily="34" charset="0"/>
               <a:buChar char="•"/>
             </a:pPr>
-            <a:endParaRPr lang="en-US" sz="1700" dirty="0"/>
-          </a:p>
-          <a:p>
-            <a:r>
-              <a:rPr lang="en-US" sz="1700" dirty="0"/>
+            <a:endParaRPr lang="en-US" sz="1600" dirty="0"/>
+          </a:p>
+          <a:p>
+            <a:r>
+              <a:rPr lang="en-US" sz="1600" dirty="0"/>
               <a:t>Questions asked by the Team </a:t>
             </a:r>
           </a:p>
           <a:p>
-            <a:endParaRPr lang="en-US" sz="1700" dirty="0"/>
+            <a:endParaRPr lang="en-US" sz="1600" dirty="0"/>
           </a:p>
           <a:p>
             <a:pPr marL="742950" lvl="1" indent="-285750">
@@ -8358,7 +8366,7 @@
               <a:buChar char="•"/>
             </a:pPr>
             <a:r>
-              <a:rPr lang="en-US" sz="1700" dirty="0"/>
+              <a:rPr lang="en-US" sz="1600" dirty="0"/>
               <a:t>Where did the first Covid-19 cases get reported?     </a:t>
             </a:r>
           </a:p>
@@ -8368,7 +8376,7 @@
               <a:buChar char="•"/>
             </a:pPr>
             <a:r>
-              <a:rPr lang="en-US" sz="1700" dirty="0"/>
+              <a:rPr lang="en-US" sz="1600" dirty="0"/>
               <a:t>Availability vaccinations by manufacturer and country?   	</a:t>
             </a:r>
           </a:p>
@@ -8378,7 +8386,7 @@
               <a:buChar char="•"/>
             </a:pPr>
             <a:r>
-              <a:rPr lang="en-US" sz="1700" dirty="0"/>
+              <a:rPr lang="en-US" sz="1600" dirty="0"/>
               <a:t>Does GDP and population have any impact or influence on the covid 19 outbreak?</a:t>
             </a:r>
           </a:p>
@@ -8388,25 +8396,31 @@
               <a:buChar char="•"/>
             </a:pPr>
             <a:r>
-              <a:rPr lang="en-US" sz="1700" dirty="0"/>
+              <a:rPr lang="en-US" sz="1600" dirty="0"/>
               <a:t>Which countries are impacted the most and least by the covid 19 outbreak?  </a:t>
             </a:r>
           </a:p>
           <a:p>
-            <a:endParaRPr lang="en-US" sz="1700" dirty="0"/>
-          </a:p>
-          <a:p>
-            <a:r>
-              <a:rPr lang="en-US" sz="1700" dirty="0"/>
-              <a:t>Were the questions answered to the teams satisfaction?   The following exceptions were noted during the teams analysis:</a:t>
-            </a:r>
+            <a:endParaRPr lang="en-US" sz="1600" dirty="0"/>
+          </a:p>
+          <a:p>
+            <a:r>
+              <a:rPr lang="en-US" sz="1600" dirty="0"/>
+              <a:t>Were the questions answered to the teams satisfaction?  The team was able to successfully locate the data sources for Covid 19 Cases, Covid 19 Vaccinations, World Population, and GDP it believed would to be reasonably sufficient toward answering the teams questions.  During the teams analysis, the following were noted as deviations from what would normally be expected:  </a:t>
+            </a:r>
+          </a:p>
+          <a:p>
+            <a:endParaRPr lang="en-US" sz="1600" dirty="0"/>
           </a:p>
           <a:p>
             <a:pPr marL="742950" lvl="1" indent="-285750">
               <a:buFont typeface="Arial" panose="020B0604020202020204" pitchFamily="34" charset="0"/>
               <a:buChar char="•"/>
             </a:pPr>
-            <a:endParaRPr lang="en-US" sz="1700" dirty="0"/>
+            <a:r>
+              <a:rPr lang="en-US" sz="1600" dirty="0"/>
+              <a:t>Mexico - unusually high percent relationship between deaths and the number of confirmed Covid 19 cases.  </a:t>
+            </a:r>
           </a:p>
           <a:p>
             <a:pPr marL="742950" lvl="1" indent="-285750">
@@ -8414,8 +8428,8 @@
               <a:buChar char="•"/>
             </a:pPr>
             <a:r>
-              <a:rPr lang="en-US" sz="1700" dirty="0"/>
-              <a:t>Mexico - unusually high percent relationship between deaths and the number of confirmed Covid 19 cases.  </a:t>
+              <a:rPr lang="en-US" sz="1600" dirty="0"/>
+              <a:t>US - discontinuance of reporting Covid 19 recoveries in mid December 2020.</a:t>
             </a:r>
           </a:p>
           <a:p>
@@ -8424,8 +8438,8 @@
               <a:buChar char="•"/>
             </a:pPr>
             <a:r>
-              <a:rPr lang="en-US" sz="1700" dirty="0"/>
-              <a:t>US - discontinuance  of reporting Covid 19 recoveries in mid December 2020.</a:t>
+              <a:rPr lang="en-US" sz="1600" dirty="0"/>
+              <a:t>Global GDP published by the World Bank and World population numbers are available as of 2019 (vs. 2020). </a:t>
             </a:r>
           </a:p>
         </p:txBody>

</xml_diff>

<commit_message>
added WHO Covid to the last slide
</commit_message>
<xml_diff>
--- a/Clay/Novel_Corona_Virus_2019_v2.pptx
+++ b/Clay/Novel_Corona_Virus_2019_v2.pptx
@@ -5,10 +5,10 @@
     <p:sldMasterId id="2147483648" r:id="rId1"/>
   </p:sldMasterIdLst>
   <p:notesMasterIdLst>
-    <p:notesMasterId r:id="rId22"/>
+    <p:notesMasterId r:id="rId23"/>
   </p:notesMasterIdLst>
   <p:handoutMasterIdLst>
-    <p:handoutMasterId r:id="rId23"/>
+    <p:handoutMasterId r:id="rId24"/>
   </p:handoutMasterIdLst>
   <p:sldIdLst>
     <p:sldId id="256" r:id="rId2"/>
@@ -31,6 +31,7 @@
     <p:sldId id="277" r:id="rId19"/>
     <p:sldId id="278" r:id="rId20"/>
     <p:sldId id="265" r:id="rId21"/>
+    <p:sldId id="279" r:id="rId22"/>
   </p:sldIdLst>
   <p:sldSz cx="12192000" cy="6858000"/>
   <p:notesSz cx="6858000" cy="9144000"/>
@@ -8902,6 +8903,175 @@
     <p:extLst>
       <p:ext uri="{BB962C8B-B14F-4D97-AF65-F5344CB8AC3E}">
         <p14:creationId xmlns:p14="http://schemas.microsoft.com/office/powerpoint/2010/main" val="1607740863"/>
+      </p:ext>
+    </p:extLst>
+  </p:cSld>
+  <p:clrMapOvr>
+    <a:masterClrMapping/>
+  </p:clrMapOvr>
+</p:sld>
+</file>
+
+<file path=ppt/slides/slide21.xml><?xml version="1.0" encoding="utf-8"?>
+<p:sld xmlns:a="http://schemas.openxmlformats.org/drawingml/2006/main" xmlns:r="http://schemas.openxmlformats.org/officeDocument/2006/relationships" xmlns:p="http://schemas.openxmlformats.org/presentationml/2006/main">
+  <p:cSld>
+    <p:spTree>
+      <p:nvGrpSpPr>
+        <p:cNvPr id="1" name=""/>
+        <p:cNvGrpSpPr/>
+        <p:nvPr/>
+      </p:nvGrpSpPr>
+      <p:grpSpPr>
+        <a:xfrm>
+          <a:off x="0" y="0"/>
+          <a:ext cx="0" cy="0"/>
+          <a:chOff x="0" y="0"/>
+          <a:chExt cx="0" cy="0"/>
+        </a:xfrm>
+      </p:grpSpPr>
+      <p:sp>
+        <p:nvSpPr>
+          <p:cNvPr id="2" name="Title 1">
+            <a:extLst>
+              <a:ext uri="{FF2B5EF4-FFF2-40B4-BE49-F238E27FC236}">
+                <a16:creationId xmlns:a16="http://schemas.microsoft.com/office/drawing/2014/main" id="{B1A50B27-6D19-45D8-920D-A51A20441937}"/>
+              </a:ext>
+            </a:extLst>
+          </p:cNvPr>
+          <p:cNvSpPr>
+            <a:spLocks noGrp="1"/>
+          </p:cNvSpPr>
+          <p:nvPr>
+            <p:ph type="title"/>
+          </p:nvPr>
+        </p:nvSpPr>
+        <p:spPr/>
+        <p:txBody>
+          <a:bodyPr/>
+          <a:lstStyle/>
+          <a:p>
+            <a:endParaRPr lang="en-US"/>
+          </a:p>
+        </p:txBody>
+      </p:sp>
+      <p:sp>
+        <p:nvSpPr>
+          <p:cNvPr id="4" name="Date Placeholder 3">
+            <a:extLst>
+              <a:ext uri="{FF2B5EF4-FFF2-40B4-BE49-F238E27FC236}">
+                <a16:creationId xmlns:a16="http://schemas.microsoft.com/office/drawing/2014/main" id="{3FDE0EF3-800F-49DA-A1A5-7D4FDAF2A3CA}"/>
+              </a:ext>
+            </a:extLst>
+          </p:cNvPr>
+          <p:cNvSpPr>
+            <a:spLocks noGrp="1"/>
+          </p:cNvSpPr>
+          <p:nvPr>
+            <p:ph type="dt" sz="half" idx="10"/>
+          </p:nvPr>
+        </p:nvSpPr>
+        <p:spPr/>
+        <p:txBody>
+          <a:bodyPr/>
+          <a:lstStyle/>
+          <a:p>
+            <a:r>
+              <a:rPr lang="en-US"/>
+              <a:t>6/9/2021</a:t>
+            </a:r>
+          </a:p>
+        </p:txBody>
+      </p:sp>
+      <p:sp>
+        <p:nvSpPr>
+          <p:cNvPr id="5" name="Footer Placeholder 4">
+            <a:extLst>
+              <a:ext uri="{FF2B5EF4-FFF2-40B4-BE49-F238E27FC236}">
+                <a16:creationId xmlns:a16="http://schemas.microsoft.com/office/drawing/2014/main" id="{6F8FDF6E-F2E4-42AA-8D3A-C8BD25B12A95}"/>
+              </a:ext>
+            </a:extLst>
+          </p:cNvPr>
+          <p:cNvSpPr>
+            <a:spLocks noGrp="1"/>
+          </p:cNvSpPr>
+          <p:nvPr>
+            <p:ph type="ftr" sz="quarter" idx="11"/>
+          </p:nvPr>
+        </p:nvSpPr>
+        <p:spPr/>
+        <p:txBody>
+          <a:bodyPr/>
+          <a:lstStyle/>
+          <a:p>
+            <a:r>
+              <a:rPr lang="en-US"/>
+              <a:t>https://github.com/makbarish/Grp5_Project1_Covid19</a:t>
+            </a:r>
+          </a:p>
+        </p:txBody>
+      </p:sp>
+      <p:sp>
+        <p:nvSpPr>
+          <p:cNvPr id="6" name="Slide Number Placeholder 5">
+            <a:extLst>
+              <a:ext uri="{FF2B5EF4-FFF2-40B4-BE49-F238E27FC236}">
+                <a16:creationId xmlns:a16="http://schemas.microsoft.com/office/drawing/2014/main" id="{D6FC89FC-64FF-44AF-88CA-DACB5609E747}"/>
+              </a:ext>
+            </a:extLst>
+          </p:cNvPr>
+          <p:cNvSpPr>
+            <a:spLocks noGrp="1"/>
+          </p:cNvSpPr>
+          <p:nvPr>
+            <p:ph type="sldNum" sz="quarter" idx="12"/>
+          </p:nvPr>
+        </p:nvSpPr>
+        <p:spPr/>
+        <p:txBody>
+          <a:bodyPr/>
+          <a:lstStyle/>
+          <a:p>
+            <a:fld id="{3AA9003C-6A8E-4863-AB7A-EC3E1B799067}" type="slidenum">
+              <a:rPr lang="en-US" smtClean="0"/>
+              <a:t>21</a:t>
+            </a:fld>
+            <a:endParaRPr lang="en-US"/>
+          </a:p>
+        </p:txBody>
+      </p:sp>
+      <p:pic>
+        <p:nvPicPr>
+          <p:cNvPr id="14" name="Content Placeholder 13">
+            <a:extLst>
+              <a:ext uri="{FF2B5EF4-FFF2-40B4-BE49-F238E27FC236}">
+                <a16:creationId xmlns:a16="http://schemas.microsoft.com/office/drawing/2014/main" id="{8F02B3A3-675A-4ABA-8ED3-282E11101867}"/>
+              </a:ext>
+            </a:extLst>
+          </p:cNvPr>
+          <p:cNvPicPr>
+            <a:picLocks noGrp="1" noChangeAspect="1"/>
+          </p:cNvPicPr>
+          <p:nvPr>
+            <p:ph idx="1"/>
+          </p:nvPr>
+        </p:nvPicPr>
+        <p:blipFill>
+          <a:blip r:embed="rId2"/>
+          <a:stretch>
+            <a:fillRect/>
+          </a:stretch>
+        </p:blipFill>
+        <p:spPr>
+          <a:xfrm>
+            <a:off x="252716" y="136525"/>
+            <a:ext cx="11686568" cy="6030588"/>
+          </a:xfrm>
+        </p:spPr>
+      </p:pic>
+    </p:spTree>
+    <p:extLst>
+      <p:ext uri="{BB962C8B-B14F-4D97-AF65-F5344CB8AC3E}">
+        <p14:creationId xmlns:p14="http://schemas.microsoft.com/office/powerpoint/2010/main" val="1787523053"/>
       </p:ext>
     </p:extLst>
   </p:cSld>

</xml_diff>